<commit_message>
SAG-CTR Evidence Locker Services SEC rule
</commit_message>
<xml_diff>
--- a/2023-0801-SAG-CTR-TP-EVIDENCE-OVERVIEW.pptx
+++ b/2023-0801-SAG-CTR-TP-EVIDENCE-OVERVIEW.pptx
@@ -521,7 +521,7 @@
           <a:noFill/>
           <a:extLst>
             <a:ext uri="{909E8E84-426E-40dd-AFC4-6F175D3DCCD1}">
-              <a14:hiddenFill xmlns:a14="http://schemas.microsoft.com/office/drawing/2010/main" xmlns="">
+              <a14:hiddenFill xmlns="" xmlns:a14="http://schemas.microsoft.com/office/drawing/2010/main">
                 <a:solidFill>
                   <a:srgbClr val="FFFFFF"/>
                 </a:solidFill>
@@ -581,7 +581,7 @@
             </a:ln>
             <a:extLst>
               <a:ext uri="{91240B29-F687-4f45-9708-019B960494DF}">
-                <a14:hiddenLine xmlns:a14="http://schemas.microsoft.com/office/drawing/2010/main" xmlns="" w="9525">
+                <a14:hiddenLine xmlns="" xmlns:a14="http://schemas.microsoft.com/office/drawing/2010/main" w="9525">
                   <a:solidFill>
                     <a:srgbClr val="000000"/>
                   </a:solidFill>
@@ -671,7 +671,7 @@
             </a:ln>
             <a:extLst>
               <a:ext uri="{91240B29-F687-4f45-9708-019B960494DF}">
-                <a14:hiddenLine xmlns:a14="http://schemas.microsoft.com/office/drawing/2010/main" xmlns="" w="9525">
+                <a14:hiddenLine xmlns="" xmlns:a14="http://schemas.microsoft.com/office/drawing/2010/main" w="9525">
                   <a:solidFill>
                     <a:srgbClr val="000000"/>
                   </a:solidFill>
@@ -761,7 +761,7 @@
             </a:ln>
             <a:extLst>
               <a:ext uri="{91240B29-F687-4f45-9708-019B960494DF}">
-                <a14:hiddenLine xmlns:a14="http://schemas.microsoft.com/office/drawing/2010/main" xmlns="" w="9525">
+                <a14:hiddenLine xmlns="" xmlns:a14="http://schemas.microsoft.com/office/drawing/2010/main" w="9525">
                   <a:solidFill>
                     <a:srgbClr val="000000"/>
                   </a:solidFill>
@@ -795,7 +795,7 @@
             </a:ln>
             <a:extLst>
               <a:ext uri="{91240B29-F687-4f45-9708-019B960494DF}">
-                <a14:hiddenLine xmlns:a14="http://schemas.microsoft.com/office/drawing/2010/main" xmlns="" w="9525">
+                <a14:hiddenLine xmlns="" xmlns:a14="http://schemas.microsoft.com/office/drawing/2010/main" w="9525">
                   <a:solidFill>
                     <a:srgbClr val="000000"/>
                   </a:solidFill>
@@ -885,7 +885,7 @@
             </a:ln>
             <a:extLst>
               <a:ext uri="{91240B29-F687-4f45-9708-019B960494DF}">
-                <a14:hiddenLine xmlns:a14="http://schemas.microsoft.com/office/drawing/2010/main" xmlns="" w="9525">
+                <a14:hiddenLine xmlns="" xmlns:a14="http://schemas.microsoft.com/office/drawing/2010/main" w="9525">
                   <a:solidFill>
                     <a:srgbClr val="000000"/>
                   </a:solidFill>
@@ -947,7 +947,7 @@
             </a:ln>
             <a:extLst>
               <a:ext uri="{91240B29-F687-4f45-9708-019B960494DF}">
-                <a14:hiddenLine xmlns:a14="http://schemas.microsoft.com/office/drawing/2010/main" xmlns="" w="9525">
+                <a14:hiddenLine xmlns="" xmlns:a14="http://schemas.microsoft.com/office/drawing/2010/main" w="9525">
                   <a:solidFill>
                     <a:srgbClr val="000000"/>
                   </a:solidFill>
@@ -1009,7 +1009,7 @@
             </a:ln>
             <a:extLst>
               <a:ext uri="{91240B29-F687-4f45-9708-019B960494DF}">
-                <a14:hiddenLine xmlns:a14="http://schemas.microsoft.com/office/drawing/2010/main" xmlns="" w="9525">
+                <a14:hiddenLine xmlns="" xmlns:a14="http://schemas.microsoft.com/office/drawing/2010/main" w="9525">
                   <a:solidFill>
                     <a:srgbClr val="000000"/>
                   </a:solidFill>
@@ -1099,7 +1099,7 @@
             </a:ln>
             <a:extLst>
               <a:ext uri="{91240B29-F687-4f45-9708-019B960494DF}">
-                <a14:hiddenLine xmlns:a14="http://schemas.microsoft.com/office/drawing/2010/main" xmlns="" w="9525">
+                <a14:hiddenLine xmlns="" xmlns:a14="http://schemas.microsoft.com/office/drawing/2010/main" w="9525">
                   <a:solidFill>
                     <a:srgbClr val="000000"/>
                   </a:solidFill>
@@ -1161,7 +1161,7 @@
             </a:ln>
             <a:extLst>
               <a:ext uri="{91240B29-F687-4f45-9708-019B960494DF}">
-                <a14:hiddenLine xmlns:a14="http://schemas.microsoft.com/office/drawing/2010/main" xmlns="" w="9525">
+                <a14:hiddenLine xmlns="" xmlns:a14="http://schemas.microsoft.com/office/drawing/2010/main" w="9525">
                   <a:solidFill>
                     <a:srgbClr val="000000"/>
                   </a:solidFill>
@@ -1223,7 +1223,7 @@
             </a:ln>
             <a:extLst>
               <a:ext uri="{91240B29-F687-4f45-9708-019B960494DF}">
-                <a14:hiddenLine xmlns:a14="http://schemas.microsoft.com/office/drawing/2010/main" xmlns="" w="9525">
+                <a14:hiddenLine xmlns="" xmlns:a14="http://schemas.microsoft.com/office/drawing/2010/main" w="9525">
                   <a:solidFill>
                     <a:srgbClr val="000000"/>
                   </a:solidFill>
@@ -1313,7 +1313,7 @@
             </a:ln>
             <a:extLst>
               <a:ext uri="{91240B29-F687-4f45-9708-019B960494DF}">
-                <a14:hiddenLine xmlns:a14="http://schemas.microsoft.com/office/drawing/2010/main" xmlns="" w="9525">
+                <a14:hiddenLine xmlns="" xmlns:a14="http://schemas.microsoft.com/office/drawing/2010/main" w="9525">
                   <a:solidFill>
                     <a:srgbClr val="000000"/>
                   </a:solidFill>
@@ -1403,7 +1403,7 @@
             </a:ln>
             <a:extLst>
               <a:ext uri="{91240B29-F687-4f45-9708-019B960494DF}">
-                <a14:hiddenLine xmlns:a14="http://schemas.microsoft.com/office/drawing/2010/main" xmlns="" w="9525">
+                <a14:hiddenLine xmlns="" xmlns:a14="http://schemas.microsoft.com/office/drawing/2010/main" w="9525">
                   <a:solidFill>
                     <a:srgbClr val="000000"/>
                   </a:solidFill>
@@ -1465,7 +1465,7 @@
             </a:ln>
             <a:extLst>
               <a:ext uri="{91240B29-F687-4f45-9708-019B960494DF}">
-                <a14:hiddenLine xmlns:a14="http://schemas.microsoft.com/office/drawing/2010/main" xmlns="" w="9525">
+                <a14:hiddenLine xmlns="" xmlns:a14="http://schemas.microsoft.com/office/drawing/2010/main" w="9525">
                   <a:solidFill>
                     <a:srgbClr val="000000"/>
                   </a:solidFill>
@@ -1575,7 +1575,7 @@
             </a:ln>
             <a:extLst>
               <a:ext uri="{91240B29-F687-4f45-9708-019B960494DF}">
-                <a14:hiddenLine xmlns:a14="http://schemas.microsoft.com/office/drawing/2010/main" xmlns="" w="9525">
+                <a14:hiddenLine xmlns="" xmlns:a14="http://schemas.microsoft.com/office/drawing/2010/main" w="9525">
                   <a:solidFill>
                     <a:srgbClr val="000000"/>
                   </a:solidFill>
@@ -1637,7 +1637,7 @@
             </a:ln>
             <a:extLst>
               <a:ext uri="{91240B29-F687-4f45-9708-019B960494DF}">
-                <a14:hiddenLine xmlns:a14="http://schemas.microsoft.com/office/drawing/2010/main" xmlns="" w="9525">
+                <a14:hiddenLine xmlns="" xmlns:a14="http://schemas.microsoft.com/office/drawing/2010/main" w="9525">
                   <a:solidFill>
                     <a:srgbClr val="000000"/>
                   </a:solidFill>
@@ -1727,7 +1727,7 @@
             </a:ln>
             <a:extLst>
               <a:ext uri="{91240B29-F687-4f45-9708-019B960494DF}">
-                <a14:hiddenLine xmlns:a14="http://schemas.microsoft.com/office/drawing/2010/main" xmlns="" w="9525">
+                <a14:hiddenLine xmlns="" xmlns:a14="http://schemas.microsoft.com/office/drawing/2010/main" w="9525">
                   <a:solidFill>
                     <a:srgbClr val="000000"/>
                   </a:solidFill>
@@ -1817,7 +1817,7 @@
             </a:ln>
             <a:extLst>
               <a:ext uri="{91240B29-F687-4f45-9708-019B960494DF}">
-                <a14:hiddenLine xmlns:a14="http://schemas.microsoft.com/office/drawing/2010/main" xmlns="" w="9525">
+                <a14:hiddenLine xmlns="" xmlns:a14="http://schemas.microsoft.com/office/drawing/2010/main" w="9525">
                   <a:solidFill>
                     <a:srgbClr val="000000"/>
                   </a:solidFill>
@@ -1879,7 +1879,7 @@
             </a:ln>
             <a:extLst>
               <a:ext uri="{91240B29-F687-4f45-9708-019B960494DF}">
-                <a14:hiddenLine xmlns:a14="http://schemas.microsoft.com/office/drawing/2010/main" xmlns="" w="9525">
+                <a14:hiddenLine xmlns="" xmlns:a14="http://schemas.microsoft.com/office/drawing/2010/main" w="9525">
                   <a:solidFill>
                     <a:srgbClr val="000000"/>
                   </a:solidFill>
@@ -1969,7 +1969,7 @@
             </a:ln>
             <a:extLst>
               <a:ext uri="{91240B29-F687-4f45-9708-019B960494DF}">
-                <a14:hiddenLine xmlns:a14="http://schemas.microsoft.com/office/drawing/2010/main" xmlns="" w="9525">
+                <a14:hiddenLine xmlns="" xmlns:a14="http://schemas.microsoft.com/office/drawing/2010/main" w="9525">
                   <a:solidFill>
                     <a:srgbClr val="000000"/>
                   </a:solidFill>
@@ -2059,7 +2059,7 @@
             </a:ln>
             <a:extLst>
               <a:ext uri="{91240B29-F687-4f45-9708-019B960494DF}">
-                <a14:hiddenLine xmlns:a14="http://schemas.microsoft.com/office/drawing/2010/main" xmlns="" w="9525">
+                <a14:hiddenLine xmlns="" xmlns:a14="http://schemas.microsoft.com/office/drawing/2010/main" w="9525">
                   <a:solidFill>
                     <a:srgbClr val="000000"/>
                   </a:solidFill>
@@ -2115,7 +2115,7 @@
             </a:ln>
             <a:extLst>
               <a:ext uri="{91240B29-F687-4f45-9708-019B960494DF}">
-                <a14:hiddenLine xmlns:a14="http://schemas.microsoft.com/office/drawing/2010/main" xmlns="" w="9525">
+                <a14:hiddenLine xmlns="" xmlns:a14="http://schemas.microsoft.com/office/drawing/2010/main" w="9525">
                   <a:solidFill>
                     <a:srgbClr val="000000"/>
                   </a:solidFill>
@@ -2205,7 +2205,7 @@
             </a:ln>
             <a:extLst>
               <a:ext uri="{91240B29-F687-4f45-9708-019B960494DF}">
-                <a14:hiddenLine xmlns:a14="http://schemas.microsoft.com/office/drawing/2010/main" xmlns="" w="9525">
+                <a14:hiddenLine xmlns="" xmlns:a14="http://schemas.microsoft.com/office/drawing/2010/main" w="9525">
                   <a:solidFill>
                     <a:srgbClr val="000000"/>
                   </a:solidFill>
@@ -2261,7 +2261,7 @@
             </a:ln>
             <a:extLst>
               <a:ext uri="{91240B29-F687-4f45-9708-019B960494DF}">
-                <a14:hiddenLine xmlns:a14="http://schemas.microsoft.com/office/drawing/2010/main" xmlns="" w="9525">
+                <a14:hiddenLine xmlns="" xmlns:a14="http://schemas.microsoft.com/office/drawing/2010/main" w="9525">
                   <a:solidFill>
                     <a:srgbClr val="000000"/>
                   </a:solidFill>
@@ -2351,7 +2351,7 @@
             </a:ln>
             <a:extLst>
               <a:ext uri="{91240B29-F687-4f45-9708-019B960494DF}">
-                <a14:hiddenLine xmlns:a14="http://schemas.microsoft.com/office/drawing/2010/main" xmlns="" w="9525">
+                <a14:hiddenLine xmlns="" xmlns:a14="http://schemas.microsoft.com/office/drawing/2010/main" w="9525">
                   <a:solidFill>
                     <a:srgbClr val="000000"/>
                   </a:solidFill>
@@ -2419,7 +2419,7 @@
             </a:ln>
             <a:extLst>
               <a:ext uri="{91240B29-F687-4f45-9708-019B960494DF}">
-                <a14:hiddenLine xmlns:a14="http://schemas.microsoft.com/office/drawing/2010/main" xmlns="" w="9525">
+                <a14:hiddenLine xmlns="" xmlns:a14="http://schemas.microsoft.com/office/drawing/2010/main" w="9525">
                   <a:solidFill>
                     <a:srgbClr val="000000"/>
                   </a:solidFill>
@@ -2509,7 +2509,7 @@
             </a:ln>
             <a:extLst>
               <a:ext uri="{91240B29-F687-4f45-9708-019B960494DF}">
-                <a14:hiddenLine xmlns:a14="http://schemas.microsoft.com/office/drawing/2010/main" xmlns="" w="9525">
+                <a14:hiddenLine xmlns="" xmlns:a14="http://schemas.microsoft.com/office/drawing/2010/main" w="9525">
                   <a:solidFill>
                     <a:srgbClr val="000000"/>
                   </a:solidFill>
@@ -2577,7 +2577,7 @@
             </a:ln>
             <a:extLst>
               <a:ext uri="{91240B29-F687-4f45-9708-019B960494DF}">
-                <a14:hiddenLine xmlns:a14="http://schemas.microsoft.com/office/drawing/2010/main" xmlns="" w="9525">
+                <a14:hiddenLine xmlns="" xmlns:a14="http://schemas.microsoft.com/office/drawing/2010/main" w="9525">
                   <a:solidFill>
                     <a:srgbClr val="000000"/>
                   </a:solidFill>
@@ -2667,7 +2667,7 @@
             </a:ln>
             <a:extLst>
               <a:ext uri="{91240B29-F687-4f45-9708-019B960494DF}">
-                <a14:hiddenLine xmlns:a14="http://schemas.microsoft.com/office/drawing/2010/main" xmlns="" w="9525">
+                <a14:hiddenLine xmlns="" xmlns:a14="http://schemas.microsoft.com/office/drawing/2010/main" w="9525">
                   <a:solidFill>
                     <a:srgbClr val="000000"/>
                   </a:solidFill>
@@ -2701,7 +2701,7 @@
             </a:ln>
             <a:extLst>
               <a:ext uri="{91240B29-F687-4f45-9708-019B960494DF}">
-                <a14:hiddenLine xmlns:a14="http://schemas.microsoft.com/office/drawing/2010/main" xmlns="" w="9525">
+                <a14:hiddenLine xmlns="" xmlns:a14="http://schemas.microsoft.com/office/drawing/2010/main" w="9525">
                   <a:solidFill>
                     <a:srgbClr val="000000"/>
                   </a:solidFill>
@@ -2791,7 +2791,7 @@
             </a:ln>
             <a:extLst>
               <a:ext uri="{91240B29-F687-4f45-9708-019B960494DF}">
-                <a14:hiddenLine xmlns:a14="http://schemas.microsoft.com/office/drawing/2010/main" xmlns="" w="9525">
+                <a14:hiddenLine xmlns="" xmlns:a14="http://schemas.microsoft.com/office/drawing/2010/main" w="9525">
                   <a:solidFill>
                     <a:srgbClr val="000000"/>
                   </a:solidFill>
@@ -2853,7 +2853,7 @@
             </a:ln>
             <a:extLst>
               <a:ext uri="{91240B29-F687-4f45-9708-019B960494DF}">
-                <a14:hiddenLine xmlns:a14="http://schemas.microsoft.com/office/drawing/2010/main" xmlns="" w="9525">
+                <a14:hiddenLine xmlns="" xmlns:a14="http://schemas.microsoft.com/office/drawing/2010/main" w="9525">
                   <a:solidFill>
                     <a:srgbClr val="000000"/>
                   </a:solidFill>
@@ -2915,7 +2915,7 @@
             </a:ln>
             <a:extLst>
               <a:ext uri="{91240B29-F687-4f45-9708-019B960494DF}">
-                <a14:hiddenLine xmlns:a14="http://schemas.microsoft.com/office/drawing/2010/main" xmlns="" w="9525">
+                <a14:hiddenLine xmlns="" xmlns:a14="http://schemas.microsoft.com/office/drawing/2010/main" w="9525">
                   <a:solidFill>
                     <a:srgbClr val="000000"/>
                   </a:solidFill>
@@ -3005,7 +3005,7 @@
             </a:ln>
             <a:extLst>
               <a:ext uri="{91240B29-F687-4f45-9708-019B960494DF}">
-                <a14:hiddenLine xmlns:a14="http://schemas.microsoft.com/office/drawing/2010/main" xmlns="" w="9525">
+                <a14:hiddenLine xmlns="" xmlns:a14="http://schemas.microsoft.com/office/drawing/2010/main" w="9525">
                   <a:solidFill>
                     <a:srgbClr val="000000"/>
                   </a:solidFill>
@@ -3073,7 +3073,7 @@
             </a:ln>
             <a:extLst>
               <a:ext uri="{91240B29-F687-4f45-9708-019B960494DF}">
-                <a14:hiddenLine xmlns:a14="http://schemas.microsoft.com/office/drawing/2010/main" xmlns="" w="9525">
+                <a14:hiddenLine xmlns="" xmlns:a14="http://schemas.microsoft.com/office/drawing/2010/main" w="9525">
                   <a:solidFill>
                     <a:srgbClr val="000000"/>
                   </a:solidFill>
@@ -3135,7 +3135,7 @@
             </a:ln>
             <a:extLst>
               <a:ext uri="{91240B29-F687-4f45-9708-019B960494DF}">
-                <a14:hiddenLine xmlns:a14="http://schemas.microsoft.com/office/drawing/2010/main" xmlns="" w="9525">
+                <a14:hiddenLine xmlns="" xmlns:a14="http://schemas.microsoft.com/office/drawing/2010/main" w="9525">
                   <a:solidFill>
                     <a:srgbClr val="000000"/>
                   </a:solidFill>
@@ -3225,7 +3225,7 @@
             </a:ln>
             <a:extLst>
               <a:ext uri="{91240B29-F687-4f45-9708-019B960494DF}">
-                <a14:hiddenLine xmlns:a14="http://schemas.microsoft.com/office/drawing/2010/main" xmlns="" w="9525">
+                <a14:hiddenLine xmlns="" xmlns:a14="http://schemas.microsoft.com/office/drawing/2010/main" w="9525">
                   <a:solidFill>
                     <a:srgbClr val="000000"/>
                   </a:solidFill>
@@ -3287,7 +3287,7 @@
             </a:ln>
             <a:extLst>
               <a:ext uri="{91240B29-F687-4f45-9708-019B960494DF}">
-                <a14:hiddenLine xmlns:a14="http://schemas.microsoft.com/office/drawing/2010/main" xmlns="" w="9525">
+                <a14:hiddenLine xmlns="" xmlns:a14="http://schemas.microsoft.com/office/drawing/2010/main" w="9525">
                   <a:solidFill>
                     <a:srgbClr val="000000"/>
                   </a:solidFill>
@@ -3377,7 +3377,7 @@
             </a:ln>
             <a:extLst>
               <a:ext uri="{91240B29-F687-4f45-9708-019B960494DF}">
-                <a14:hiddenLine xmlns:a14="http://schemas.microsoft.com/office/drawing/2010/main" xmlns="" w="9525">
+                <a14:hiddenLine xmlns="" xmlns:a14="http://schemas.microsoft.com/office/drawing/2010/main" w="9525">
                   <a:solidFill>
                     <a:srgbClr val="000000"/>
                   </a:solidFill>
@@ -3439,7 +3439,7 @@
             </a:ln>
             <a:extLst>
               <a:ext uri="{91240B29-F687-4f45-9708-019B960494DF}">
-                <a14:hiddenLine xmlns:a14="http://schemas.microsoft.com/office/drawing/2010/main" xmlns="" w="9525">
+                <a14:hiddenLine xmlns="" xmlns:a14="http://schemas.microsoft.com/office/drawing/2010/main" w="9525">
                   <a:solidFill>
                     <a:srgbClr val="000000"/>
                   </a:solidFill>
@@ -3529,7 +3529,7 @@
             </a:ln>
             <a:extLst>
               <a:ext uri="{91240B29-F687-4f45-9708-019B960494DF}">
-                <a14:hiddenLine xmlns:a14="http://schemas.microsoft.com/office/drawing/2010/main" xmlns="" w="9525">
+                <a14:hiddenLine xmlns="" xmlns:a14="http://schemas.microsoft.com/office/drawing/2010/main" w="9525">
                   <a:solidFill>
                     <a:srgbClr val="000000"/>
                   </a:solidFill>
@@ -3563,7 +3563,7 @@
             </a:ln>
             <a:extLst>
               <a:ext uri="{91240B29-F687-4f45-9708-019B960494DF}">
-                <a14:hiddenLine xmlns:a14="http://schemas.microsoft.com/office/drawing/2010/main" xmlns="" w="9525">
+                <a14:hiddenLine xmlns="" xmlns:a14="http://schemas.microsoft.com/office/drawing/2010/main" w="9525">
                   <a:solidFill>
                     <a:srgbClr val="000000"/>
                   </a:solidFill>
@@ -3628,7 +3628,7 @@
             </a:ln>
             <a:extLst>
               <a:ext uri="{91240B29-F687-4f45-9708-019B960494DF}">
-                <a14:hiddenLine xmlns:a14="http://schemas.microsoft.com/office/drawing/2010/main" xmlns="" w="9525">
+                <a14:hiddenLine xmlns="" xmlns:a14="http://schemas.microsoft.com/office/drawing/2010/main" w="9525">
                   <a:solidFill>
                     <a:srgbClr val="000000"/>
                   </a:solidFill>
@@ -3718,7 +3718,7 @@
             </a:ln>
             <a:extLst>
               <a:ext uri="{91240B29-F687-4f45-9708-019B960494DF}">
-                <a14:hiddenLine xmlns:a14="http://schemas.microsoft.com/office/drawing/2010/main" xmlns="" w="9525">
+                <a14:hiddenLine xmlns="" xmlns:a14="http://schemas.microsoft.com/office/drawing/2010/main" w="9525">
                   <a:solidFill>
                     <a:srgbClr val="000000"/>
                   </a:solidFill>
@@ -3780,7 +3780,7 @@
             </a:ln>
             <a:extLst>
               <a:ext uri="{91240B29-F687-4f45-9708-019B960494DF}">
-                <a14:hiddenLine xmlns:a14="http://schemas.microsoft.com/office/drawing/2010/main" xmlns="" w="9525">
+                <a14:hiddenLine xmlns="" xmlns:a14="http://schemas.microsoft.com/office/drawing/2010/main" w="9525">
                   <a:solidFill>
                     <a:srgbClr val="000000"/>
                   </a:solidFill>
@@ -3870,7 +3870,7 @@
             </a:ln>
             <a:extLst>
               <a:ext uri="{91240B29-F687-4f45-9708-019B960494DF}">
-                <a14:hiddenLine xmlns:a14="http://schemas.microsoft.com/office/drawing/2010/main" xmlns="" w="9525">
+                <a14:hiddenLine xmlns="" xmlns:a14="http://schemas.microsoft.com/office/drawing/2010/main" w="9525">
                   <a:solidFill>
                     <a:srgbClr val="000000"/>
                   </a:solidFill>
@@ -3960,7 +3960,7 @@
             </a:ln>
             <a:extLst>
               <a:ext uri="{91240B29-F687-4f45-9708-019B960494DF}">
-                <a14:hiddenLine xmlns:a14="http://schemas.microsoft.com/office/drawing/2010/main" xmlns="" w="9525">
+                <a14:hiddenLine xmlns="" xmlns:a14="http://schemas.microsoft.com/office/drawing/2010/main" w="9525">
                   <a:solidFill>
                     <a:srgbClr val="000000"/>
                   </a:solidFill>
@@ -4025,7 +4025,7 @@
             </a:ln>
             <a:extLst>
               <a:ext uri="{91240B29-F687-4f45-9708-019B960494DF}">
-                <a14:hiddenLine xmlns:a14="http://schemas.microsoft.com/office/drawing/2010/main" xmlns="" w="9525">
+                <a14:hiddenLine xmlns="" xmlns:a14="http://schemas.microsoft.com/office/drawing/2010/main" w="9525">
                   <a:solidFill>
                     <a:srgbClr val="000000"/>
                   </a:solidFill>
@@ -4087,7 +4087,7 @@
             </a:ln>
             <a:extLst>
               <a:ext uri="{91240B29-F687-4f45-9708-019B960494DF}">
-                <a14:hiddenLine xmlns:a14="http://schemas.microsoft.com/office/drawing/2010/main" xmlns="" w="9525">
+                <a14:hiddenLine xmlns="" xmlns:a14="http://schemas.microsoft.com/office/drawing/2010/main" w="9525">
                   <a:solidFill>
                     <a:srgbClr val="000000"/>
                   </a:solidFill>
@@ -4177,7 +4177,7 @@
             </a:ln>
             <a:extLst>
               <a:ext uri="{91240B29-F687-4f45-9708-019B960494DF}">
-                <a14:hiddenLine xmlns:a14="http://schemas.microsoft.com/office/drawing/2010/main" xmlns="" w="9525">
+                <a14:hiddenLine xmlns="" xmlns:a14="http://schemas.microsoft.com/office/drawing/2010/main" w="9525">
                   <a:solidFill>
                     <a:srgbClr val="000000"/>
                   </a:solidFill>
@@ -4267,7 +4267,7 @@
             </a:ln>
             <a:extLst>
               <a:ext uri="{91240B29-F687-4f45-9708-019B960494DF}">
-                <a14:hiddenLine xmlns:a14="http://schemas.microsoft.com/office/drawing/2010/main" xmlns="" w="9525">
+                <a14:hiddenLine xmlns="" xmlns:a14="http://schemas.microsoft.com/office/drawing/2010/main" w="9525">
                   <a:solidFill>
                     <a:srgbClr val="000000"/>
                   </a:solidFill>
@@ -4329,7 +4329,7 @@
             </a:ln>
             <a:extLst>
               <a:ext uri="{91240B29-F687-4f45-9708-019B960494DF}">
-                <a14:hiddenLine xmlns:a14="http://schemas.microsoft.com/office/drawing/2010/main" xmlns="" w="9525">
+                <a14:hiddenLine xmlns="" xmlns:a14="http://schemas.microsoft.com/office/drawing/2010/main" w="9525">
                   <a:solidFill>
                     <a:srgbClr val="000000"/>
                   </a:solidFill>
@@ -4449,7 +4449,7 @@
             </a:ln>
             <a:extLst>
               <a:ext uri="{91240B29-F687-4f45-9708-019B960494DF}">
-                <a14:hiddenLine xmlns:a14="http://schemas.microsoft.com/office/drawing/2010/main" xmlns="" w="9525">
+                <a14:hiddenLine xmlns="" xmlns:a14="http://schemas.microsoft.com/office/drawing/2010/main" w="9525">
                   <a:solidFill>
                     <a:srgbClr val="000000"/>
                   </a:solidFill>
@@ -4517,7 +4517,7 @@
             </a:ln>
             <a:extLst>
               <a:ext uri="{91240B29-F687-4f45-9708-019B960494DF}">
-                <a14:hiddenLine xmlns:a14="http://schemas.microsoft.com/office/drawing/2010/main" xmlns="" w="9525">
+                <a14:hiddenLine xmlns="" xmlns:a14="http://schemas.microsoft.com/office/drawing/2010/main" w="9525">
                   <a:solidFill>
                     <a:srgbClr val="000000"/>
                   </a:solidFill>
@@ -4607,7 +4607,7 @@
             </a:ln>
             <a:extLst>
               <a:ext uri="{91240B29-F687-4f45-9708-019B960494DF}">
-                <a14:hiddenLine xmlns:a14="http://schemas.microsoft.com/office/drawing/2010/main" xmlns="" w="9525">
+                <a14:hiddenLine xmlns="" xmlns:a14="http://schemas.microsoft.com/office/drawing/2010/main" w="9525">
                   <a:solidFill>
                     <a:srgbClr val="000000"/>
                   </a:solidFill>
@@ -9412,7 +9412,7 @@
           <a:noFill/>
           <a:extLst>
             <a:ext uri="{909E8E84-426E-40dd-AFC4-6F175D3DCCD1}">
-              <a14:hiddenFill xmlns:a14="http://schemas.microsoft.com/office/drawing/2010/main" xmlns="">
+              <a14:hiddenFill xmlns="" xmlns:a14="http://schemas.microsoft.com/office/drawing/2010/main">
                 <a:solidFill>
                   <a:srgbClr val="FFFFFF"/>
                 </a:solidFill>
@@ -9486,7 +9486,7 @@
               </a:ln>
               <a:extLst>
                 <a:ext uri="{91240B29-F687-4f45-9708-019B960494DF}">
-                  <a14:hiddenLine xmlns:a14="http://schemas.microsoft.com/office/drawing/2010/main" xmlns="" w="9525">
+                  <a14:hiddenLine xmlns="" xmlns:a14="http://schemas.microsoft.com/office/drawing/2010/main" w="9525">
                     <a:solidFill>
                       <a:srgbClr val="000000"/>
                     </a:solidFill>
@@ -9576,7 +9576,7 @@
               </a:ln>
               <a:extLst>
                 <a:ext uri="{91240B29-F687-4f45-9708-019B960494DF}">
-                  <a14:hiddenLine xmlns:a14="http://schemas.microsoft.com/office/drawing/2010/main" xmlns="" w="9525">
+                  <a14:hiddenLine xmlns="" xmlns:a14="http://schemas.microsoft.com/office/drawing/2010/main" w="9525">
                     <a:solidFill>
                       <a:srgbClr val="000000"/>
                     </a:solidFill>
@@ -9666,7 +9666,7 @@
               </a:ln>
               <a:extLst>
                 <a:ext uri="{91240B29-F687-4f45-9708-019B960494DF}">
-                  <a14:hiddenLine xmlns:a14="http://schemas.microsoft.com/office/drawing/2010/main" xmlns="" w="9525">
+                  <a14:hiddenLine xmlns="" xmlns:a14="http://schemas.microsoft.com/office/drawing/2010/main" w="9525">
                     <a:solidFill>
                       <a:srgbClr val="000000"/>
                     </a:solidFill>
@@ -9728,7 +9728,7 @@
               </a:ln>
               <a:extLst>
                 <a:ext uri="{91240B29-F687-4f45-9708-019B960494DF}">
-                  <a14:hiddenLine xmlns:a14="http://schemas.microsoft.com/office/drawing/2010/main" xmlns="" w="9525">
+                  <a14:hiddenLine xmlns="" xmlns:a14="http://schemas.microsoft.com/office/drawing/2010/main" w="9525">
                     <a:solidFill>
                       <a:srgbClr val="000000"/>
                     </a:solidFill>
@@ -9818,7 +9818,7 @@
               </a:ln>
               <a:extLst>
                 <a:ext uri="{91240B29-F687-4f45-9708-019B960494DF}">
-                  <a14:hiddenLine xmlns:a14="http://schemas.microsoft.com/office/drawing/2010/main" xmlns="" w="9525">
+                  <a14:hiddenLine xmlns="" xmlns:a14="http://schemas.microsoft.com/office/drawing/2010/main" w="9525">
                     <a:solidFill>
                       <a:srgbClr val="000000"/>
                     </a:solidFill>
@@ -9880,7 +9880,7 @@
               </a:ln>
               <a:extLst>
                 <a:ext uri="{91240B29-F687-4f45-9708-019B960494DF}">
-                  <a14:hiddenLine xmlns:a14="http://schemas.microsoft.com/office/drawing/2010/main" xmlns="" w="9525">
+                  <a14:hiddenLine xmlns="" xmlns:a14="http://schemas.microsoft.com/office/drawing/2010/main" w="9525">
                     <a:solidFill>
                       <a:srgbClr val="000000"/>
                     </a:solidFill>
@@ -9942,7 +9942,7 @@
               </a:ln>
               <a:extLst>
                 <a:ext uri="{91240B29-F687-4f45-9708-019B960494DF}">
-                  <a14:hiddenLine xmlns:a14="http://schemas.microsoft.com/office/drawing/2010/main" xmlns="" w="9525">
+                  <a14:hiddenLine xmlns="" xmlns:a14="http://schemas.microsoft.com/office/drawing/2010/main" w="9525">
                     <a:solidFill>
                       <a:srgbClr val="000000"/>
                     </a:solidFill>
@@ -10032,7 +10032,7 @@
               </a:ln>
               <a:extLst>
                 <a:ext uri="{91240B29-F687-4f45-9708-019B960494DF}">
-                  <a14:hiddenLine xmlns:a14="http://schemas.microsoft.com/office/drawing/2010/main" xmlns="" w="9525">
+                  <a14:hiddenLine xmlns="" xmlns:a14="http://schemas.microsoft.com/office/drawing/2010/main" w="9525">
                     <a:solidFill>
                       <a:srgbClr val="000000"/>
                     </a:solidFill>
@@ -10122,7 +10122,7 @@
               </a:ln>
               <a:extLst>
                 <a:ext uri="{91240B29-F687-4f45-9708-019B960494DF}">
-                  <a14:hiddenLine xmlns:a14="http://schemas.microsoft.com/office/drawing/2010/main" xmlns="" w="9525">
+                  <a14:hiddenLine xmlns="" xmlns:a14="http://schemas.microsoft.com/office/drawing/2010/main" w="9525">
                     <a:solidFill>
                       <a:srgbClr val="000000"/>
                     </a:solidFill>
@@ -10184,7 +10184,7 @@
               </a:ln>
               <a:extLst>
                 <a:ext uri="{91240B29-F687-4f45-9708-019B960494DF}">
-                  <a14:hiddenLine xmlns:a14="http://schemas.microsoft.com/office/drawing/2010/main" xmlns="" w="9525">
+                  <a14:hiddenLine xmlns="" xmlns:a14="http://schemas.microsoft.com/office/drawing/2010/main" w="9525">
                     <a:solidFill>
                       <a:srgbClr val="000000"/>
                     </a:solidFill>
@@ -10294,7 +10294,7 @@
               </a:ln>
               <a:extLst>
                 <a:ext uri="{91240B29-F687-4f45-9708-019B960494DF}">
-                  <a14:hiddenLine xmlns:a14="http://schemas.microsoft.com/office/drawing/2010/main" xmlns="" w="9525">
+                  <a14:hiddenLine xmlns="" xmlns:a14="http://schemas.microsoft.com/office/drawing/2010/main" w="9525">
                     <a:solidFill>
                       <a:srgbClr val="000000"/>
                     </a:solidFill>
@@ -10378,7 +10378,7 @@
               </a:ln>
               <a:extLst>
                 <a:ext uri="{91240B29-F687-4f45-9708-019B960494DF}">
-                  <a14:hiddenLine xmlns:a14="http://schemas.microsoft.com/office/drawing/2010/main" xmlns="" w="9525">
+                  <a14:hiddenLine xmlns="" xmlns:a14="http://schemas.microsoft.com/office/drawing/2010/main" w="9525">
                     <a:solidFill>
                       <a:srgbClr val="000000"/>
                     </a:solidFill>
@@ -10440,7 +10440,7 @@
               </a:ln>
               <a:extLst>
                 <a:ext uri="{91240B29-F687-4f45-9708-019B960494DF}">
-                  <a14:hiddenLine xmlns:a14="http://schemas.microsoft.com/office/drawing/2010/main" xmlns="" w="9525">
+                  <a14:hiddenLine xmlns="" xmlns:a14="http://schemas.microsoft.com/office/drawing/2010/main" w="9525">
                     <a:solidFill>
                       <a:srgbClr val="000000"/>
                     </a:solidFill>
@@ -10502,7 +10502,7 @@
               </a:ln>
               <a:extLst>
                 <a:ext uri="{91240B29-F687-4f45-9708-019B960494DF}">
-                  <a14:hiddenLine xmlns:a14="http://schemas.microsoft.com/office/drawing/2010/main" xmlns="" w="9525">
+                  <a14:hiddenLine xmlns="" xmlns:a14="http://schemas.microsoft.com/office/drawing/2010/main" w="9525">
                     <a:solidFill>
                       <a:srgbClr val="000000"/>
                     </a:solidFill>
@@ -10592,7 +10592,7 @@
               </a:ln>
               <a:extLst>
                 <a:ext uri="{91240B29-F687-4f45-9708-019B960494DF}">
-                  <a14:hiddenLine xmlns:a14="http://schemas.microsoft.com/office/drawing/2010/main" xmlns="" w="9525">
+                  <a14:hiddenLine xmlns="" xmlns:a14="http://schemas.microsoft.com/office/drawing/2010/main" w="9525">
                     <a:solidFill>
                       <a:srgbClr val="000000"/>
                     </a:solidFill>
@@ -10626,7 +10626,7 @@
               </a:ln>
               <a:extLst>
                 <a:ext uri="{91240B29-F687-4f45-9708-019B960494DF}">
-                  <a14:hiddenLine xmlns:a14="http://schemas.microsoft.com/office/drawing/2010/main" xmlns="" w="9525">
+                  <a14:hiddenLine xmlns="" xmlns:a14="http://schemas.microsoft.com/office/drawing/2010/main" w="9525">
                     <a:solidFill>
                       <a:srgbClr val="000000"/>
                     </a:solidFill>
@@ -10691,7 +10691,7 @@
               </a:ln>
               <a:extLst>
                 <a:ext uri="{91240B29-F687-4f45-9708-019B960494DF}">
-                  <a14:hiddenLine xmlns:a14="http://schemas.microsoft.com/office/drawing/2010/main" xmlns="" w="9525">
+                  <a14:hiddenLine xmlns="" xmlns:a14="http://schemas.microsoft.com/office/drawing/2010/main" w="9525">
                     <a:solidFill>
                       <a:srgbClr val="000000"/>
                     </a:solidFill>
@@ -10781,7 +10781,7 @@
               </a:ln>
               <a:extLst>
                 <a:ext uri="{91240B29-F687-4f45-9708-019B960494DF}">
-                  <a14:hiddenLine xmlns:a14="http://schemas.microsoft.com/office/drawing/2010/main" xmlns="" w="9525">
+                  <a14:hiddenLine xmlns="" xmlns:a14="http://schemas.microsoft.com/office/drawing/2010/main" w="9525">
                     <a:solidFill>
                       <a:srgbClr val="000000"/>
                     </a:solidFill>
@@ -10843,7 +10843,7 @@
               </a:ln>
               <a:extLst>
                 <a:ext uri="{91240B29-F687-4f45-9708-019B960494DF}">
-                  <a14:hiddenLine xmlns:a14="http://schemas.microsoft.com/office/drawing/2010/main" xmlns="" w="9525">
+                  <a14:hiddenLine xmlns="" xmlns:a14="http://schemas.microsoft.com/office/drawing/2010/main" w="9525">
                     <a:solidFill>
                       <a:srgbClr val="000000"/>
                     </a:solidFill>
@@ -10933,7 +10933,7 @@
               </a:ln>
               <a:extLst>
                 <a:ext uri="{91240B29-F687-4f45-9708-019B960494DF}">
-                  <a14:hiddenLine xmlns:a14="http://schemas.microsoft.com/office/drawing/2010/main" xmlns="" w="9525">
+                  <a14:hiddenLine xmlns="" xmlns:a14="http://schemas.microsoft.com/office/drawing/2010/main" w="9525">
                     <a:solidFill>
                       <a:srgbClr val="000000"/>
                     </a:solidFill>
@@ -10998,7 +10998,7 @@
               </a:ln>
               <a:extLst>
                 <a:ext uri="{91240B29-F687-4f45-9708-019B960494DF}">
-                  <a14:hiddenLine xmlns:a14="http://schemas.microsoft.com/office/drawing/2010/main" xmlns="" w="9525">
+                  <a14:hiddenLine xmlns="" xmlns:a14="http://schemas.microsoft.com/office/drawing/2010/main" w="9525">
                     <a:solidFill>
                       <a:srgbClr val="000000"/>
                     </a:solidFill>
@@ -11060,7 +11060,7 @@
               </a:ln>
               <a:extLst>
                 <a:ext uri="{91240B29-F687-4f45-9708-019B960494DF}">
-                  <a14:hiddenLine xmlns:a14="http://schemas.microsoft.com/office/drawing/2010/main" xmlns="" w="9525">
+                  <a14:hiddenLine xmlns="" xmlns:a14="http://schemas.microsoft.com/office/drawing/2010/main" w="9525">
                     <a:solidFill>
                       <a:srgbClr val="000000"/>
                     </a:solidFill>
@@ -11150,7 +11150,7 @@
               </a:ln>
               <a:extLst>
                 <a:ext uri="{91240B29-F687-4f45-9708-019B960494DF}">
-                  <a14:hiddenLine xmlns:a14="http://schemas.microsoft.com/office/drawing/2010/main" xmlns="" w="9525">
+                  <a14:hiddenLine xmlns="" xmlns:a14="http://schemas.microsoft.com/office/drawing/2010/main" w="9525">
                     <a:solidFill>
                       <a:srgbClr val="000000"/>
                     </a:solidFill>
@@ -11240,7 +11240,7 @@
               </a:ln>
               <a:extLst>
                 <a:ext uri="{91240B29-F687-4f45-9708-019B960494DF}">
-                  <a14:hiddenLine xmlns:a14="http://schemas.microsoft.com/office/drawing/2010/main" xmlns="" w="9525">
+                  <a14:hiddenLine xmlns="" xmlns:a14="http://schemas.microsoft.com/office/drawing/2010/main" w="9525">
                     <a:solidFill>
                       <a:srgbClr val="000000"/>
                     </a:solidFill>
@@ -11305,7 +11305,7 @@
               </a:ln>
               <a:extLst>
                 <a:ext uri="{91240B29-F687-4f45-9708-019B960494DF}">
-                  <a14:hiddenLine xmlns:a14="http://schemas.microsoft.com/office/drawing/2010/main" xmlns="" w="9525">
+                  <a14:hiddenLine xmlns="" xmlns:a14="http://schemas.microsoft.com/office/drawing/2010/main" w="9525">
                     <a:solidFill>
                       <a:srgbClr val="000000"/>
                     </a:solidFill>
@@ -11425,7 +11425,7 @@
               </a:ln>
               <a:extLst>
                 <a:ext uri="{91240B29-F687-4f45-9708-019B960494DF}">
-                  <a14:hiddenLine xmlns:a14="http://schemas.microsoft.com/office/drawing/2010/main" xmlns="" w="9525">
+                  <a14:hiddenLine xmlns="" xmlns:a14="http://schemas.microsoft.com/office/drawing/2010/main" w="9525">
                     <a:solidFill>
                       <a:srgbClr val="000000"/>
                     </a:solidFill>
@@ -11523,7 +11523,7 @@
               </a:ln>
               <a:extLst>
                 <a:ext uri="{91240B29-F687-4f45-9708-019B960494DF}">
-                  <a14:hiddenLine xmlns:a14="http://schemas.microsoft.com/office/drawing/2010/main" xmlns="" w="9525">
+                  <a14:hiddenLine xmlns="" xmlns:a14="http://schemas.microsoft.com/office/drawing/2010/main" w="9525">
                     <a:solidFill>
                       <a:srgbClr val="000000"/>
                     </a:solidFill>
@@ -11638,7 +11638,7 @@
               </a:ln>
               <a:extLst>
                 <a:ext uri="{91240B29-F687-4f45-9708-019B960494DF}">
-                  <a14:hiddenLine xmlns:a14="http://schemas.microsoft.com/office/drawing/2010/main" xmlns="" w="9525">
+                  <a14:hiddenLine xmlns="" xmlns:a14="http://schemas.microsoft.com/office/drawing/2010/main" w="9525">
                     <a:solidFill>
                       <a:srgbClr val="000000"/>
                     </a:solidFill>
@@ -11728,7 +11728,7 @@
               </a:ln>
               <a:extLst>
                 <a:ext uri="{91240B29-F687-4f45-9708-019B960494DF}">
-                  <a14:hiddenLine xmlns:a14="http://schemas.microsoft.com/office/drawing/2010/main" xmlns="" w="9525">
+                  <a14:hiddenLine xmlns="" xmlns:a14="http://schemas.microsoft.com/office/drawing/2010/main" w="9525">
                     <a:solidFill>
                       <a:srgbClr val="000000"/>
                     </a:solidFill>
@@ -11793,7 +11793,7 @@
               </a:ln>
               <a:extLst>
                 <a:ext uri="{91240B29-F687-4f45-9708-019B960494DF}">
-                  <a14:hiddenLine xmlns:a14="http://schemas.microsoft.com/office/drawing/2010/main" xmlns="" w="9525">
+                  <a14:hiddenLine xmlns="" xmlns:a14="http://schemas.microsoft.com/office/drawing/2010/main" w="9525">
                     <a:solidFill>
                       <a:srgbClr val="000000"/>
                     </a:solidFill>
@@ -11883,7 +11883,7 @@
               </a:ln>
               <a:extLst>
                 <a:ext uri="{91240B29-F687-4f45-9708-019B960494DF}">
-                  <a14:hiddenLine xmlns:a14="http://schemas.microsoft.com/office/drawing/2010/main" xmlns="" w="9525">
+                  <a14:hiddenLine xmlns="" xmlns:a14="http://schemas.microsoft.com/office/drawing/2010/main" w="9525">
                     <a:solidFill>
                       <a:srgbClr val="000000"/>
                     </a:solidFill>
@@ -11951,7 +11951,7 @@
               </a:ln>
               <a:extLst>
                 <a:ext uri="{91240B29-F687-4f45-9708-019B960494DF}">
-                  <a14:hiddenLine xmlns:a14="http://schemas.microsoft.com/office/drawing/2010/main" xmlns="" w="9525">
+                  <a14:hiddenLine xmlns="" xmlns:a14="http://schemas.microsoft.com/office/drawing/2010/main" w="9525">
                     <a:solidFill>
                       <a:srgbClr val="000000"/>
                     </a:solidFill>
@@ -12041,7 +12041,7 @@
               </a:ln>
               <a:extLst>
                 <a:ext uri="{91240B29-F687-4f45-9708-019B960494DF}">
-                  <a14:hiddenLine xmlns:a14="http://schemas.microsoft.com/office/drawing/2010/main" xmlns="" w="9525">
+                  <a14:hiddenLine xmlns="" xmlns:a14="http://schemas.microsoft.com/office/drawing/2010/main" w="9525">
                     <a:solidFill>
                       <a:srgbClr val="000000"/>
                     </a:solidFill>
@@ -12109,7 +12109,7 @@
               </a:ln>
               <a:extLst>
                 <a:ext uri="{91240B29-F687-4f45-9708-019B960494DF}">
-                  <a14:hiddenLine xmlns:a14="http://schemas.microsoft.com/office/drawing/2010/main" xmlns="" w="9525">
+                  <a14:hiddenLine xmlns="" xmlns:a14="http://schemas.microsoft.com/office/drawing/2010/main" w="9525">
                     <a:solidFill>
                       <a:srgbClr val="000000"/>
                     </a:solidFill>
@@ -12199,7 +12199,7 @@
               </a:ln>
               <a:extLst>
                 <a:ext uri="{91240B29-F687-4f45-9708-019B960494DF}">
-                  <a14:hiddenLine xmlns:a14="http://schemas.microsoft.com/office/drawing/2010/main" xmlns="" w="9525">
+                  <a14:hiddenLine xmlns="" xmlns:a14="http://schemas.microsoft.com/office/drawing/2010/main" w="9525">
                     <a:solidFill>
                       <a:srgbClr val="000000"/>
                     </a:solidFill>
@@ -12233,7 +12233,7 @@
               </a:ln>
               <a:extLst>
                 <a:ext uri="{91240B29-F687-4f45-9708-019B960494DF}">
-                  <a14:hiddenLine xmlns:a14="http://schemas.microsoft.com/office/drawing/2010/main" xmlns="" w="9525">
+                  <a14:hiddenLine xmlns="" xmlns:a14="http://schemas.microsoft.com/office/drawing/2010/main" w="9525">
                     <a:solidFill>
                       <a:srgbClr val="000000"/>
                     </a:solidFill>
@@ -13944,6 +13944,16 @@
         <p:txBody>
           <a:bodyPr/>
           <a:lstStyle/>
+          <a:p>
+            <a:r>
+              <a:rPr lang="en-US" dirty="0">
+                <a:solidFill>
+                  <a:schemeClr val="bg1"/>
+                </a:solidFill>
+              </a:rPr>
+              <a:t>SEC Cybersecurity rules go into effect December 2023</a:t>
+            </a:r>
+          </a:p>
           <a:p>
             <a:r>
               <a:rPr lang="en-US" dirty="0">

</xml_diff>

<commit_message>
SEC Rules SAG-CTR Evidence Locker Overview
</commit_message>
<xml_diff>
--- a/2023-0801-SAG-CTR-TP-EVIDENCE-OVERVIEW.pptx
+++ b/2023-0801-SAG-CTR-TP-EVIDENCE-OVERVIEW.pptx
@@ -204,7 +204,7 @@
           <a:p>
             <a:fld id="{9C099003-50DA-4517-9507-116940F6B88D}" type="datetimeFigureOut">
               <a:rPr lang="en-US" smtClean="0"/>
-              <a:t>8/4/2023</a:t>
+              <a:t>8/6/2023</a:t>
             </a:fld>
             <a:endParaRPr lang="en-US"/>
           </a:p>
@@ -521,7 +521,7 @@
           <a:noFill/>
           <a:extLst>
             <a:ext uri="{909E8E84-426E-40dd-AFC4-6F175D3DCCD1}">
-              <a14:hiddenFill xmlns="" xmlns:a14="http://schemas.microsoft.com/office/drawing/2010/main">
+              <a14:hiddenFill xmlns:a14="http://schemas.microsoft.com/office/drawing/2010/main" xmlns="">
                 <a:solidFill>
                   <a:srgbClr val="FFFFFF"/>
                 </a:solidFill>
@@ -581,7 +581,7 @@
             </a:ln>
             <a:extLst>
               <a:ext uri="{91240B29-F687-4f45-9708-019B960494DF}">
-                <a14:hiddenLine xmlns="" xmlns:a14="http://schemas.microsoft.com/office/drawing/2010/main" w="9525">
+                <a14:hiddenLine xmlns:a14="http://schemas.microsoft.com/office/drawing/2010/main" xmlns="" w="9525">
                   <a:solidFill>
                     <a:srgbClr val="000000"/>
                   </a:solidFill>
@@ -671,7 +671,7 @@
             </a:ln>
             <a:extLst>
               <a:ext uri="{91240B29-F687-4f45-9708-019B960494DF}">
-                <a14:hiddenLine xmlns="" xmlns:a14="http://schemas.microsoft.com/office/drawing/2010/main" w="9525">
+                <a14:hiddenLine xmlns:a14="http://schemas.microsoft.com/office/drawing/2010/main" xmlns="" w="9525">
                   <a:solidFill>
                     <a:srgbClr val="000000"/>
                   </a:solidFill>
@@ -761,7 +761,7 @@
             </a:ln>
             <a:extLst>
               <a:ext uri="{91240B29-F687-4f45-9708-019B960494DF}">
-                <a14:hiddenLine xmlns="" xmlns:a14="http://schemas.microsoft.com/office/drawing/2010/main" w="9525">
+                <a14:hiddenLine xmlns:a14="http://schemas.microsoft.com/office/drawing/2010/main" xmlns="" w="9525">
                   <a:solidFill>
                     <a:srgbClr val="000000"/>
                   </a:solidFill>
@@ -795,7 +795,7 @@
             </a:ln>
             <a:extLst>
               <a:ext uri="{91240B29-F687-4f45-9708-019B960494DF}">
-                <a14:hiddenLine xmlns="" xmlns:a14="http://schemas.microsoft.com/office/drawing/2010/main" w="9525">
+                <a14:hiddenLine xmlns:a14="http://schemas.microsoft.com/office/drawing/2010/main" xmlns="" w="9525">
                   <a:solidFill>
                     <a:srgbClr val="000000"/>
                   </a:solidFill>
@@ -885,7 +885,7 @@
             </a:ln>
             <a:extLst>
               <a:ext uri="{91240B29-F687-4f45-9708-019B960494DF}">
-                <a14:hiddenLine xmlns="" xmlns:a14="http://schemas.microsoft.com/office/drawing/2010/main" w="9525">
+                <a14:hiddenLine xmlns:a14="http://schemas.microsoft.com/office/drawing/2010/main" xmlns="" w="9525">
                   <a:solidFill>
                     <a:srgbClr val="000000"/>
                   </a:solidFill>
@@ -947,7 +947,7 @@
             </a:ln>
             <a:extLst>
               <a:ext uri="{91240B29-F687-4f45-9708-019B960494DF}">
-                <a14:hiddenLine xmlns="" xmlns:a14="http://schemas.microsoft.com/office/drawing/2010/main" w="9525">
+                <a14:hiddenLine xmlns:a14="http://schemas.microsoft.com/office/drawing/2010/main" xmlns="" w="9525">
                   <a:solidFill>
                     <a:srgbClr val="000000"/>
                   </a:solidFill>
@@ -1009,7 +1009,7 @@
             </a:ln>
             <a:extLst>
               <a:ext uri="{91240B29-F687-4f45-9708-019B960494DF}">
-                <a14:hiddenLine xmlns="" xmlns:a14="http://schemas.microsoft.com/office/drawing/2010/main" w="9525">
+                <a14:hiddenLine xmlns:a14="http://schemas.microsoft.com/office/drawing/2010/main" xmlns="" w="9525">
                   <a:solidFill>
                     <a:srgbClr val="000000"/>
                   </a:solidFill>
@@ -1099,7 +1099,7 @@
             </a:ln>
             <a:extLst>
               <a:ext uri="{91240B29-F687-4f45-9708-019B960494DF}">
-                <a14:hiddenLine xmlns="" xmlns:a14="http://schemas.microsoft.com/office/drawing/2010/main" w="9525">
+                <a14:hiddenLine xmlns:a14="http://schemas.microsoft.com/office/drawing/2010/main" xmlns="" w="9525">
                   <a:solidFill>
                     <a:srgbClr val="000000"/>
                   </a:solidFill>
@@ -1161,7 +1161,7 @@
             </a:ln>
             <a:extLst>
               <a:ext uri="{91240B29-F687-4f45-9708-019B960494DF}">
-                <a14:hiddenLine xmlns="" xmlns:a14="http://schemas.microsoft.com/office/drawing/2010/main" w="9525">
+                <a14:hiddenLine xmlns:a14="http://schemas.microsoft.com/office/drawing/2010/main" xmlns="" w="9525">
                   <a:solidFill>
                     <a:srgbClr val="000000"/>
                   </a:solidFill>
@@ -1223,7 +1223,7 @@
             </a:ln>
             <a:extLst>
               <a:ext uri="{91240B29-F687-4f45-9708-019B960494DF}">
-                <a14:hiddenLine xmlns="" xmlns:a14="http://schemas.microsoft.com/office/drawing/2010/main" w="9525">
+                <a14:hiddenLine xmlns:a14="http://schemas.microsoft.com/office/drawing/2010/main" xmlns="" w="9525">
                   <a:solidFill>
                     <a:srgbClr val="000000"/>
                   </a:solidFill>
@@ -1313,7 +1313,7 @@
             </a:ln>
             <a:extLst>
               <a:ext uri="{91240B29-F687-4f45-9708-019B960494DF}">
-                <a14:hiddenLine xmlns="" xmlns:a14="http://schemas.microsoft.com/office/drawing/2010/main" w="9525">
+                <a14:hiddenLine xmlns:a14="http://schemas.microsoft.com/office/drawing/2010/main" xmlns="" w="9525">
                   <a:solidFill>
                     <a:srgbClr val="000000"/>
                   </a:solidFill>
@@ -1403,7 +1403,7 @@
             </a:ln>
             <a:extLst>
               <a:ext uri="{91240B29-F687-4f45-9708-019B960494DF}">
-                <a14:hiddenLine xmlns="" xmlns:a14="http://schemas.microsoft.com/office/drawing/2010/main" w="9525">
+                <a14:hiddenLine xmlns:a14="http://schemas.microsoft.com/office/drawing/2010/main" xmlns="" w="9525">
                   <a:solidFill>
                     <a:srgbClr val="000000"/>
                   </a:solidFill>
@@ -1465,7 +1465,7 @@
             </a:ln>
             <a:extLst>
               <a:ext uri="{91240B29-F687-4f45-9708-019B960494DF}">
-                <a14:hiddenLine xmlns="" xmlns:a14="http://schemas.microsoft.com/office/drawing/2010/main" w="9525">
+                <a14:hiddenLine xmlns:a14="http://schemas.microsoft.com/office/drawing/2010/main" xmlns="" w="9525">
                   <a:solidFill>
                     <a:srgbClr val="000000"/>
                   </a:solidFill>
@@ -1575,7 +1575,7 @@
             </a:ln>
             <a:extLst>
               <a:ext uri="{91240B29-F687-4f45-9708-019B960494DF}">
-                <a14:hiddenLine xmlns="" xmlns:a14="http://schemas.microsoft.com/office/drawing/2010/main" w="9525">
+                <a14:hiddenLine xmlns:a14="http://schemas.microsoft.com/office/drawing/2010/main" xmlns="" w="9525">
                   <a:solidFill>
                     <a:srgbClr val="000000"/>
                   </a:solidFill>
@@ -1637,7 +1637,7 @@
             </a:ln>
             <a:extLst>
               <a:ext uri="{91240B29-F687-4f45-9708-019B960494DF}">
-                <a14:hiddenLine xmlns="" xmlns:a14="http://schemas.microsoft.com/office/drawing/2010/main" w="9525">
+                <a14:hiddenLine xmlns:a14="http://schemas.microsoft.com/office/drawing/2010/main" xmlns="" w="9525">
                   <a:solidFill>
                     <a:srgbClr val="000000"/>
                   </a:solidFill>
@@ -1727,7 +1727,7 @@
             </a:ln>
             <a:extLst>
               <a:ext uri="{91240B29-F687-4f45-9708-019B960494DF}">
-                <a14:hiddenLine xmlns="" xmlns:a14="http://schemas.microsoft.com/office/drawing/2010/main" w="9525">
+                <a14:hiddenLine xmlns:a14="http://schemas.microsoft.com/office/drawing/2010/main" xmlns="" w="9525">
                   <a:solidFill>
                     <a:srgbClr val="000000"/>
                   </a:solidFill>
@@ -1817,7 +1817,7 @@
             </a:ln>
             <a:extLst>
               <a:ext uri="{91240B29-F687-4f45-9708-019B960494DF}">
-                <a14:hiddenLine xmlns="" xmlns:a14="http://schemas.microsoft.com/office/drawing/2010/main" w="9525">
+                <a14:hiddenLine xmlns:a14="http://schemas.microsoft.com/office/drawing/2010/main" xmlns="" w="9525">
                   <a:solidFill>
                     <a:srgbClr val="000000"/>
                   </a:solidFill>
@@ -1879,7 +1879,7 @@
             </a:ln>
             <a:extLst>
               <a:ext uri="{91240B29-F687-4f45-9708-019B960494DF}">
-                <a14:hiddenLine xmlns="" xmlns:a14="http://schemas.microsoft.com/office/drawing/2010/main" w="9525">
+                <a14:hiddenLine xmlns:a14="http://schemas.microsoft.com/office/drawing/2010/main" xmlns="" w="9525">
                   <a:solidFill>
                     <a:srgbClr val="000000"/>
                   </a:solidFill>
@@ -1969,7 +1969,7 @@
             </a:ln>
             <a:extLst>
               <a:ext uri="{91240B29-F687-4f45-9708-019B960494DF}">
-                <a14:hiddenLine xmlns="" xmlns:a14="http://schemas.microsoft.com/office/drawing/2010/main" w="9525">
+                <a14:hiddenLine xmlns:a14="http://schemas.microsoft.com/office/drawing/2010/main" xmlns="" w="9525">
                   <a:solidFill>
                     <a:srgbClr val="000000"/>
                   </a:solidFill>
@@ -2059,7 +2059,7 @@
             </a:ln>
             <a:extLst>
               <a:ext uri="{91240B29-F687-4f45-9708-019B960494DF}">
-                <a14:hiddenLine xmlns="" xmlns:a14="http://schemas.microsoft.com/office/drawing/2010/main" w="9525">
+                <a14:hiddenLine xmlns:a14="http://schemas.microsoft.com/office/drawing/2010/main" xmlns="" w="9525">
                   <a:solidFill>
                     <a:srgbClr val="000000"/>
                   </a:solidFill>
@@ -2115,7 +2115,7 @@
             </a:ln>
             <a:extLst>
               <a:ext uri="{91240B29-F687-4f45-9708-019B960494DF}">
-                <a14:hiddenLine xmlns="" xmlns:a14="http://schemas.microsoft.com/office/drawing/2010/main" w="9525">
+                <a14:hiddenLine xmlns:a14="http://schemas.microsoft.com/office/drawing/2010/main" xmlns="" w="9525">
                   <a:solidFill>
                     <a:srgbClr val="000000"/>
                   </a:solidFill>
@@ -2205,7 +2205,7 @@
             </a:ln>
             <a:extLst>
               <a:ext uri="{91240B29-F687-4f45-9708-019B960494DF}">
-                <a14:hiddenLine xmlns="" xmlns:a14="http://schemas.microsoft.com/office/drawing/2010/main" w="9525">
+                <a14:hiddenLine xmlns:a14="http://schemas.microsoft.com/office/drawing/2010/main" xmlns="" w="9525">
                   <a:solidFill>
                     <a:srgbClr val="000000"/>
                   </a:solidFill>
@@ -2261,7 +2261,7 @@
             </a:ln>
             <a:extLst>
               <a:ext uri="{91240B29-F687-4f45-9708-019B960494DF}">
-                <a14:hiddenLine xmlns="" xmlns:a14="http://schemas.microsoft.com/office/drawing/2010/main" w="9525">
+                <a14:hiddenLine xmlns:a14="http://schemas.microsoft.com/office/drawing/2010/main" xmlns="" w="9525">
                   <a:solidFill>
                     <a:srgbClr val="000000"/>
                   </a:solidFill>
@@ -2351,7 +2351,7 @@
             </a:ln>
             <a:extLst>
               <a:ext uri="{91240B29-F687-4f45-9708-019B960494DF}">
-                <a14:hiddenLine xmlns="" xmlns:a14="http://schemas.microsoft.com/office/drawing/2010/main" w="9525">
+                <a14:hiddenLine xmlns:a14="http://schemas.microsoft.com/office/drawing/2010/main" xmlns="" w="9525">
                   <a:solidFill>
                     <a:srgbClr val="000000"/>
                   </a:solidFill>
@@ -2419,7 +2419,7 @@
             </a:ln>
             <a:extLst>
               <a:ext uri="{91240B29-F687-4f45-9708-019B960494DF}">
-                <a14:hiddenLine xmlns="" xmlns:a14="http://schemas.microsoft.com/office/drawing/2010/main" w="9525">
+                <a14:hiddenLine xmlns:a14="http://schemas.microsoft.com/office/drawing/2010/main" xmlns="" w="9525">
                   <a:solidFill>
                     <a:srgbClr val="000000"/>
                   </a:solidFill>
@@ -2509,7 +2509,7 @@
             </a:ln>
             <a:extLst>
               <a:ext uri="{91240B29-F687-4f45-9708-019B960494DF}">
-                <a14:hiddenLine xmlns="" xmlns:a14="http://schemas.microsoft.com/office/drawing/2010/main" w="9525">
+                <a14:hiddenLine xmlns:a14="http://schemas.microsoft.com/office/drawing/2010/main" xmlns="" w="9525">
                   <a:solidFill>
                     <a:srgbClr val="000000"/>
                   </a:solidFill>
@@ -2577,7 +2577,7 @@
             </a:ln>
             <a:extLst>
               <a:ext uri="{91240B29-F687-4f45-9708-019B960494DF}">
-                <a14:hiddenLine xmlns="" xmlns:a14="http://schemas.microsoft.com/office/drawing/2010/main" w="9525">
+                <a14:hiddenLine xmlns:a14="http://schemas.microsoft.com/office/drawing/2010/main" xmlns="" w="9525">
                   <a:solidFill>
                     <a:srgbClr val="000000"/>
                   </a:solidFill>
@@ -2667,7 +2667,7 @@
             </a:ln>
             <a:extLst>
               <a:ext uri="{91240B29-F687-4f45-9708-019B960494DF}">
-                <a14:hiddenLine xmlns="" xmlns:a14="http://schemas.microsoft.com/office/drawing/2010/main" w="9525">
+                <a14:hiddenLine xmlns:a14="http://schemas.microsoft.com/office/drawing/2010/main" xmlns="" w="9525">
                   <a:solidFill>
                     <a:srgbClr val="000000"/>
                   </a:solidFill>
@@ -2701,7 +2701,7 @@
             </a:ln>
             <a:extLst>
               <a:ext uri="{91240B29-F687-4f45-9708-019B960494DF}">
-                <a14:hiddenLine xmlns="" xmlns:a14="http://schemas.microsoft.com/office/drawing/2010/main" w="9525">
+                <a14:hiddenLine xmlns:a14="http://schemas.microsoft.com/office/drawing/2010/main" xmlns="" w="9525">
                   <a:solidFill>
                     <a:srgbClr val="000000"/>
                   </a:solidFill>
@@ -2791,7 +2791,7 @@
             </a:ln>
             <a:extLst>
               <a:ext uri="{91240B29-F687-4f45-9708-019B960494DF}">
-                <a14:hiddenLine xmlns="" xmlns:a14="http://schemas.microsoft.com/office/drawing/2010/main" w="9525">
+                <a14:hiddenLine xmlns:a14="http://schemas.microsoft.com/office/drawing/2010/main" xmlns="" w="9525">
                   <a:solidFill>
                     <a:srgbClr val="000000"/>
                   </a:solidFill>
@@ -2853,7 +2853,7 @@
             </a:ln>
             <a:extLst>
               <a:ext uri="{91240B29-F687-4f45-9708-019B960494DF}">
-                <a14:hiddenLine xmlns="" xmlns:a14="http://schemas.microsoft.com/office/drawing/2010/main" w="9525">
+                <a14:hiddenLine xmlns:a14="http://schemas.microsoft.com/office/drawing/2010/main" xmlns="" w="9525">
                   <a:solidFill>
                     <a:srgbClr val="000000"/>
                   </a:solidFill>
@@ -2915,7 +2915,7 @@
             </a:ln>
             <a:extLst>
               <a:ext uri="{91240B29-F687-4f45-9708-019B960494DF}">
-                <a14:hiddenLine xmlns="" xmlns:a14="http://schemas.microsoft.com/office/drawing/2010/main" w="9525">
+                <a14:hiddenLine xmlns:a14="http://schemas.microsoft.com/office/drawing/2010/main" xmlns="" w="9525">
                   <a:solidFill>
                     <a:srgbClr val="000000"/>
                   </a:solidFill>
@@ -3005,7 +3005,7 @@
             </a:ln>
             <a:extLst>
               <a:ext uri="{91240B29-F687-4f45-9708-019B960494DF}">
-                <a14:hiddenLine xmlns="" xmlns:a14="http://schemas.microsoft.com/office/drawing/2010/main" w="9525">
+                <a14:hiddenLine xmlns:a14="http://schemas.microsoft.com/office/drawing/2010/main" xmlns="" w="9525">
                   <a:solidFill>
                     <a:srgbClr val="000000"/>
                   </a:solidFill>
@@ -3073,7 +3073,7 @@
             </a:ln>
             <a:extLst>
               <a:ext uri="{91240B29-F687-4f45-9708-019B960494DF}">
-                <a14:hiddenLine xmlns="" xmlns:a14="http://schemas.microsoft.com/office/drawing/2010/main" w="9525">
+                <a14:hiddenLine xmlns:a14="http://schemas.microsoft.com/office/drawing/2010/main" xmlns="" w="9525">
                   <a:solidFill>
                     <a:srgbClr val="000000"/>
                   </a:solidFill>
@@ -3135,7 +3135,7 @@
             </a:ln>
             <a:extLst>
               <a:ext uri="{91240B29-F687-4f45-9708-019B960494DF}">
-                <a14:hiddenLine xmlns="" xmlns:a14="http://schemas.microsoft.com/office/drawing/2010/main" w="9525">
+                <a14:hiddenLine xmlns:a14="http://schemas.microsoft.com/office/drawing/2010/main" xmlns="" w="9525">
                   <a:solidFill>
                     <a:srgbClr val="000000"/>
                   </a:solidFill>
@@ -3225,7 +3225,7 @@
             </a:ln>
             <a:extLst>
               <a:ext uri="{91240B29-F687-4f45-9708-019B960494DF}">
-                <a14:hiddenLine xmlns="" xmlns:a14="http://schemas.microsoft.com/office/drawing/2010/main" w="9525">
+                <a14:hiddenLine xmlns:a14="http://schemas.microsoft.com/office/drawing/2010/main" xmlns="" w="9525">
                   <a:solidFill>
                     <a:srgbClr val="000000"/>
                   </a:solidFill>
@@ -3287,7 +3287,7 @@
             </a:ln>
             <a:extLst>
               <a:ext uri="{91240B29-F687-4f45-9708-019B960494DF}">
-                <a14:hiddenLine xmlns="" xmlns:a14="http://schemas.microsoft.com/office/drawing/2010/main" w="9525">
+                <a14:hiddenLine xmlns:a14="http://schemas.microsoft.com/office/drawing/2010/main" xmlns="" w="9525">
                   <a:solidFill>
                     <a:srgbClr val="000000"/>
                   </a:solidFill>
@@ -3377,7 +3377,7 @@
             </a:ln>
             <a:extLst>
               <a:ext uri="{91240B29-F687-4f45-9708-019B960494DF}">
-                <a14:hiddenLine xmlns="" xmlns:a14="http://schemas.microsoft.com/office/drawing/2010/main" w="9525">
+                <a14:hiddenLine xmlns:a14="http://schemas.microsoft.com/office/drawing/2010/main" xmlns="" w="9525">
                   <a:solidFill>
                     <a:srgbClr val="000000"/>
                   </a:solidFill>
@@ -3439,7 +3439,7 @@
             </a:ln>
             <a:extLst>
               <a:ext uri="{91240B29-F687-4f45-9708-019B960494DF}">
-                <a14:hiddenLine xmlns="" xmlns:a14="http://schemas.microsoft.com/office/drawing/2010/main" w="9525">
+                <a14:hiddenLine xmlns:a14="http://schemas.microsoft.com/office/drawing/2010/main" xmlns="" w="9525">
                   <a:solidFill>
                     <a:srgbClr val="000000"/>
                   </a:solidFill>
@@ -3529,7 +3529,7 @@
             </a:ln>
             <a:extLst>
               <a:ext uri="{91240B29-F687-4f45-9708-019B960494DF}">
-                <a14:hiddenLine xmlns="" xmlns:a14="http://schemas.microsoft.com/office/drawing/2010/main" w="9525">
+                <a14:hiddenLine xmlns:a14="http://schemas.microsoft.com/office/drawing/2010/main" xmlns="" w="9525">
                   <a:solidFill>
                     <a:srgbClr val="000000"/>
                   </a:solidFill>
@@ -3563,7 +3563,7 @@
             </a:ln>
             <a:extLst>
               <a:ext uri="{91240B29-F687-4f45-9708-019B960494DF}">
-                <a14:hiddenLine xmlns="" xmlns:a14="http://schemas.microsoft.com/office/drawing/2010/main" w="9525">
+                <a14:hiddenLine xmlns:a14="http://schemas.microsoft.com/office/drawing/2010/main" xmlns="" w="9525">
                   <a:solidFill>
                     <a:srgbClr val="000000"/>
                   </a:solidFill>
@@ -3628,7 +3628,7 @@
             </a:ln>
             <a:extLst>
               <a:ext uri="{91240B29-F687-4f45-9708-019B960494DF}">
-                <a14:hiddenLine xmlns="" xmlns:a14="http://schemas.microsoft.com/office/drawing/2010/main" w="9525">
+                <a14:hiddenLine xmlns:a14="http://schemas.microsoft.com/office/drawing/2010/main" xmlns="" w="9525">
                   <a:solidFill>
                     <a:srgbClr val="000000"/>
                   </a:solidFill>
@@ -3718,7 +3718,7 @@
             </a:ln>
             <a:extLst>
               <a:ext uri="{91240B29-F687-4f45-9708-019B960494DF}">
-                <a14:hiddenLine xmlns="" xmlns:a14="http://schemas.microsoft.com/office/drawing/2010/main" w="9525">
+                <a14:hiddenLine xmlns:a14="http://schemas.microsoft.com/office/drawing/2010/main" xmlns="" w="9525">
                   <a:solidFill>
                     <a:srgbClr val="000000"/>
                   </a:solidFill>
@@ -3780,7 +3780,7 @@
             </a:ln>
             <a:extLst>
               <a:ext uri="{91240B29-F687-4f45-9708-019B960494DF}">
-                <a14:hiddenLine xmlns="" xmlns:a14="http://schemas.microsoft.com/office/drawing/2010/main" w="9525">
+                <a14:hiddenLine xmlns:a14="http://schemas.microsoft.com/office/drawing/2010/main" xmlns="" w="9525">
                   <a:solidFill>
                     <a:srgbClr val="000000"/>
                   </a:solidFill>
@@ -3870,7 +3870,7 @@
             </a:ln>
             <a:extLst>
               <a:ext uri="{91240B29-F687-4f45-9708-019B960494DF}">
-                <a14:hiddenLine xmlns="" xmlns:a14="http://schemas.microsoft.com/office/drawing/2010/main" w="9525">
+                <a14:hiddenLine xmlns:a14="http://schemas.microsoft.com/office/drawing/2010/main" xmlns="" w="9525">
                   <a:solidFill>
                     <a:srgbClr val="000000"/>
                   </a:solidFill>
@@ -3960,7 +3960,7 @@
             </a:ln>
             <a:extLst>
               <a:ext uri="{91240B29-F687-4f45-9708-019B960494DF}">
-                <a14:hiddenLine xmlns="" xmlns:a14="http://schemas.microsoft.com/office/drawing/2010/main" w="9525">
+                <a14:hiddenLine xmlns:a14="http://schemas.microsoft.com/office/drawing/2010/main" xmlns="" w="9525">
                   <a:solidFill>
                     <a:srgbClr val="000000"/>
                   </a:solidFill>
@@ -4025,7 +4025,7 @@
             </a:ln>
             <a:extLst>
               <a:ext uri="{91240B29-F687-4f45-9708-019B960494DF}">
-                <a14:hiddenLine xmlns="" xmlns:a14="http://schemas.microsoft.com/office/drawing/2010/main" w="9525">
+                <a14:hiddenLine xmlns:a14="http://schemas.microsoft.com/office/drawing/2010/main" xmlns="" w="9525">
                   <a:solidFill>
                     <a:srgbClr val="000000"/>
                   </a:solidFill>
@@ -4087,7 +4087,7 @@
             </a:ln>
             <a:extLst>
               <a:ext uri="{91240B29-F687-4f45-9708-019B960494DF}">
-                <a14:hiddenLine xmlns="" xmlns:a14="http://schemas.microsoft.com/office/drawing/2010/main" w="9525">
+                <a14:hiddenLine xmlns:a14="http://schemas.microsoft.com/office/drawing/2010/main" xmlns="" w="9525">
                   <a:solidFill>
                     <a:srgbClr val="000000"/>
                   </a:solidFill>
@@ -4177,7 +4177,7 @@
             </a:ln>
             <a:extLst>
               <a:ext uri="{91240B29-F687-4f45-9708-019B960494DF}">
-                <a14:hiddenLine xmlns="" xmlns:a14="http://schemas.microsoft.com/office/drawing/2010/main" w="9525">
+                <a14:hiddenLine xmlns:a14="http://schemas.microsoft.com/office/drawing/2010/main" xmlns="" w="9525">
                   <a:solidFill>
                     <a:srgbClr val="000000"/>
                   </a:solidFill>
@@ -4267,7 +4267,7 @@
             </a:ln>
             <a:extLst>
               <a:ext uri="{91240B29-F687-4f45-9708-019B960494DF}">
-                <a14:hiddenLine xmlns="" xmlns:a14="http://schemas.microsoft.com/office/drawing/2010/main" w="9525">
+                <a14:hiddenLine xmlns:a14="http://schemas.microsoft.com/office/drawing/2010/main" xmlns="" w="9525">
                   <a:solidFill>
                     <a:srgbClr val="000000"/>
                   </a:solidFill>
@@ -4329,7 +4329,7 @@
             </a:ln>
             <a:extLst>
               <a:ext uri="{91240B29-F687-4f45-9708-019B960494DF}">
-                <a14:hiddenLine xmlns="" xmlns:a14="http://schemas.microsoft.com/office/drawing/2010/main" w="9525">
+                <a14:hiddenLine xmlns:a14="http://schemas.microsoft.com/office/drawing/2010/main" xmlns="" w="9525">
                   <a:solidFill>
                     <a:srgbClr val="000000"/>
                   </a:solidFill>
@@ -4449,7 +4449,7 @@
             </a:ln>
             <a:extLst>
               <a:ext uri="{91240B29-F687-4f45-9708-019B960494DF}">
-                <a14:hiddenLine xmlns="" xmlns:a14="http://schemas.microsoft.com/office/drawing/2010/main" w="9525">
+                <a14:hiddenLine xmlns:a14="http://schemas.microsoft.com/office/drawing/2010/main" xmlns="" w="9525">
                   <a:solidFill>
                     <a:srgbClr val="000000"/>
                   </a:solidFill>
@@ -4517,7 +4517,7 @@
             </a:ln>
             <a:extLst>
               <a:ext uri="{91240B29-F687-4f45-9708-019B960494DF}">
-                <a14:hiddenLine xmlns="" xmlns:a14="http://schemas.microsoft.com/office/drawing/2010/main" w="9525">
+                <a14:hiddenLine xmlns:a14="http://schemas.microsoft.com/office/drawing/2010/main" xmlns="" w="9525">
                   <a:solidFill>
                     <a:srgbClr val="000000"/>
                   </a:solidFill>
@@ -4607,7 +4607,7 @@
             </a:ln>
             <a:extLst>
               <a:ext uri="{91240B29-F687-4f45-9708-019B960494DF}">
-                <a14:hiddenLine xmlns="" xmlns:a14="http://schemas.microsoft.com/office/drawing/2010/main" w="9525">
+                <a14:hiddenLine xmlns:a14="http://schemas.microsoft.com/office/drawing/2010/main" xmlns="" w="9525">
                   <a:solidFill>
                     <a:srgbClr val="000000"/>
                   </a:solidFill>
@@ -4747,7 +4747,7 @@
           <a:p>
             <a:fld id="{56B791C0-0E59-4EFD-BC9B-AB19E867DAD6}" type="datetime1">
               <a:rPr lang="en-US" smtClean="0"/>
-              <a:t>8/4/2023</a:t>
+              <a:t>8/6/2023</a:t>
             </a:fld>
             <a:endParaRPr lang="en-US" dirty="0"/>
           </a:p>
@@ -5042,7 +5042,7 @@
           <a:p>
             <a:fld id="{621EE40A-5488-4906-AD66-F338A7711E46}" type="datetime1">
               <a:rPr lang="en-US" smtClean="0"/>
-              <a:t>8/4/2023</a:t>
+              <a:t>8/6/2023</a:t>
             </a:fld>
             <a:endParaRPr lang="en-US" dirty="0"/>
           </a:p>
@@ -5236,7 +5236,7 @@
           <a:p>
             <a:fld id="{297BCE8B-424A-44F2-9441-027CD557E042}" type="datetime1">
               <a:rPr lang="en-US" smtClean="0"/>
-              <a:t>8/4/2023</a:t>
+              <a:t>8/6/2023</a:t>
             </a:fld>
             <a:endParaRPr lang="en-US" dirty="0"/>
           </a:p>
@@ -5497,7 +5497,7 @@
           <a:p>
             <a:fld id="{F0A0DDE4-9E8C-49C7-8357-863BA22A9FB5}" type="datetime1">
               <a:rPr lang="en-US" smtClean="0"/>
-              <a:t>8/4/2023</a:t>
+              <a:t>8/6/2023</a:t>
             </a:fld>
             <a:endParaRPr lang="en-US" dirty="0"/>
           </a:p>
@@ -5929,7 +5929,7 @@
           <a:p>
             <a:fld id="{37FA7EA8-C9DF-4FE2-927A-E2090471346D}" type="datetime1">
               <a:rPr lang="en-US" smtClean="0"/>
-              <a:t>8/4/2023</a:t>
+              <a:t>8/6/2023</a:t>
             </a:fld>
             <a:endParaRPr lang="en-US" dirty="0"/>
           </a:p>
@@ -6473,7 +6473,7 @@
           <a:p>
             <a:fld id="{779E3BEB-49D8-488C-88A8-F1D0DBBAC068}" type="datetime1">
               <a:rPr lang="en-US" smtClean="0"/>
-              <a:t>8/4/2023</a:t>
+              <a:t>8/6/2023</a:t>
             </a:fld>
             <a:endParaRPr lang="en-US" dirty="0"/>
           </a:p>
@@ -7191,7 +7191,7 @@
           <a:p>
             <a:fld id="{CF2ECE7E-2E22-42A0-BC2D-246ECC07237B}" type="datetime1">
               <a:rPr lang="en-US" smtClean="0"/>
-              <a:t>8/4/2023</a:t>
+              <a:t>8/6/2023</a:t>
             </a:fld>
             <a:endParaRPr lang="en-US" dirty="0"/>
           </a:p>
@@ -7359,7 +7359,7 @@
           <a:p>
             <a:fld id="{C69C4AE5-5060-4374-B6E1-6B73D531E3EE}" type="datetime1">
               <a:rPr lang="en-US" smtClean="0"/>
-              <a:t>8/4/2023</a:t>
+              <a:t>8/6/2023</a:t>
             </a:fld>
             <a:endParaRPr lang="en-US" dirty="0"/>
           </a:p>
@@ -7537,7 +7537,7 @@
           <a:p>
             <a:fld id="{11998D02-0DEF-4198-A751-D267DB41BF0B}" type="datetime1">
               <a:rPr lang="en-US" smtClean="0"/>
-              <a:t>8/4/2023</a:t>
+              <a:t>8/6/2023</a:t>
             </a:fld>
             <a:endParaRPr lang="en-US" dirty="0"/>
           </a:p>
@@ -7705,7 +7705,7 @@
           <a:p>
             <a:fld id="{8F422B43-45D4-4608-9F03-122930498C43}" type="datetime1">
               <a:rPr lang="en-US" smtClean="0"/>
-              <a:t>8/4/2023</a:t>
+              <a:t>8/6/2023</a:t>
             </a:fld>
             <a:endParaRPr lang="en-US" dirty="0"/>
           </a:p>
@@ -7954,7 +7954,7 @@
           <a:p>
             <a:fld id="{8AF39007-0C4C-4662-9209-D5880C6C6463}" type="datetime1">
               <a:rPr lang="en-US" smtClean="0"/>
-              <a:t>8/4/2023</a:t>
+              <a:t>8/6/2023</a:t>
             </a:fld>
             <a:endParaRPr lang="en-US" dirty="0"/>
           </a:p>
@@ -8185,7 +8185,7 @@
           <a:p>
             <a:fld id="{8D6A9271-10E2-4B68-AE13-FF3919F43119}" type="datetime1">
               <a:rPr lang="en-US" smtClean="0"/>
-              <a:t>8/4/2023</a:t>
+              <a:t>8/6/2023</a:t>
             </a:fld>
             <a:endParaRPr lang="en-US" dirty="0"/>
           </a:p>
@@ -8564,7 +8564,7 @@
           <a:p>
             <a:fld id="{28F7A4B4-2D35-416A-973E-59EAAAA65DE7}" type="datetime1">
               <a:rPr lang="en-US" smtClean="0"/>
-              <a:t>8/4/2023</a:t>
+              <a:t>8/6/2023</a:t>
             </a:fld>
             <a:endParaRPr lang="en-US" dirty="0"/>
           </a:p>
@@ -8680,7 +8680,7 @@
           <a:p>
             <a:fld id="{820E87AD-A1CE-4B6A-A1E1-243C473B1B4F}" type="datetime1">
               <a:rPr lang="en-US" smtClean="0"/>
-              <a:t>8/4/2023</a:t>
+              <a:t>8/6/2023</a:t>
             </a:fld>
             <a:endParaRPr lang="en-US" dirty="0"/>
           </a:p>
@@ -8773,7 +8773,7 @@
           <a:p>
             <a:fld id="{054BD633-0EB0-465D-B200-78F1E8C4393C}" type="datetime1">
               <a:rPr lang="en-US" smtClean="0"/>
-              <a:t>8/4/2023</a:t>
+              <a:t>8/6/2023</a:t>
             </a:fld>
             <a:endParaRPr lang="en-US" dirty="0"/>
           </a:p>
@@ -9020,7 +9020,7 @@
           <a:p>
             <a:fld id="{2DF2695D-A47E-4BE9-B68F-60A28D6B816A}" type="datetime1">
               <a:rPr lang="en-US" smtClean="0"/>
-              <a:t>8/4/2023</a:t>
+              <a:t>8/6/2023</a:t>
             </a:fld>
             <a:endParaRPr lang="en-US" dirty="0"/>
           </a:p>
@@ -9298,7 +9298,7 @@
           <a:p>
             <a:fld id="{36484291-085B-4DF5-86BA-38F041301A2A}" type="datetime1">
               <a:rPr lang="en-US" smtClean="0"/>
-              <a:t>8/4/2023</a:t>
+              <a:t>8/6/2023</a:t>
             </a:fld>
             <a:endParaRPr lang="en-US" dirty="0"/>
           </a:p>
@@ -9412,7 +9412,7 @@
           <a:noFill/>
           <a:extLst>
             <a:ext uri="{909E8E84-426E-40dd-AFC4-6F175D3DCCD1}">
-              <a14:hiddenFill xmlns="" xmlns:a14="http://schemas.microsoft.com/office/drawing/2010/main">
+              <a14:hiddenFill xmlns:a14="http://schemas.microsoft.com/office/drawing/2010/main" xmlns="">
                 <a:solidFill>
                   <a:srgbClr val="FFFFFF"/>
                 </a:solidFill>
@@ -9486,7 +9486,7 @@
               </a:ln>
               <a:extLst>
                 <a:ext uri="{91240B29-F687-4f45-9708-019B960494DF}">
-                  <a14:hiddenLine xmlns="" xmlns:a14="http://schemas.microsoft.com/office/drawing/2010/main" w="9525">
+                  <a14:hiddenLine xmlns:a14="http://schemas.microsoft.com/office/drawing/2010/main" xmlns="" w="9525">
                     <a:solidFill>
                       <a:srgbClr val="000000"/>
                     </a:solidFill>
@@ -9576,7 +9576,7 @@
               </a:ln>
               <a:extLst>
                 <a:ext uri="{91240B29-F687-4f45-9708-019B960494DF}">
-                  <a14:hiddenLine xmlns="" xmlns:a14="http://schemas.microsoft.com/office/drawing/2010/main" w="9525">
+                  <a14:hiddenLine xmlns:a14="http://schemas.microsoft.com/office/drawing/2010/main" xmlns="" w="9525">
                     <a:solidFill>
                       <a:srgbClr val="000000"/>
                     </a:solidFill>
@@ -9666,7 +9666,7 @@
               </a:ln>
               <a:extLst>
                 <a:ext uri="{91240B29-F687-4f45-9708-019B960494DF}">
-                  <a14:hiddenLine xmlns="" xmlns:a14="http://schemas.microsoft.com/office/drawing/2010/main" w="9525">
+                  <a14:hiddenLine xmlns:a14="http://schemas.microsoft.com/office/drawing/2010/main" xmlns="" w="9525">
                     <a:solidFill>
                       <a:srgbClr val="000000"/>
                     </a:solidFill>
@@ -9728,7 +9728,7 @@
               </a:ln>
               <a:extLst>
                 <a:ext uri="{91240B29-F687-4f45-9708-019B960494DF}">
-                  <a14:hiddenLine xmlns="" xmlns:a14="http://schemas.microsoft.com/office/drawing/2010/main" w="9525">
+                  <a14:hiddenLine xmlns:a14="http://schemas.microsoft.com/office/drawing/2010/main" xmlns="" w="9525">
                     <a:solidFill>
                       <a:srgbClr val="000000"/>
                     </a:solidFill>
@@ -9818,7 +9818,7 @@
               </a:ln>
               <a:extLst>
                 <a:ext uri="{91240B29-F687-4f45-9708-019B960494DF}">
-                  <a14:hiddenLine xmlns="" xmlns:a14="http://schemas.microsoft.com/office/drawing/2010/main" w="9525">
+                  <a14:hiddenLine xmlns:a14="http://schemas.microsoft.com/office/drawing/2010/main" xmlns="" w="9525">
                     <a:solidFill>
                       <a:srgbClr val="000000"/>
                     </a:solidFill>
@@ -9880,7 +9880,7 @@
               </a:ln>
               <a:extLst>
                 <a:ext uri="{91240B29-F687-4f45-9708-019B960494DF}">
-                  <a14:hiddenLine xmlns="" xmlns:a14="http://schemas.microsoft.com/office/drawing/2010/main" w="9525">
+                  <a14:hiddenLine xmlns:a14="http://schemas.microsoft.com/office/drawing/2010/main" xmlns="" w="9525">
                     <a:solidFill>
                       <a:srgbClr val="000000"/>
                     </a:solidFill>
@@ -9942,7 +9942,7 @@
               </a:ln>
               <a:extLst>
                 <a:ext uri="{91240B29-F687-4f45-9708-019B960494DF}">
-                  <a14:hiddenLine xmlns="" xmlns:a14="http://schemas.microsoft.com/office/drawing/2010/main" w="9525">
+                  <a14:hiddenLine xmlns:a14="http://schemas.microsoft.com/office/drawing/2010/main" xmlns="" w="9525">
                     <a:solidFill>
                       <a:srgbClr val="000000"/>
                     </a:solidFill>
@@ -10032,7 +10032,7 @@
               </a:ln>
               <a:extLst>
                 <a:ext uri="{91240B29-F687-4f45-9708-019B960494DF}">
-                  <a14:hiddenLine xmlns="" xmlns:a14="http://schemas.microsoft.com/office/drawing/2010/main" w="9525">
+                  <a14:hiddenLine xmlns:a14="http://schemas.microsoft.com/office/drawing/2010/main" xmlns="" w="9525">
                     <a:solidFill>
                       <a:srgbClr val="000000"/>
                     </a:solidFill>
@@ -10122,7 +10122,7 @@
               </a:ln>
               <a:extLst>
                 <a:ext uri="{91240B29-F687-4f45-9708-019B960494DF}">
-                  <a14:hiddenLine xmlns="" xmlns:a14="http://schemas.microsoft.com/office/drawing/2010/main" w="9525">
+                  <a14:hiddenLine xmlns:a14="http://schemas.microsoft.com/office/drawing/2010/main" xmlns="" w="9525">
                     <a:solidFill>
                       <a:srgbClr val="000000"/>
                     </a:solidFill>
@@ -10184,7 +10184,7 @@
               </a:ln>
               <a:extLst>
                 <a:ext uri="{91240B29-F687-4f45-9708-019B960494DF}">
-                  <a14:hiddenLine xmlns="" xmlns:a14="http://schemas.microsoft.com/office/drawing/2010/main" w="9525">
+                  <a14:hiddenLine xmlns:a14="http://schemas.microsoft.com/office/drawing/2010/main" xmlns="" w="9525">
                     <a:solidFill>
                       <a:srgbClr val="000000"/>
                     </a:solidFill>
@@ -10294,7 +10294,7 @@
               </a:ln>
               <a:extLst>
                 <a:ext uri="{91240B29-F687-4f45-9708-019B960494DF}">
-                  <a14:hiddenLine xmlns="" xmlns:a14="http://schemas.microsoft.com/office/drawing/2010/main" w="9525">
+                  <a14:hiddenLine xmlns:a14="http://schemas.microsoft.com/office/drawing/2010/main" xmlns="" w="9525">
                     <a:solidFill>
                       <a:srgbClr val="000000"/>
                     </a:solidFill>
@@ -10378,7 +10378,7 @@
               </a:ln>
               <a:extLst>
                 <a:ext uri="{91240B29-F687-4f45-9708-019B960494DF}">
-                  <a14:hiddenLine xmlns="" xmlns:a14="http://schemas.microsoft.com/office/drawing/2010/main" w="9525">
+                  <a14:hiddenLine xmlns:a14="http://schemas.microsoft.com/office/drawing/2010/main" xmlns="" w="9525">
                     <a:solidFill>
                       <a:srgbClr val="000000"/>
                     </a:solidFill>
@@ -10440,7 +10440,7 @@
               </a:ln>
               <a:extLst>
                 <a:ext uri="{91240B29-F687-4f45-9708-019B960494DF}">
-                  <a14:hiddenLine xmlns="" xmlns:a14="http://schemas.microsoft.com/office/drawing/2010/main" w="9525">
+                  <a14:hiddenLine xmlns:a14="http://schemas.microsoft.com/office/drawing/2010/main" xmlns="" w="9525">
                     <a:solidFill>
                       <a:srgbClr val="000000"/>
                     </a:solidFill>
@@ -10502,7 +10502,7 @@
               </a:ln>
               <a:extLst>
                 <a:ext uri="{91240B29-F687-4f45-9708-019B960494DF}">
-                  <a14:hiddenLine xmlns="" xmlns:a14="http://schemas.microsoft.com/office/drawing/2010/main" w="9525">
+                  <a14:hiddenLine xmlns:a14="http://schemas.microsoft.com/office/drawing/2010/main" xmlns="" w="9525">
                     <a:solidFill>
                       <a:srgbClr val="000000"/>
                     </a:solidFill>
@@ -10592,7 +10592,7 @@
               </a:ln>
               <a:extLst>
                 <a:ext uri="{91240B29-F687-4f45-9708-019B960494DF}">
-                  <a14:hiddenLine xmlns="" xmlns:a14="http://schemas.microsoft.com/office/drawing/2010/main" w="9525">
+                  <a14:hiddenLine xmlns:a14="http://schemas.microsoft.com/office/drawing/2010/main" xmlns="" w="9525">
                     <a:solidFill>
                       <a:srgbClr val="000000"/>
                     </a:solidFill>
@@ -10626,7 +10626,7 @@
               </a:ln>
               <a:extLst>
                 <a:ext uri="{91240B29-F687-4f45-9708-019B960494DF}">
-                  <a14:hiddenLine xmlns="" xmlns:a14="http://schemas.microsoft.com/office/drawing/2010/main" w="9525">
+                  <a14:hiddenLine xmlns:a14="http://schemas.microsoft.com/office/drawing/2010/main" xmlns="" w="9525">
                     <a:solidFill>
                       <a:srgbClr val="000000"/>
                     </a:solidFill>
@@ -10691,7 +10691,7 @@
               </a:ln>
               <a:extLst>
                 <a:ext uri="{91240B29-F687-4f45-9708-019B960494DF}">
-                  <a14:hiddenLine xmlns="" xmlns:a14="http://schemas.microsoft.com/office/drawing/2010/main" w="9525">
+                  <a14:hiddenLine xmlns:a14="http://schemas.microsoft.com/office/drawing/2010/main" xmlns="" w="9525">
                     <a:solidFill>
                       <a:srgbClr val="000000"/>
                     </a:solidFill>
@@ -10781,7 +10781,7 @@
               </a:ln>
               <a:extLst>
                 <a:ext uri="{91240B29-F687-4f45-9708-019B960494DF}">
-                  <a14:hiddenLine xmlns="" xmlns:a14="http://schemas.microsoft.com/office/drawing/2010/main" w="9525">
+                  <a14:hiddenLine xmlns:a14="http://schemas.microsoft.com/office/drawing/2010/main" xmlns="" w="9525">
                     <a:solidFill>
                       <a:srgbClr val="000000"/>
                     </a:solidFill>
@@ -10843,7 +10843,7 @@
               </a:ln>
               <a:extLst>
                 <a:ext uri="{91240B29-F687-4f45-9708-019B960494DF}">
-                  <a14:hiddenLine xmlns="" xmlns:a14="http://schemas.microsoft.com/office/drawing/2010/main" w="9525">
+                  <a14:hiddenLine xmlns:a14="http://schemas.microsoft.com/office/drawing/2010/main" xmlns="" w="9525">
                     <a:solidFill>
                       <a:srgbClr val="000000"/>
                     </a:solidFill>
@@ -10933,7 +10933,7 @@
               </a:ln>
               <a:extLst>
                 <a:ext uri="{91240B29-F687-4f45-9708-019B960494DF}">
-                  <a14:hiddenLine xmlns="" xmlns:a14="http://schemas.microsoft.com/office/drawing/2010/main" w="9525">
+                  <a14:hiddenLine xmlns:a14="http://schemas.microsoft.com/office/drawing/2010/main" xmlns="" w="9525">
                     <a:solidFill>
                       <a:srgbClr val="000000"/>
                     </a:solidFill>
@@ -10998,7 +10998,7 @@
               </a:ln>
               <a:extLst>
                 <a:ext uri="{91240B29-F687-4f45-9708-019B960494DF}">
-                  <a14:hiddenLine xmlns="" xmlns:a14="http://schemas.microsoft.com/office/drawing/2010/main" w="9525">
+                  <a14:hiddenLine xmlns:a14="http://schemas.microsoft.com/office/drawing/2010/main" xmlns="" w="9525">
                     <a:solidFill>
                       <a:srgbClr val="000000"/>
                     </a:solidFill>
@@ -11060,7 +11060,7 @@
               </a:ln>
               <a:extLst>
                 <a:ext uri="{91240B29-F687-4f45-9708-019B960494DF}">
-                  <a14:hiddenLine xmlns="" xmlns:a14="http://schemas.microsoft.com/office/drawing/2010/main" w="9525">
+                  <a14:hiddenLine xmlns:a14="http://schemas.microsoft.com/office/drawing/2010/main" xmlns="" w="9525">
                     <a:solidFill>
                       <a:srgbClr val="000000"/>
                     </a:solidFill>
@@ -11150,7 +11150,7 @@
               </a:ln>
               <a:extLst>
                 <a:ext uri="{91240B29-F687-4f45-9708-019B960494DF}">
-                  <a14:hiddenLine xmlns="" xmlns:a14="http://schemas.microsoft.com/office/drawing/2010/main" w="9525">
+                  <a14:hiddenLine xmlns:a14="http://schemas.microsoft.com/office/drawing/2010/main" xmlns="" w="9525">
                     <a:solidFill>
                       <a:srgbClr val="000000"/>
                     </a:solidFill>
@@ -11240,7 +11240,7 @@
               </a:ln>
               <a:extLst>
                 <a:ext uri="{91240B29-F687-4f45-9708-019B960494DF}">
-                  <a14:hiddenLine xmlns="" xmlns:a14="http://schemas.microsoft.com/office/drawing/2010/main" w="9525">
+                  <a14:hiddenLine xmlns:a14="http://schemas.microsoft.com/office/drawing/2010/main" xmlns="" w="9525">
                     <a:solidFill>
                       <a:srgbClr val="000000"/>
                     </a:solidFill>
@@ -11305,7 +11305,7 @@
               </a:ln>
               <a:extLst>
                 <a:ext uri="{91240B29-F687-4f45-9708-019B960494DF}">
-                  <a14:hiddenLine xmlns="" xmlns:a14="http://schemas.microsoft.com/office/drawing/2010/main" w="9525">
+                  <a14:hiddenLine xmlns:a14="http://schemas.microsoft.com/office/drawing/2010/main" xmlns="" w="9525">
                     <a:solidFill>
                       <a:srgbClr val="000000"/>
                     </a:solidFill>
@@ -11425,7 +11425,7 @@
               </a:ln>
               <a:extLst>
                 <a:ext uri="{91240B29-F687-4f45-9708-019B960494DF}">
-                  <a14:hiddenLine xmlns="" xmlns:a14="http://schemas.microsoft.com/office/drawing/2010/main" w="9525">
+                  <a14:hiddenLine xmlns:a14="http://schemas.microsoft.com/office/drawing/2010/main" xmlns="" w="9525">
                     <a:solidFill>
                       <a:srgbClr val="000000"/>
                     </a:solidFill>
@@ -11523,7 +11523,7 @@
               </a:ln>
               <a:extLst>
                 <a:ext uri="{91240B29-F687-4f45-9708-019B960494DF}">
-                  <a14:hiddenLine xmlns="" xmlns:a14="http://schemas.microsoft.com/office/drawing/2010/main" w="9525">
+                  <a14:hiddenLine xmlns:a14="http://schemas.microsoft.com/office/drawing/2010/main" xmlns="" w="9525">
                     <a:solidFill>
                       <a:srgbClr val="000000"/>
                     </a:solidFill>
@@ -11638,7 +11638,7 @@
               </a:ln>
               <a:extLst>
                 <a:ext uri="{91240B29-F687-4f45-9708-019B960494DF}">
-                  <a14:hiddenLine xmlns="" xmlns:a14="http://schemas.microsoft.com/office/drawing/2010/main" w="9525">
+                  <a14:hiddenLine xmlns:a14="http://schemas.microsoft.com/office/drawing/2010/main" xmlns="" w="9525">
                     <a:solidFill>
                       <a:srgbClr val="000000"/>
                     </a:solidFill>
@@ -11728,7 +11728,7 @@
               </a:ln>
               <a:extLst>
                 <a:ext uri="{91240B29-F687-4f45-9708-019B960494DF}">
-                  <a14:hiddenLine xmlns="" xmlns:a14="http://schemas.microsoft.com/office/drawing/2010/main" w="9525">
+                  <a14:hiddenLine xmlns:a14="http://schemas.microsoft.com/office/drawing/2010/main" xmlns="" w="9525">
                     <a:solidFill>
                       <a:srgbClr val="000000"/>
                     </a:solidFill>
@@ -11793,7 +11793,7 @@
               </a:ln>
               <a:extLst>
                 <a:ext uri="{91240B29-F687-4f45-9708-019B960494DF}">
-                  <a14:hiddenLine xmlns="" xmlns:a14="http://schemas.microsoft.com/office/drawing/2010/main" w="9525">
+                  <a14:hiddenLine xmlns:a14="http://schemas.microsoft.com/office/drawing/2010/main" xmlns="" w="9525">
                     <a:solidFill>
                       <a:srgbClr val="000000"/>
                     </a:solidFill>
@@ -11883,7 +11883,7 @@
               </a:ln>
               <a:extLst>
                 <a:ext uri="{91240B29-F687-4f45-9708-019B960494DF}">
-                  <a14:hiddenLine xmlns="" xmlns:a14="http://schemas.microsoft.com/office/drawing/2010/main" w="9525">
+                  <a14:hiddenLine xmlns:a14="http://schemas.microsoft.com/office/drawing/2010/main" xmlns="" w="9525">
                     <a:solidFill>
                       <a:srgbClr val="000000"/>
                     </a:solidFill>
@@ -11951,7 +11951,7 @@
               </a:ln>
               <a:extLst>
                 <a:ext uri="{91240B29-F687-4f45-9708-019B960494DF}">
-                  <a14:hiddenLine xmlns="" xmlns:a14="http://schemas.microsoft.com/office/drawing/2010/main" w="9525">
+                  <a14:hiddenLine xmlns:a14="http://schemas.microsoft.com/office/drawing/2010/main" xmlns="" w="9525">
                     <a:solidFill>
                       <a:srgbClr val="000000"/>
                     </a:solidFill>
@@ -12041,7 +12041,7 @@
               </a:ln>
               <a:extLst>
                 <a:ext uri="{91240B29-F687-4f45-9708-019B960494DF}">
-                  <a14:hiddenLine xmlns="" xmlns:a14="http://schemas.microsoft.com/office/drawing/2010/main" w="9525">
+                  <a14:hiddenLine xmlns:a14="http://schemas.microsoft.com/office/drawing/2010/main" xmlns="" w="9525">
                     <a:solidFill>
                       <a:srgbClr val="000000"/>
                     </a:solidFill>
@@ -12109,7 +12109,7 @@
               </a:ln>
               <a:extLst>
                 <a:ext uri="{91240B29-F687-4f45-9708-019B960494DF}">
-                  <a14:hiddenLine xmlns="" xmlns:a14="http://schemas.microsoft.com/office/drawing/2010/main" w="9525">
+                  <a14:hiddenLine xmlns:a14="http://schemas.microsoft.com/office/drawing/2010/main" xmlns="" w="9525">
                     <a:solidFill>
                       <a:srgbClr val="000000"/>
                     </a:solidFill>
@@ -12199,7 +12199,7 @@
               </a:ln>
               <a:extLst>
                 <a:ext uri="{91240B29-F687-4f45-9708-019B960494DF}">
-                  <a14:hiddenLine xmlns="" xmlns:a14="http://schemas.microsoft.com/office/drawing/2010/main" w="9525">
+                  <a14:hiddenLine xmlns:a14="http://schemas.microsoft.com/office/drawing/2010/main" xmlns="" w="9525">
                     <a:solidFill>
                       <a:srgbClr val="000000"/>
                     </a:solidFill>
@@ -12233,7 +12233,7 @@
               </a:ln>
               <a:extLst>
                 <a:ext uri="{91240B29-F687-4f45-9708-019B960494DF}">
-                  <a14:hiddenLine xmlns="" xmlns:a14="http://schemas.microsoft.com/office/drawing/2010/main" w="9525">
+                  <a14:hiddenLine xmlns:a14="http://schemas.microsoft.com/office/drawing/2010/main" xmlns="" w="9525">
                     <a:solidFill>
                       <a:srgbClr val="000000"/>
                     </a:solidFill>
@@ -12373,7 +12373,7 @@
           <a:p>
             <a:fld id="{9C9DCB86-526B-42BA-A6FC-BC125ADF4A2D}" type="datetime1">
               <a:rPr lang="en-US" smtClean="0"/>
-              <a:t>8/4/2023</a:t>
+              <a:t>8/6/2023</a:t>
             </a:fld>
             <a:endParaRPr lang="en-US" dirty="0"/>
           </a:p>
@@ -12865,7 +12865,7 @@
                   <a:schemeClr val="bg1"/>
                 </a:solidFill>
               </a:rPr>
-              <a:t>SEC Cybersecurity Requirements for cyber-incident reporting Withing </a:t>
+              <a:t>SEC Cybersecurity Requirements for cyber-incident reporting Within 96 hours Demand the preservation of Evidence for PROACTIVE </a:t>
             </a:r>
             <a:r>
               <a:rPr lang="en-US">
@@ -12873,16 +12873,13 @@
                   <a:schemeClr val="bg1"/>
                 </a:solidFill>
               </a:rPr>
-              <a:t>96 hours Demand </a:t>
-            </a:r>
-            <a:r>
-              <a:rPr lang="en-US" dirty="0">
-                <a:solidFill>
-                  <a:schemeClr val="bg1"/>
-                </a:solidFill>
-              </a:rPr>
-              <a:t>the preservation of Evidence for PROACTIVE Cybersecurity Controls</a:t>
-            </a:r>
+              <a:t>Cybersecurity DISCLOSURE Controls</a:t>
+            </a:r>
+            <a:endParaRPr lang="en-US" dirty="0">
+              <a:solidFill>
+                <a:schemeClr val="bg1"/>
+              </a:solidFill>
+            </a:endParaRPr>
           </a:p>
         </p:txBody>
       </p:sp>
@@ -12909,7 +12906,7 @@
           <a:p>
             <a:fld id="{1342AFA8-D0B4-4B6F-ACD9-56B1414E4501}" type="datetime1">
               <a:rPr lang="en-US" smtClean="0"/>
-              <a:t>8/4/2023</a:t>
+              <a:t>8/6/2023</a:t>
             </a:fld>
             <a:endParaRPr lang="en-US" dirty="0"/>
           </a:p>
@@ -13296,7 +13293,7 @@
           <a:p>
             <a:fld id="{24ED1F1F-89F4-49B5-8EEC-B205C98801EE}" type="datetime1">
               <a:rPr lang="en-US" smtClean="0"/>
-              <a:t>8/4/2023</a:t>
+              <a:t>8/6/2023</a:t>
             </a:fld>
             <a:endParaRPr lang="en-US" dirty="0"/>
           </a:p>
@@ -13560,7 +13557,7 @@
           <a:p>
             <a:fld id="{8F422B43-45D4-4608-9F03-122930498C43}" type="datetime1">
               <a:rPr lang="en-US" smtClean="0"/>
-              <a:t>8/4/2023</a:t>
+              <a:t>8/6/2023</a:t>
             </a:fld>
             <a:endParaRPr lang="en-US" dirty="0"/>
           </a:p>
@@ -13714,7 +13711,9 @@
           </a:xfrm>
         </p:spPr>
         <p:txBody>
-          <a:bodyPr/>
+          <a:bodyPr>
+            <a:normAutofit fontScale="92500" lnSpcReduction="10000"/>
+          </a:bodyPr>
           <a:lstStyle/>
           <a:p>
             <a:r>
@@ -13723,7 +13722,7 @@
                   <a:schemeClr val="bg1"/>
                 </a:solidFill>
               </a:rPr>
-              <a:t>A failure to properly manage and mitigate cyber-risks could be evidence of negligence with regard to “duty of care” obligations to protect a business</a:t>
+              <a:t>A failure to properly manage and mitigate known cyber-risks (CISA Known Exploitable Vulnerabilities (KEV) could be evidence of negligence with regard to “duty of care” obligations to protect a business and a failure to satisfy good faith compliance expectations of the SEC</a:t>
             </a:r>
           </a:p>
           <a:p>
@@ -13788,7 +13787,7 @@
           <a:p>
             <a:fld id="{8F422B43-45D4-4608-9F03-122930498C43}" type="datetime1">
               <a:rPr lang="en-US" smtClean="0"/>
-              <a:t>8/4/2023</a:t>
+              <a:t>8/6/2023</a:t>
             </a:fld>
             <a:endParaRPr lang="en-US" dirty="0"/>
           </a:p>
@@ -13937,12 +13936,14 @@
         </p:nvSpPr>
         <p:spPr>
           <a:xfrm>
-            <a:off x="1141412" y="1393794"/>
+            <a:off x="1141412" y="1171849"/>
             <a:ext cx="9905999" cy="4397407"/>
           </a:xfrm>
         </p:spPr>
         <p:txBody>
-          <a:bodyPr/>
+          <a:bodyPr>
+            <a:normAutofit/>
+          </a:bodyPr>
           <a:lstStyle/>
           <a:p>
             <a:r>
@@ -13961,17 +13962,26 @@
                   <a:schemeClr val="bg1"/>
                 </a:solidFill>
               </a:rPr>
-              <a:t>SEC rules require visibility into cyber-incidents with 96 hours of a material cyber-incident exposing BoD Members and C-Suite Executives to potential lawsuits from shareholders</a:t>
-            </a:r>
-          </a:p>
-          <a:p>
+              <a:t>SEC rules require visibility into material cyber-incidents with 96 hours exposing Officers and Directors to potential lawsuits from shareholders</a:t>
+            </a:r>
+          </a:p>
+          <a:p>
+            <a:r>
+              <a:rPr lang="en-US" dirty="0">
+                <a:solidFill>
+                  <a:schemeClr val="bg1"/>
+                </a:solidFill>
+                <a:hlinkClick r:id="rId2"/>
+              </a:rPr>
+              <a:t>Commercial product offerings are broadly available</a:t>
+            </a:r>
             <a:r>
               <a:rPr lang="en-US" dirty="0">
                 <a:solidFill>
                   <a:schemeClr val="bg1"/>
                 </a:solidFill>
               </a:rPr>
-              <a:t>Well defined software supply chain controls are broadly available to proactively detect software risk and prevent harm</a:t>
+              <a:t> to proactively detect software risk and prevent harm against cyber-risks, such as CISA Known Exploitable Vulnerabilities (CISA KEV)</a:t>
             </a:r>
           </a:p>
           <a:p>
@@ -13981,7 +13991,7 @@
                   <a:schemeClr val="bg1"/>
                 </a:solidFill>
               </a:rPr>
-              <a:t>Failure to perform proactive software supply chain risk management may be considered negligent behavior with regard to duty of care fiduciary duties</a:t>
+              <a:t>Failure to perform proactive software supply chain risk management controls may be considered negligent behavior with regard to duty of care fiduciary duties and fail to satisfy SEC good faith compliance expectations</a:t>
             </a:r>
           </a:p>
         </p:txBody>
@@ -14009,7 +14019,7 @@
           <a:p>
             <a:fld id="{8F422B43-45D4-4608-9F03-122930498C43}" type="datetime1">
               <a:rPr lang="en-US" smtClean="0"/>
-              <a:t>8/4/2023</a:t>
+              <a:t>8/6/2023</a:t>
             </a:fld>
             <a:endParaRPr lang="en-US" dirty="0"/>
           </a:p>
@@ -14213,8 +14223,25 @@
                 <a:solidFill>
                   <a:schemeClr val="bg1"/>
                 </a:solidFill>
+                <a:hlinkClick r:id="rId4"/>
               </a:rPr>
-              <a:t>Preserve tamper-proof evidence showing that these proactive and preventative SAG-PM risk assessment controls are functioning properly and store this tamper-proof evidence in a secure evidence locker, such as SAG-CTR ™</a:t>
+              <a:t>Preserve tamper-proof evidence</a:t>
+            </a:r>
+            <a:r>
+              <a:rPr lang="en-US" dirty="0">
+                <a:solidFill>
+                  <a:schemeClr val="bg1"/>
+                </a:solidFill>
+              </a:rPr>
+              <a:t> showing that these proactive and preventative SAG-PM risk assessment controls are functioning properly and </a:t>
+            </a:r>
+            <a:r>
+              <a:rPr lang="en-US" u="sng" dirty="0">
+                <a:solidFill>
+                  <a:schemeClr val="bg1"/>
+                </a:solidFill>
+              </a:rPr>
+              <a:t>store this tamper-proof evidence in a secure evidence locker, such as SAG-CTR ™</a:t>
             </a:r>
           </a:p>
           <a:p>
@@ -14231,7 +14258,7 @@
                 <a:solidFill>
                   <a:schemeClr val="bg1"/>
                 </a:solidFill>
-                <a:hlinkClick r:id="rId4"/>
+                <a:hlinkClick r:id="rId5"/>
               </a:rPr>
               <a:t>Vendor Response Form (VRF) </a:t>
             </a:r>
@@ -14296,7 +14323,7 @@
           <a:p>
             <a:fld id="{8F422B43-45D4-4608-9F03-122930498C43}" type="datetime1">
               <a:rPr lang="en-US" smtClean="0"/>
-              <a:t>8/4/2023</a:t>
+              <a:t>8/6/2023</a:t>
             </a:fld>
             <a:endParaRPr lang="en-US" dirty="0"/>
           </a:p>
@@ -14457,7 +14484,7 @@
           <a:p>
             <a:fld id="{8F422B43-45D4-4608-9F03-122930498C43}" type="datetime1">
               <a:rPr lang="en-US" smtClean="0"/>
-              <a:t>8/4/2023</a:t>
+              <a:t>8/6/2023</a:t>
             </a:fld>
             <a:endParaRPr lang="en-US" dirty="0"/>
           </a:p>
@@ -15224,23 +15251,7 @@
                   <a:schemeClr val="bg1"/>
                 </a:solidFill>
               </a:rPr>
-              <a:t>to get started by implementing REA’s patented PROACTIVE ”Left of Bang” Software Supply Chain Risk Management </a:t>
-            </a:r>
-            <a:r>
-              <a:rPr lang="en-US">
-                <a:solidFill>
-                  <a:schemeClr val="bg1"/>
-                </a:solidFill>
-              </a:rPr>
-              <a:t>(C-SCRM) Cybersecurity </a:t>
-            </a:r>
-            <a:r>
-              <a:rPr lang="en-US" dirty="0">
-                <a:solidFill>
-                  <a:schemeClr val="bg1"/>
-                </a:solidFill>
-              </a:rPr>
-              <a:t>Controls (SAG-PM ™) for the software supply chain and preserve the tamper-proof evidence in a secure evidence locker (SAG-CTR ™) that may be presented as evidence to prevent personal financial losses in the event of a cyber-incident that results in shareholder lawsuits claiming negligence in “duty of care” responsibilities</a:t>
+              <a:t>to get started by implementing REA’s patented PROACTIVE ”Left of Bang” Software Supply Chain Risk Management (C-SCRM) Cybersecurity Controls (SAG-PM ™) for the software supply chain and preserve the tamper-proof evidence in a secure evidence locker (SAG-CTR ™) that may be presented as evidence to prevent personal financial losses in the event of a cyber-incident that results in shareholder lawsuits claiming negligence in “duty of care” responsibilities or SEC fines</a:t>
             </a:r>
           </a:p>
           <a:p>
@@ -15289,7 +15300,7 @@
           <a:p>
             <a:fld id="{8F422B43-45D4-4608-9F03-122930498C43}" type="datetime1">
               <a:rPr lang="en-US" smtClean="0"/>
-              <a:t>8/4/2023</a:t>
+              <a:t>8/6/2023</a:t>
             </a:fld>
             <a:endParaRPr lang="en-US" dirty="0"/>
           </a:p>

</xml_diff>

<commit_message>
SAG-CTR Evidence Locker and SEC rules compliance
</commit_message>
<xml_diff>
--- a/2023-0801-SAG-CTR-TP-EVIDENCE-OVERVIEW.pptx
+++ b/2023-0801-SAG-CTR-TP-EVIDENCE-OVERVIEW.pptx
@@ -5,17 +5,18 @@
     <p:sldMasterId id="2147483648" r:id="rId1"/>
   </p:sldMasterIdLst>
   <p:notesMasterIdLst>
-    <p:notesMasterId r:id="rId10"/>
+    <p:notesMasterId r:id="rId11"/>
   </p:notesMasterIdLst>
   <p:sldIdLst>
     <p:sldId id="256" r:id="rId2"/>
     <p:sldId id="257" r:id="rId3"/>
-    <p:sldId id="261" r:id="rId4"/>
-    <p:sldId id="262" r:id="rId5"/>
-    <p:sldId id="258" r:id="rId6"/>
-    <p:sldId id="259" r:id="rId7"/>
-    <p:sldId id="263" r:id="rId8"/>
-    <p:sldId id="260" r:id="rId9"/>
+    <p:sldId id="264" r:id="rId4"/>
+    <p:sldId id="261" r:id="rId5"/>
+    <p:sldId id="262" r:id="rId6"/>
+    <p:sldId id="258" r:id="rId7"/>
+    <p:sldId id="259" r:id="rId8"/>
+    <p:sldId id="263" r:id="rId9"/>
+    <p:sldId id="260" r:id="rId10"/>
   </p:sldIdLst>
   <p:sldSz cx="12192000" cy="6858000"/>
   <p:notesSz cx="6858000" cy="9144000"/>
@@ -204,7 +205,7 @@
           <a:p>
             <a:fld id="{9C099003-50DA-4517-9507-116940F6B88D}" type="datetimeFigureOut">
               <a:rPr lang="en-US" smtClean="0"/>
-              <a:t>8/6/2023</a:t>
+              <a:t>8/20/2023</a:t>
             </a:fld>
             <a:endParaRPr lang="en-US"/>
           </a:p>
@@ -4747,7 +4748,7 @@
           <a:p>
             <a:fld id="{56B791C0-0E59-4EFD-BC9B-AB19E867DAD6}" type="datetime1">
               <a:rPr lang="en-US" smtClean="0"/>
-              <a:t>8/6/2023</a:t>
+              <a:t>8/20/2023</a:t>
             </a:fld>
             <a:endParaRPr lang="en-US" dirty="0"/>
           </a:p>
@@ -5042,7 +5043,7 @@
           <a:p>
             <a:fld id="{621EE40A-5488-4906-AD66-F338A7711E46}" type="datetime1">
               <a:rPr lang="en-US" smtClean="0"/>
-              <a:t>8/6/2023</a:t>
+              <a:t>8/20/2023</a:t>
             </a:fld>
             <a:endParaRPr lang="en-US" dirty="0"/>
           </a:p>
@@ -5236,7 +5237,7 @@
           <a:p>
             <a:fld id="{297BCE8B-424A-44F2-9441-027CD557E042}" type="datetime1">
               <a:rPr lang="en-US" smtClean="0"/>
-              <a:t>8/6/2023</a:t>
+              <a:t>8/20/2023</a:t>
             </a:fld>
             <a:endParaRPr lang="en-US" dirty="0"/>
           </a:p>
@@ -5497,7 +5498,7 @@
           <a:p>
             <a:fld id="{F0A0DDE4-9E8C-49C7-8357-863BA22A9FB5}" type="datetime1">
               <a:rPr lang="en-US" smtClean="0"/>
-              <a:t>8/6/2023</a:t>
+              <a:t>8/20/2023</a:t>
             </a:fld>
             <a:endParaRPr lang="en-US" dirty="0"/>
           </a:p>
@@ -5929,7 +5930,7 @@
           <a:p>
             <a:fld id="{37FA7EA8-C9DF-4FE2-927A-E2090471346D}" type="datetime1">
               <a:rPr lang="en-US" smtClean="0"/>
-              <a:t>8/6/2023</a:t>
+              <a:t>8/20/2023</a:t>
             </a:fld>
             <a:endParaRPr lang="en-US" dirty="0"/>
           </a:p>
@@ -6473,7 +6474,7 @@
           <a:p>
             <a:fld id="{779E3BEB-49D8-488C-88A8-F1D0DBBAC068}" type="datetime1">
               <a:rPr lang="en-US" smtClean="0"/>
-              <a:t>8/6/2023</a:t>
+              <a:t>8/20/2023</a:t>
             </a:fld>
             <a:endParaRPr lang="en-US" dirty="0"/>
           </a:p>
@@ -7191,7 +7192,7 @@
           <a:p>
             <a:fld id="{CF2ECE7E-2E22-42A0-BC2D-246ECC07237B}" type="datetime1">
               <a:rPr lang="en-US" smtClean="0"/>
-              <a:t>8/6/2023</a:t>
+              <a:t>8/20/2023</a:t>
             </a:fld>
             <a:endParaRPr lang="en-US" dirty="0"/>
           </a:p>
@@ -7359,7 +7360,7 @@
           <a:p>
             <a:fld id="{C69C4AE5-5060-4374-B6E1-6B73D531E3EE}" type="datetime1">
               <a:rPr lang="en-US" smtClean="0"/>
-              <a:t>8/6/2023</a:t>
+              <a:t>8/20/2023</a:t>
             </a:fld>
             <a:endParaRPr lang="en-US" dirty="0"/>
           </a:p>
@@ -7537,7 +7538,7 @@
           <a:p>
             <a:fld id="{11998D02-0DEF-4198-A751-D267DB41BF0B}" type="datetime1">
               <a:rPr lang="en-US" smtClean="0"/>
-              <a:t>8/6/2023</a:t>
+              <a:t>8/20/2023</a:t>
             </a:fld>
             <a:endParaRPr lang="en-US" dirty="0"/>
           </a:p>
@@ -7705,7 +7706,7 @@
           <a:p>
             <a:fld id="{8F422B43-45D4-4608-9F03-122930498C43}" type="datetime1">
               <a:rPr lang="en-US" smtClean="0"/>
-              <a:t>8/6/2023</a:t>
+              <a:t>8/20/2023</a:t>
             </a:fld>
             <a:endParaRPr lang="en-US" dirty="0"/>
           </a:p>
@@ -7954,7 +7955,7 @@
           <a:p>
             <a:fld id="{8AF39007-0C4C-4662-9209-D5880C6C6463}" type="datetime1">
               <a:rPr lang="en-US" smtClean="0"/>
-              <a:t>8/6/2023</a:t>
+              <a:t>8/20/2023</a:t>
             </a:fld>
             <a:endParaRPr lang="en-US" dirty="0"/>
           </a:p>
@@ -8185,7 +8186,7 @@
           <a:p>
             <a:fld id="{8D6A9271-10E2-4B68-AE13-FF3919F43119}" type="datetime1">
               <a:rPr lang="en-US" smtClean="0"/>
-              <a:t>8/6/2023</a:t>
+              <a:t>8/20/2023</a:t>
             </a:fld>
             <a:endParaRPr lang="en-US" dirty="0"/>
           </a:p>
@@ -8564,7 +8565,7 @@
           <a:p>
             <a:fld id="{28F7A4B4-2D35-416A-973E-59EAAAA65DE7}" type="datetime1">
               <a:rPr lang="en-US" smtClean="0"/>
-              <a:t>8/6/2023</a:t>
+              <a:t>8/20/2023</a:t>
             </a:fld>
             <a:endParaRPr lang="en-US" dirty="0"/>
           </a:p>
@@ -8680,7 +8681,7 @@
           <a:p>
             <a:fld id="{820E87AD-A1CE-4B6A-A1E1-243C473B1B4F}" type="datetime1">
               <a:rPr lang="en-US" smtClean="0"/>
-              <a:t>8/6/2023</a:t>
+              <a:t>8/20/2023</a:t>
             </a:fld>
             <a:endParaRPr lang="en-US" dirty="0"/>
           </a:p>
@@ -8773,7 +8774,7 @@
           <a:p>
             <a:fld id="{054BD633-0EB0-465D-B200-78F1E8C4393C}" type="datetime1">
               <a:rPr lang="en-US" smtClean="0"/>
-              <a:t>8/6/2023</a:t>
+              <a:t>8/20/2023</a:t>
             </a:fld>
             <a:endParaRPr lang="en-US" dirty="0"/>
           </a:p>
@@ -9020,7 +9021,7 @@
           <a:p>
             <a:fld id="{2DF2695D-A47E-4BE9-B68F-60A28D6B816A}" type="datetime1">
               <a:rPr lang="en-US" smtClean="0"/>
-              <a:t>8/6/2023</a:t>
+              <a:t>8/20/2023</a:t>
             </a:fld>
             <a:endParaRPr lang="en-US" dirty="0"/>
           </a:p>
@@ -9298,7 +9299,7 @@
           <a:p>
             <a:fld id="{36484291-085B-4DF5-86BA-38F041301A2A}" type="datetime1">
               <a:rPr lang="en-US" smtClean="0"/>
-              <a:t>8/6/2023</a:t>
+              <a:t>8/20/2023</a:t>
             </a:fld>
             <a:endParaRPr lang="en-US" dirty="0"/>
           </a:p>
@@ -12373,7 +12374,7 @@
           <a:p>
             <a:fld id="{9C9DCB86-526B-42BA-A6FC-BC125ADF4A2D}" type="datetime1">
               <a:rPr lang="en-US" smtClean="0"/>
-              <a:t>8/6/2023</a:t>
+              <a:t>8/20/2023</a:t>
             </a:fld>
             <a:endParaRPr lang="en-US" dirty="0"/>
           </a:p>
@@ -12906,7 +12907,7 @@
           <a:p>
             <a:fld id="{1342AFA8-D0B4-4B6F-ACD9-56B1414E4501}" type="datetime1">
               <a:rPr lang="en-US" smtClean="0"/>
-              <a:t>8/6/2023</a:t>
+              <a:t>8/20/2023</a:t>
             </a:fld>
             <a:endParaRPr lang="en-US" dirty="0"/>
           </a:p>
@@ -13293,7 +13294,7 @@
           <a:p>
             <a:fld id="{24ED1F1F-89F4-49B5-8EEC-B205C98801EE}" type="datetime1">
               <a:rPr lang="en-US" smtClean="0"/>
-              <a:t>8/6/2023</a:t>
+              <a:t>8/20/2023</a:t>
             </a:fld>
             <a:endParaRPr lang="en-US" dirty="0"/>
           </a:p>
@@ -13389,157 +13390,10 @@
       </p:grpSpPr>
       <p:sp>
         <p:nvSpPr>
-          <p:cNvPr id="2" name="Title 1">
-            <a:extLst>
-              <a:ext uri="{FF2B5EF4-FFF2-40B4-BE49-F238E27FC236}">
-                <a16:creationId xmlns:a16="http://schemas.microsoft.com/office/drawing/2014/main" id="{41985BBE-EDB9-AE04-4DF0-D78691018961}"/>
-              </a:ext>
-            </a:extLst>
-          </p:cNvPr>
-          <p:cNvSpPr>
-            <a:spLocks noGrp="1"/>
-          </p:cNvSpPr>
-          <p:nvPr>
-            <p:ph type="title"/>
-          </p:nvPr>
-        </p:nvSpPr>
-        <p:spPr>
-          <a:xfrm>
-            <a:off x="1141413" y="390617"/>
-            <a:ext cx="9905998" cy="1162975"/>
-          </a:xfrm>
-        </p:spPr>
-        <p:txBody>
-          <a:bodyPr/>
-          <a:lstStyle/>
-          <a:p>
-            <a:r>
-              <a:rPr lang="en-US" dirty="0">
-                <a:solidFill>
-                  <a:schemeClr val="bg1"/>
-                </a:solidFill>
-              </a:rPr>
-              <a:t>SEC Expectations on Management are clear</a:t>
-            </a:r>
-          </a:p>
-        </p:txBody>
-      </p:sp>
-      <p:sp>
-        <p:nvSpPr>
-          <p:cNvPr id="3" name="Content Placeholder 2">
-            <a:extLst>
-              <a:ext uri="{FF2B5EF4-FFF2-40B4-BE49-F238E27FC236}">
-                <a16:creationId xmlns:a16="http://schemas.microsoft.com/office/drawing/2014/main" id="{B36D1774-2A57-41AC-2616-3567F9876546}"/>
-              </a:ext>
-            </a:extLst>
-          </p:cNvPr>
-          <p:cNvSpPr>
-            <a:spLocks noGrp="1"/>
-          </p:cNvSpPr>
-          <p:nvPr>
-            <p:ph idx="1"/>
-          </p:nvPr>
-        </p:nvSpPr>
-        <p:spPr>
-          <a:xfrm>
-            <a:off x="1141412" y="1278384"/>
-            <a:ext cx="9905999" cy="4512817"/>
-          </a:xfrm>
-        </p:spPr>
-        <p:txBody>
-          <a:bodyPr>
-            <a:normAutofit/>
-          </a:bodyPr>
-          <a:lstStyle/>
-          <a:p>
-            <a:pPr algn="l"/>
-            <a:endParaRPr lang="en-US" sz="1800" b="0" i="0" u="none" strike="noStrike" baseline="0" dirty="0">
-              <a:solidFill>
-                <a:srgbClr val="000000"/>
-              </a:solidFill>
-              <a:latin typeface="Arial" panose="020B0604020202020204" pitchFamily="34" charset="0"/>
-            </a:endParaRPr>
-          </a:p>
-          <a:p>
-            <a:r>
-              <a:rPr lang="en-US" sz="1800" b="0" i="0" u="none" strike="noStrike" baseline="0" dirty="0">
-                <a:solidFill>
-                  <a:srgbClr val="000000"/>
-                </a:solidFill>
-                <a:latin typeface="Arial" panose="020B0604020202020204" pitchFamily="34" charset="0"/>
-              </a:rPr>
-              <a:t>Describe its policies and procedures, if any, for </a:t>
-            </a:r>
-            <a:r>
-              <a:rPr lang="en-US" sz="1800" b="1" i="0" u="sng" strike="noStrike" baseline="0" dirty="0">
-                <a:solidFill>
-                  <a:srgbClr val="000000"/>
-                </a:solidFill>
-                <a:latin typeface="Arial" panose="020B0604020202020204" pitchFamily="34" charset="0"/>
-              </a:rPr>
-              <a:t>the identification and management of risks from cybersecurity threats, including whether the registrant considers cybersecurity as part of its business strategy, financial planning, and capital allocation</a:t>
-            </a:r>
-            <a:r>
-              <a:rPr lang="en-US" sz="1800" b="0" i="0" u="none" strike="noStrike" baseline="0" dirty="0">
-                <a:solidFill>
-                  <a:srgbClr val="000000"/>
-                </a:solidFill>
-                <a:latin typeface="Arial" panose="020B0604020202020204" pitchFamily="34" charset="0"/>
-              </a:rPr>
-              <a:t>; and </a:t>
-            </a:r>
-          </a:p>
-          <a:p>
-            <a:r>
-              <a:rPr lang="en-US" sz="1800" b="0" i="0" u="none" strike="noStrike" baseline="0" dirty="0">
-                <a:solidFill>
-                  <a:srgbClr val="000000"/>
-                </a:solidFill>
-                <a:latin typeface="Arial" panose="020B0604020202020204" pitchFamily="34" charset="0"/>
-              </a:rPr>
-              <a:t>Require </a:t>
-            </a:r>
-            <a:r>
-              <a:rPr lang="en-US" sz="1800" b="1" i="0" u="sng" strike="noStrike" baseline="0" dirty="0">
-                <a:solidFill>
-                  <a:srgbClr val="000000"/>
-                </a:solidFill>
-                <a:latin typeface="Arial" panose="020B0604020202020204" pitchFamily="34" charset="0"/>
-              </a:rPr>
-              <a:t>disclosure about the board’s oversight of cybersecurity risk and management’s role and expertise in assessing and managing cybersecurity risk and implementing the registrant’s cybersecurity policies, procedures, and strategies. </a:t>
-            </a:r>
-          </a:p>
-          <a:p>
-            <a:r>
-              <a:rPr lang="en-US" sz="1800" b="0" i="0" u="none" strike="noStrike" baseline="0" dirty="0">
-                <a:solidFill>
-                  <a:srgbClr val="000000"/>
-                </a:solidFill>
-                <a:latin typeface="Arial" panose="020B0604020202020204" pitchFamily="34" charset="0"/>
-              </a:rPr>
-              <a:t>Amend Item 407 of Regulation S-K and Form 20-F to </a:t>
-            </a:r>
-            <a:r>
-              <a:rPr lang="en-US" sz="1800" b="1" i="0" u="sng" strike="noStrike" baseline="0" dirty="0">
-                <a:solidFill>
-                  <a:srgbClr val="000000"/>
-                </a:solidFill>
-                <a:latin typeface="Arial" panose="020B0604020202020204" pitchFamily="34" charset="0"/>
-              </a:rPr>
-              <a:t>require disclosure regarding board member cybersecurity expertise. Proposed Item 407(j) would require disclosure in annual reports and certain proxy filings if any member of the registrant’s board of directors has expertise in cybersecurity, including the name(s) of any such director(s) and any detail necessary to fully describe the nature of the expertise. </a:t>
-            </a:r>
-          </a:p>
-          <a:p>
-            <a:endParaRPr lang="en-US" dirty="0"/>
-          </a:p>
-        </p:txBody>
-      </p:sp>
-      <p:sp>
-        <p:nvSpPr>
           <p:cNvPr id="4" name="Date Placeholder 3">
             <a:extLst>
               <a:ext uri="{FF2B5EF4-FFF2-40B4-BE49-F238E27FC236}">
-                <a16:creationId xmlns:a16="http://schemas.microsoft.com/office/drawing/2014/main" id="{1B0E879A-69E7-D35A-DBC9-0BB640979B75}"/>
+                <a16:creationId xmlns:a16="http://schemas.microsoft.com/office/drawing/2014/main" id="{D843DCCE-6B9D-5FA0-6095-2AC1E916795D}"/>
               </a:ext>
             </a:extLst>
           </p:cNvPr>
@@ -13550,14 +13404,19 @@
             <p:ph type="dt" sz="half" idx="10"/>
           </p:nvPr>
         </p:nvSpPr>
-        <p:spPr/>
+        <p:spPr>
+          <a:xfrm>
+            <a:off x="7456921" y="6220632"/>
+            <a:ext cx="2743200" cy="365125"/>
+          </a:xfrm>
+        </p:spPr>
         <p:txBody>
           <a:bodyPr/>
           <a:lstStyle/>
           <a:p>
             <a:fld id="{8F422B43-45D4-4608-9F03-122930498C43}" type="datetime1">
               <a:rPr lang="en-US" smtClean="0"/>
-              <a:t>8/6/2023</a:t>
+              <a:t>8/20/2023</a:t>
             </a:fld>
             <a:endParaRPr lang="en-US" dirty="0"/>
           </a:p>
@@ -13568,7 +13427,7 @@
           <p:cNvPr id="5" name="Footer Placeholder 4">
             <a:extLst>
               <a:ext uri="{FF2B5EF4-FFF2-40B4-BE49-F238E27FC236}">
-                <a16:creationId xmlns:a16="http://schemas.microsoft.com/office/drawing/2014/main" id="{C30A60DD-1EA6-4B8A-FB87-FF73708C9D2E}"/>
+                <a16:creationId xmlns:a16="http://schemas.microsoft.com/office/drawing/2014/main" id="{1575140E-411E-ACF5-8F09-8BF25A7B759E}"/>
               </a:ext>
             </a:extLst>
           </p:cNvPr>
@@ -13579,16 +13438,20 @@
             <p:ph type="ftr" sz="quarter" idx="11"/>
           </p:nvPr>
         </p:nvSpPr>
-        <p:spPr/>
+        <p:spPr>
+          <a:xfrm>
+            <a:off x="1141412" y="6265019"/>
+            <a:ext cx="6239309" cy="365125"/>
+          </a:xfrm>
+        </p:spPr>
         <p:txBody>
           <a:bodyPr/>
           <a:lstStyle/>
           <a:p>
             <a:r>
-              <a:rPr lang="en-US"/>
+              <a:rPr lang="en-US" dirty="0"/>
               <a:t>Copyright Reliable Energy Analytics LLC (REA) 2018-2023</a:t>
             </a:r>
-            <a:endParaRPr lang="en-US" dirty="0"/>
           </a:p>
         </p:txBody>
       </p:sp>
@@ -13597,7 +13460,7 @@
           <p:cNvPr id="6" name="Slide Number Placeholder 5">
             <a:extLst>
               <a:ext uri="{FF2B5EF4-FFF2-40B4-BE49-F238E27FC236}">
-                <a16:creationId xmlns:a16="http://schemas.microsoft.com/office/drawing/2014/main" id="{BF07EF26-B618-0BF9-6961-F23D920068B8}"/>
+                <a16:creationId xmlns:a16="http://schemas.microsoft.com/office/drawing/2014/main" id="{00FA3BB3-0EDC-B63F-2580-14BEE0ED270E}"/>
               </a:ext>
             </a:extLst>
           </p:cNvPr>
@@ -13621,10 +13484,75 @@
           </a:p>
         </p:txBody>
       </p:sp>
+      <p:pic>
+        <p:nvPicPr>
+          <p:cNvPr id="8" name="Picture 7">
+            <a:extLst>
+              <a:ext uri="{FF2B5EF4-FFF2-40B4-BE49-F238E27FC236}">
+                <a16:creationId xmlns:a16="http://schemas.microsoft.com/office/drawing/2014/main" id="{410FE293-8DC9-531C-4A36-712142E5AF78}"/>
+              </a:ext>
+            </a:extLst>
+          </p:cNvPr>
+          <p:cNvPicPr>
+            <a:picLocks noChangeAspect="1"/>
+          </p:cNvPicPr>
+          <p:nvPr/>
+        </p:nvPicPr>
+        <p:blipFill>
+          <a:blip r:embed="rId2"/>
+          <a:stretch>
+            <a:fillRect/>
+          </a:stretch>
+        </p:blipFill>
+        <p:spPr>
+          <a:xfrm>
+            <a:off x="2645544" y="113595"/>
+            <a:ext cx="5768157" cy="5782760"/>
+          </a:xfrm>
+          <a:prstGeom prst="rect">
+            <a:avLst/>
+          </a:prstGeom>
+        </p:spPr>
+      </p:pic>
+      <p:sp>
+        <p:nvSpPr>
+          <p:cNvPr id="9" name="TextBox 8">
+            <a:extLst>
+              <a:ext uri="{FF2B5EF4-FFF2-40B4-BE49-F238E27FC236}">
+                <a16:creationId xmlns:a16="http://schemas.microsoft.com/office/drawing/2014/main" id="{A8D65DD1-A0BA-489A-3419-DBE4CE8767A1}"/>
+              </a:ext>
+            </a:extLst>
+          </p:cNvPr>
+          <p:cNvSpPr txBox="1"/>
+          <p:nvPr/>
+        </p:nvSpPr>
+        <p:spPr>
+          <a:xfrm>
+            <a:off x="2041862" y="5939158"/>
+            <a:ext cx="7848815" cy="307777"/>
+          </a:xfrm>
+          <a:prstGeom prst="rect">
+            <a:avLst/>
+          </a:prstGeom>
+          <a:noFill/>
+        </p:spPr>
+        <p:txBody>
+          <a:bodyPr wrap="none" rtlCol="0">
+            <a:spAutoFit/>
+          </a:bodyPr>
+          <a:lstStyle/>
+          <a:p>
+            <a:r>
+              <a:rPr lang="en-US" sz="1400" dirty="0"/>
+              <a:t>Source: https://corpgov.law.harvard.edu/2023/08/09/sec-adopts-final-rules-on-cybersecurity-disclosure/</a:t>
+            </a:r>
+          </a:p>
+        </p:txBody>
+      </p:sp>
     </p:spTree>
     <p:extLst>
       <p:ext uri="{BB962C8B-B14F-4D97-AF65-F5344CB8AC3E}">
-        <p14:creationId xmlns:p14="http://schemas.microsoft.com/office/powerpoint/2010/main" val="917182156"/>
+        <p14:creationId xmlns:p14="http://schemas.microsoft.com/office/powerpoint/2010/main" val="2477298277"/>
       </p:ext>
     </p:extLst>
   </p:cSld>
@@ -13656,7 +13584,7 @@
           <p:cNvPr id="2" name="Title 1">
             <a:extLst>
               <a:ext uri="{FF2B5EF4-FFF2-40B4-BE49-F238E27FC236}">
-                <a16:creationId xmlns:a16="http://schemas.microsoft.com/office/drawing/2014/main" id="{31D11E76-ABC2-91BB-E1CA-290E2154DA3E}"/>
+                <a16:creationId xmlns:a16="http://schemas.microsoft.com/office/drawing/2014/main" id="{41985BBE-EDB9-AE04-4DF0-D78691018961}"/>
               </a:ext>
             </a:extLst>
           </p:cNvPr>
@@ -13669,8 +13597,8 @@
         </p:nvSpPr>
         <p:spPr>
           <a:xfrm>
-            <a:off x="1141413" y="156876"/>
-            <a:ext cx="10115472" cy="1478570"/>
+            <a:off x="1141413" y="390617"/>
+            <a:ext cx="9905998" cy="1162975"/>
           </a:xfrm>
         </p:spPr>
         <p:txBody>
@@ -13683,7 +13611,7 @@
                   <a:schemeClr val="bg1"/>
                 </a:solidFill>
               </a:rPr>
-              <a:t>Management IS Responsible for Cybersecurity</a:t>
+              <a:t>SEC Expectations on Management are clear</a:t>
             </a:r>
           </a:p>
         </p:txBody>
@@ -13693,7 +13621,7 @@
           <p:cNvPr id="3" name="Content Placeholder 2">
             <a:extLst>
               <a:ext uri="{FF2B5EF4-FFF2-40B4-BE49-F238E27FC236}">
-                <a16:creationId xmlns:a16="http://schemas.microsoft.com/office/drawing/2014/main" id="{1BDF9F79-1E39-D072-F4BE-9506933A58D5}"/>
+                <a16:creationId xmlns:a16="http://schemas.microsoft.com/office/drawing/2014/main" id="{B36D1774-2A57-41AC-2616-3567F9876546}"/>
               </a:ext>
             </a:extLst>
           </p:cNvPr>
@@ -13706,61 +13634,95 @@
         </p:nvSpPr>
         <p:spPr>
           <a:xfrm>
-            <a:off x="1141412" y="1207363"/>
-            <a:ext cx="9905999" cy="4583838"/>
+            <a:off x="1141412" y="1278384"/>
+            <a:ext cx="9905999" cy="4512817"/>
           </a:xfrm>
         </p:spPr>
         <p:txBody>
           <a:bodyPr>
-            <a:normAutofit fontScale="92500" lnSpcReduction="10000"/>
+            <a:normAutofit/>
           </a:bodyPr>
           <a:lstStyle/>
           <a:p>
-            <a:r>
-              <a:rPr lang="en-US" dirty="0">
+            <a:pPr algn="l"/>
+            <a:endParaRPr lang="en-US" sz="1800" b="0" i="0" u="none" strike="noStrike" baseline="0" dirty="0">
+              <a:solidFill>
+                <a:srgbClr val="000000"/>
+              </a:solidFill>
+              <a:latin typeface="Arial" panose="020B0604020202020204" pitchFamily="34" charset="0"/>
+            </a:endParaRPr>
+          </a:p>
+          <a:p>
+            <a:r>
+              <a:rPr lang="en-US" sz="1800" b="0" i="0" u="none" strike="noStrike" baseline="0" dirty="0">
                 <a:solidFill>
-                  <a:schemeClr val="bg1"/>
+                  <a:srgbClr val="000000"/>
                 </a:solidFill>
+                <a:latin typeface="Arial" panose="020B0604020202020204" pitchFamily="34" charset="0"/>
               </a:rPr>
-              <a:t>A failure to properly manage and mitigate known cyber-risks (CISA Known Exploitable Vulnerabilities (KEV) could be evidence of negligence with regard to “duty of care” obligations to protect a business and a failure to satisfy good faith compliance expectations of the SEC</a:t>
-            </a:r>
-          </a:p>
-          <a:p>
-            <a:r>
-              <a:rPr lang="en-US" dirty="0">
+              <a:t>Describe its policies and procedures, if any, for </a:t>
+            </a:r>
+            <a:r>
+              <a:rPr lang="en-US" sz="1800" b="1" i="0" u="sng" strike="noStrike" baseline="0" dirty="0">
                 <a:solidFill>
-                  <a:schemeClr val="bg1"/>
+                  <a:srgbClr val="000000"/>
                 </a:solidFill>
+                <a:latin typeface="Arial" panose="020B0604020202020204" pitchFamily="34" charset="0"/>
               </a:rPr>
-              <a:t>Directors and Officers could be held personally liable in a shareholder lawsuit resulting from a cyber-incident that results in shareholder losses</a:t>
-            </a:r>
-          </a:p>
-          <a:p>
-            <a:r>
-              <a:rPr lang="en-US" dirty="0">
+              <a:t>the identification and management of risks from cybersecurity threats, including whether the registrant considers cybersecurity as part of its business strategy, financial planning, and capital allocation</a:t>
+            </a:r>
+            <a:r>
+              <a:rPr lang="en-US" sz="1800" b="0" i="0" u="none" strike="noStrike" baseline="0" dirty="0">
                 <a:solidFill>
-                  <a:schemeClr val="bg1"/>
+                  <a:srgbClr val="000000"/>
                 </a:solidFill>
+                <a:latin typeface="Arial" panose="020B0604020202020204" pitchFamily="34" charset="0"/>
               </a:rPr>
-              <a:t>Directors and Officers need to ensure that cybersecurity controls are in place and functioning properly for both PROACTIVE prevention of harm, and REACTIVE detection and remediation/recover from a cyber-incident</a:t>
-            </a:r>
-          </a:p>
-          <a:p>
-            <a:r>
-              <a:rPr lang="en-US" dirty="0">
+              <a:t>; and </a:t>
+            </a:r>
+          </a:p>
+          <a:p>
+            <a:r>
+              <a:rPr lang="en-US" sz="1800" b="0" i="0" u="none" strike="noStrike" baseline="0" dirty="0">
                 <a:solidFill>
-                  <a:schemeClr val="bg1"/>
+                  <a:srgbClr val="000000"/>
                 </a:solidFill>
+                <a:latin typeface="Arial" panose="020B0604020202020204" pitchFamily="34" charset="0"/>
               </a:rPr>
-              <a:t>Tamper-proof evidence of these controls will be vital in any shareholder lawsuits aiming to hold officers with fiduciary duties personally liable</a:t>
-            </a:r>
-          </a:p>
-          <a:p>
-            <a:endParaRPr lang="en-US" dirty="0">
-              <a:solidFill>
-                <a:schemeClr val="bg1"/>
-              </a:solidFill>
-            </a:endParaRPr>
+              <a:t>Require </a:t>
+            </a:r>
+            <a:r>
+              <a:rPr lang="en-US" sz="1800" b="1" i="0" u="sng" strike="noStrike" baseline="0" dirty="0">
+                <a:solidFill>
+                  <a:srgbClr val="000000"/>
+                </a:solidFill>
+                <a:latin typeface="Arial" panose="020B0604020202020204" pitchFamily="34" charset="0"/>
+              </a:rPr>
+              <a:t>disclosure about the board’s oversight of cybersecurity risk and management’s role and expertise in assessing and managing cybersecurity risk and implementing the registrant’s cybersecurity policies, procedures, and strategies. </a:t>
+            </a:r>
+          </a:p>
+          <a:p>
+            <a:r>
+              <a:rPr lang="en-US" sz="1800" b="0" i="0" u="none" strike="noStrike" baseline="0" dirty="0">
+                <a:solidFill>
+                  <a:srgbClr val="000000"/>
+                </a:solidFill>
+                <a:latin typeface="Arial" panose="020B0604020202020204" pitchFamily="34" charset="0"/>
+              </a:rPr>
+              <a:t>Amend Item 407 of Regulation S-K and Form 20-F to </a:t>
+            </a:r>
+            <a:r>
+              <a:rPr lang="en-US" sz="1800" b="1" i="0" u="sng" strike="noStrike" baseline="0" dirty="0">
+                <a:solidFill>
+                  <a:srgbClr val="000000"/>
+                </a:solidFill>
+                <a:latin typeface="Arial" panose="020B0604020202020204" pitchFamily="34" charset="0"/>
+              </a:rPr>
+              <a:t>require disclosure regarding board member cybersecurity expertise. Proposed Item 407(j) would require disclosure in annual reports and certain proxy filings if any member of the registrant’s board of directors has expertise in cybersecurity, including the name(s) of any such director(s) and any detail necessary to fully describe the nature of the expertise. </a:t>
+            </a:r>
+          </a:p>
+          <a:p>
+            <a:endParaRPr lang="en-US" dirty="0"/>
           </a:p>
         </p:txBody>
       </p:sp>
@@ -13769,7 +13731,7 @@
           <p:cNvPr id="4" name="Date Placeholder 3">
             <a:extLst>
               <a:ext uri="{FF2B5EF4-FFF2-40B4-BE49-F238E27FC236}">
-                <a16:creationId xmlns:a16="http://schemas.microsoft.com/office/drawing/2014/main" id="{8DF97A87-990A-AC52-05D2-57DD985A26AA}"/>
+                <a16:creationId xmlns:a16="http://schemas.microsoft.com/office/drawing/2014/main" id="{1B0E879A-69E7-D35A-DBC9-0BB640979B75}"/>
               </a:ext>
             </a:extLst>
           </p:cNvPr>
@@ -13787,7 +13749,7 @@
           <a:p>
             <a:fld id="{8F422B43-45D4-4608-9F03-122930498C43}" type="datetime1">
               <a:rPr lang="en-US" smtClean="0"/>
-              <a:t>8/6/2023</a:t>
+              <a:t>8/20/2023</a:t>
             </a:fld>
             <a:endParaRPr lang="en-US" dirty="0"/>
           </a:p>
@@ -13798,7 +13760,7 @@
           <p:cNvPr id="5" name="Footer Placeholder 4">
             <a:extLst>
               <a:ext uri="{FF2B5EF4-FFF2-40B4-BE49-F238E27FC236}">
-                <a16:creationId xmlns:a16="http://schemas.microsoft.com/office/drawing/2014/main" id="{5A76B84B-3C28-68A1-EB0D-35DB7C95C6C2}"/>
+                <a16:creationId xmlns:a16="http://schemas.microsoft.com/office/drawing/2014/main" id="{C30A60DD-1EA6-4B8A-FB87-FF73708C9D2E}"/>
               </a:ext>
             </a:extLst>
           </p:cNvPr>
@@ -13827,7 +13789,7 @@
           <p:cNvPr id="6" name="Slide Number Placeholder 5">
             <a:extLst>
               <a:ext uri="{FF2B5EF4-FFF2-40B4-BE49-F238E27FC236}">
-                <a16:creationId xmlns:a16="http://schemas.microsoft.com/office/drawing/2014/main" id="{68C468AB-647F-2663-E226-9A538BFFC792}"/>
+                <a16:creationId xmlns:a16="http://schemas.microsoft.com/office/drawing/2014/main" id="{BF07EF26-B618-0BF9-6961-F23D920068B8}"/>
               </a:ext>
             </a:extLst>
           </p:cNvPr>
@@ -13854,7 +13816,7 @@
     </p:spTree>
     <p:extLst>
       <p:ext uri="{BB962C8B-B14F-4D97-AF65-F5344CB8AC3E}">
-        <p14:creationId xmlns:p14="http://schemas.microsoft.com/office/powerpoint/2010/main" val="761522996"/>
+        <p14:creationId xmlns:p14="http://schemas.microsoft.com/office/powerpoint/2010/main" val="917182156"/>
       </p:ext>
     </p:extLst>
   </p:cSld>
@@ -13886,7 +13848,7 @@
           <p:cNvPr id="2" name="Title 1">
             <a:extLst>
               <a:ext uri="{FF2B5EF4-FFF2-40B4-BE49-F238E27FC236}">
-                <a16:creationId xmlns:a16="http://schemas.microsoft.com/office/drawing/2014/main" id="{F4D107F9-3F99-9258-9BDF-6F910B7D8CD9}"/>
+                <a16:creationId xmlns:a16="http://schemas.microsoft.com/office/drawing/2014/main" id="{31D11E76-ABC2-91BB-E1CA-290E2154DA3E}"/>
               </a:ext>
             </a:extLst>
           </p:cNvPr>
@@ -13899,8 +13861,8 @@
         </p:nvSpPr>
         <p:spPr>
           <a:xfrm>
-            <a:off x="1141413" y="221942"/>
-            <a:ext cx="9905998" cy="1171852"/>
+            <a:off x="1141413" y="156876"/>
+            <a:ext cx="10115472" cy="1478570"/>
           </a:xfrm>
         </p:spPr>
         <p:txBody>
@@ -13913,7 +13875,7 @@
                   <a:schemeClr val="bg1"/>
                 </a:solidFill>
               </a:rPr>
-              <a:t>Why Now</a:t>
+              <a:t>Management IS Responsible for Cybersecurity</a:t>
             </a:r>
           </a:p>
         </p:txBody>
@@ -13923,7 +13885,7 @@
           <p:cNvPr id="3" name="Content Placeholder 2">
             <a:extLst>
               <a:ext uri="{FF2B5EF4-FFF2-40B4-BE49-F238E27FC236}">
-                <a16:creationId xmlns:a16="http://schemas.microsoft.com/office/drawing/2014/main" id="{6086C9E7-74A8-747D-40E2-644FD40A4F52}"/>
+                <a16:creationId xmlns:a16="http://schemas.microsoft.com/office/drawing/2014/main" id="{1BDF9F79-1E39-D072-F4BE-9506933A58D5}"/>
               </a:ext>
             </a:extLst>
           </p:cNvPr>
@@ -13936,13 +13898,13 @@
         </p:nvSpPr>
         <p:spPr>
           <a:xfrm>
-            <a:off x="1141412" y="1171849"/>
-            <a:ext cx="9905999" cy="4397407"/>
+            <a:off x="1141412" y="1207363"/>
+            <a:ext cx="9905999" cy="4583838"/>
           </a:xfrm>
         </p:spPr>
         <p:txBody>
           <a:bodyPr>
-            <a:normAutofit/>
+            <a:normAutofit fontScale="92500" lnSpcReduction="10000"/>
           </a:bodyPr>
           <a:lstStyle/>
           <a:p>
@@ -13952,20 +13914,40 @@
                   <a:schemeClr val="bg1"/>
                 </a:solidFill>
               </a:rPr>
-              <a:t>SEC Cybersecurity rules go into effect December 2023</a:t>
-            </a:r>
-          </a:p>
-          <a:p>
+              <a:t>A failure to properly manage and mitigate known cyber-risks (CISA </a:t>
+            </a:r>
+            <a:r>
+              <a:rPr lang="en-US" b="1" dirty="0">
+                <a:solidFill>
+                  <a:schemeClr val="bg1"/>
+                </a:solidFill>
+              </a:rPr>
+              <a:t>Known </a:t>
+            </a:r>
+            <a:r>
+              <a:rPr lang="en-US" b="1" u="sng" dirty="0">
+                <a:solidFill>
+                  <a:schemeClr val="bg1"/>
+                </a:solidFill>
+              </a:rPr>
+              <a:t>Exploited</a:t>
+            </a:r>
+            <a:r>
+              <a:rPr lang="en-US" b="1" dirty="0">
+                <a:solidFill>
+                  <a:schemeClr val="bg1"/>
+                </a:solidFill>
+              </a:rPr>
+              <a:t> Vulnerabilities</a:t>
+            </a:r>
             <a:r>
               <a:rPr lang="en-US" dirty="0">
                 <a:solidFill>
                   <a:schemeClr val="bg1"/>
                 </a:solidFill>
               </a:rPr>
-              <a:t>SEC rules require visibility into material cyber-incidents with 96 hours exposing Officers and Directors to potential lawsuits from shareholders</a:t>
-            </a:r>
-          </a:p>
-          <a:p>
+              <a:t> (</a:t>
+            </a:r>
             <a:r>
               <a:rPr lang="en-US" dirty="0">
                 <a:solidFill>
@@ -13973,7 +13955,7 @@
                 </a:solidFill>
                 <a:hlinkClick r:id="rId2"/>
               </a:rPr>
-              <a:t>Commercial product offerings are broadly available</a:t>
+              <a:t>CISA KEV</a:t>
             </a:r>
             <a:r>
               <a:rPr lang="en-US" dirty="0">
@@ -13981,7 +13963,7 @@
                   <a:schemeClr val="bg1"/>
                 </a:solidFill>
               </a:rPr>
-              <a:t> to proactively detect software risk and prevent harm against cyber-risks, such as CISA Known Exploitable Vulnerabilities (CISA KEV)</a:t>
+              <a:t>) could be evidence of negligence with regard to “duty of care” obligations to protect a business and a failure to satisfy good faith compliance expectations of the SEC</a:t>
             </a:r>
           </a:p>
           <a:p>
@@ -13991,8 +13973,35 @@
                   <a:schemeClr val="bg1"/>
                 </a:solidFill>
               </a:rPr>
-              <a:t>Failure to perform proactive software supply chain risk management controls may be considered negligent behavior with regard to duty of care fiduciary duties and fail to satisfy SEC good faith compliance expectations</a:t>
-            </a:r>
+              <a:t>Directors and Officers could be held personally liable in a shareholder lawsuit resulting from a cyber-incident that results in shareholder losses</a:t>
+            </a:r>
+          </a:p>
+          <a:p>
+            <a:r>
+              <a:rPr lang="en-US" dirty="0">
+                <a:solidFill>
+                  <a:schemeClr val="bg1"/>
+                </a:solidFill>
+              </a:rPr>
+              <a:t>Directors and Officers need to ensure that cybersecurity controls are in place and functioning properly for both PROACTIVE prevention of harm, and REACTIVE detection and remediation/recover from a cyber-incident</a:t>
+            </a:r>
+          </a:p>
+          <a:p>
+            <a:r>
+              <a:rPr lang="en-US" dirty="0">
+                <a:solidFill>
+                  <a:schemeClr val="bg1"/>
+                </a:solidFill>
+              </a:rPr>
+              <a:t>Tamper-proof evidence of these controls will be vital in any shareholder lawsuits aiming to hold officers with fiduciary duties personally liable</a:t>
+            </a:r>
+          </a:p>
+          <a:p>
+            <a:endParaRPr lang="en-US" dirty="0">
+              <a:solidFill>
+                <a:schemeClr val="bg1"/>
+              </a:solidFill>
+            </a:endParaRPr>
           </a:p>
         </p:txBody>
       </p:sp>
@@ -14001,7 +14010,7 @@
           <p:cNvPr id="4" name="Date Placeholder 3">
             <a:extLst>
               <a:ext uri="{FF2B5EF4-FFF2-40B4-BE49-F238E27FC236}">
-                <a16:creationId xmlns:a16="http://schemas.microsoft.com/office/drawing/2014/main" id="{2C2EBC22-C917-E707-DF08-60A41C9F14AE}"/>
+                <a16:creationId xmlns:a16="http://schemas.microsoft.com/office/drawing/2014/main" id="{8DF97A87-990A-AC52-05D2-57DD985A26AA}"/>
               </a:ext>
             </a:extLst>
           </p:cNvPr>
@@ -14019,7 +14028,7 @@
           <a:p>
             <a:fld id="{8F422B43-45D4-4608-9F03-122930498C43}" type="datetime1">
               <a:rPr lang="en-US" smtClean="0"/>
-              <a:t>8/6/2023</a:t>
+              <a:t>8/20/2023</a:t>
             </a:fld>
             <a:endParaRPr lang="en-US" dirty="0"/>
           </a:p>
@@ -14030,7 +14039,7 @@
           <p:cNvPr id="5" name="Footer Placeholder 4">
             <a:extLst>
               <a:ext uri="{FF2B5EF4-FFF2-40B4-BE49-F238E27FC236}">
-                <a16:creationId xmlns:a16="http://schemas.microsoft.com/office/drawing/2014/main" id="{032D1242-9F40-FA00-1F8F-2FDFE590D4A2}"/>
+                <a16:creationId xmlns:a16="http://schemas.microsoft.com/office/drawing/2014/main" id="{5A76B84B-3C28-68A1-EB0D-35DB7C95C6C2}"/>
               </a:ext>
             </a:extLst>
           </p:cNvPr>
@@ -14059,7 +14068,7 @@
           <p:cNvPr id="6" name="Slide Number Placeholder 5">
             <a:extLst>
               <a:ext uri="{FF2B5EF4-FFF2-40B4-BE49-F238E27FC236}">
-                <a16:creationId xmlns:a16="http://schemas.microsoft.com/office/drawing/2014/main" id="{8E693924-AD12-9911-7452-2663348CDA88}"/>
+                <a16:creationId xmlns:a16="http://schemas.microsoft.com/office/drawing/2014/main" id="{68C468AB-647F-2663-E226-9A538BFFC792}"/>
               </a:ext>
             </a:extLst>
           </p:cNvPr>
@@ -14086,7 +14095,7 @@
     </p:spTree>
     <p:extLst>
       <p:ext uri="{BB962C8B-B14F-4D97-AF65-F5344CB8AC3E}">
-        <p14:creationId xmlns:p14="http://schemas.microsoft.com/office/powerpoint/2010/main" val="4243905606"/>
+        <p14:creationId xmlns:p14="http://schemas.microsoft.com/office/powerpoint/2010/main" val="761522996"/>
       </p:ext>
     </p:extLst>
   </p:cSld>
@@ -14118,7 +14127,7 @@
           <p:cNvPr id="2" name="Title 1">
             <a:extLst>
               <a:ext uri="{FF2B5EF4-FFF2-40B4-BE49-F238E27FC236}">
-                <a16:creationId xmlns:a16="http://schemas.microsoft.com/office/drawing/2014/main" id="{37233AD7-6487-547C-2B29-BF6EA017FE11}"/>
+                <a16:creationId xmlns:a16="http://schemas.microsoft.com/office/drawing/2014/main" id="{F4D107F9-3F99-9258-9BDF-6F910B7D8CD9}"/>
               </a:ext>
             </a:extLst>
           </p:cNvPr>
@@ -14131,8 +14140,8 @@
         </p:nvSpPr>
         <p:spPr>
           <a:xfrm>
-            <a:off x="1141413" y="159798"/>
-            <a:ext cx="9905998" cy="1509204"/>
+            <a:off x="1141413" y="221942"/>
+            <a:ext cx="9905998" cy="1171852"/>
           </a:xfrm>
         </p:spPr>
         <p:txBody>
@@ -14145,7 +14154,7 @@
                   <a:schemeClr val="bg1"/>
                 </a:solidFill>
               </a:rPr>
-              <a:t>How to protect yourself from Software Risks and liability</a:t>
+              <a:t>Why Now</a:t>
             </a:r>
           </a:p>
         </p:txBody>
@@ -14155,7 +14164,7 @@
           <p:cNvPr id="3" name="Content Placeholder 2">
             <a:extLst>
               <a:ext uri="{FF2B5EF4-FFF2-40B4-BE49-F238E27FC236}">
-                <a16:creationId xmlns:a16="http://schemas.microsoft.com/office/drawing/2014/main" id="{B9FC8144-C65D-DC59-F4C2-30FF9EE2917F}"/>
+                <a16:creationId xmlns:a16="http://schemas.microsoft.com/office/drawing/2014/main" id="{6086C9E7-74A8-747D-40E2-644FD40A4F52}"/>
               </a:ext>
             </a:extLst>
           </p:cNvPr>
@@ -14168,15 +14177,55 @@
         </p:nvSpPr>
         <p:spPr>
           <a:xfrm>
-            <a:off x="1141412" y="1535837"/>
-            <a:ext cx="9905999" cy="4255364"/>
+            <a:off x="1141412" y="1171849"/>
+            <a:ext cx="9905999" cy="4397407"/>
           </a:xfrm>
         </p:spPr>
         <p:txBody>
           <a:bodyPr>
-            <a:normAutofit fontScale="70000" lnSpcReduction="20000"/>
+            <a:normAutofit fontScale="85000" lnSpcReduction="10000"/>
           </a:bodyPr>
           <a:lstStyle/>
+          <a:p>
+            <a:r>
+              <a:rPr lang="en-US" dirty="0">
+                <a:solidFill>
+                  <a:schemeClr val="bg1"/>
+                </a:solidFill>
+              </a:rPr>
+              <a:t>SEC Cybersecurity rules go into effect December 2023</a:t>
+            </a:r>
+          </a:p>
+          <a:p>
+            <a:r>
+              <a:rPr lang="en-US" dirty="0">
+                <a:solidFill>
+                  <a:schemeClr val="bg1"/>
+                </a:solidFill>
+              </a:rPr>
+              <a:t>SEC rules require visibility into material cyber-incidents with 96 hours exposing Officers and Directors to potential lawsuits from shareholders</a:t>
+            </a:r>
+          </a:p>
+          <a:p>
+            <a:r>
+              <a:rPr lang="en-US" dirty="0">
+                <a:solidFill>
+                  <a:schemeClr val="bg1"/>
+                </a:solidFill>
+              </a:rPr>
+              <a:t>SEC rules require Companies to disclose their processes for cybersecurity risk management, especially for known exploited vulnerabilities that represent cyber-risk</a:t>
+            </a:r>
+          </a:p>
+          <a:p>
+            <a:r>
+              <a:rPr lang="en-US" dirty="0">
+                <a:solidFill>
+                  <a:schemeClr val="bg1"/>
+                </a:solidFill>
+              </a:rPr>
+              <a:t>SEC rules make Officers and Directors responsible for cybersecurity processes oversight</a:t>
+            </a:r>
+          </a:p>
           <a:p>
             <a:r>
               <a:rPr lang="en-US" dirty="0">
@@ -14185,47 +14234,39 @@
                 </a:solidFill>
                 <a:hlinkClick r:id="rId2"/>
               </a:rPr>
-              <a:t>Implement PROACTIVE, Left of Bang” software supply chain risk management controls using SBOM’s</a:t>
-            </a:r>
-            <a:endParaRPr lang="en-US" dirty="0">
-              <a:solidFill>
-                <a:schemeClr val="bg1"/>
-              </a:solidFill>
-            </a:endParaRPr>
-          </a:p>
-          <a:p>
+              <a:t>Commercial product offerings are broadly available</a:t>
+            </a:r>
             <a:r>
               <a:rPr lang="en-US" dirty="0">
                 <a:solidFill>
                   <a:schemeClr val="bg1"/>
                 </a:solidFill>
               </a:rPr>
-              <a:t>Perform a software supply chain risk assessment following best practices provided by NIST (SP 800-161) using </a:t>
-            </a:r>
-            <a:r>
-              <a:rPr lang="en-US" dirty="0">
+              <a:t> to proactively detect software risk and prevent harm against cyber-risks, such as CISA </a:t>
+            </a:r>
+            <a:r>
+              <a:rPr lang="en-US" b="1" dirty="0">
                 <a:solidFill>
                   <a:schemeClr val="bg1"/>
                 </a:solidFill>
-                <a:hlinkClick r:id="rId3"/>
               </a:rPr>
-              <a:t>SAG-PM ™</a:t>
-            </a:r>
-            <a:endParaRPr lang="en-US" dirty="0">
-              <a:solidFill>
-                <a:schemeClr val="bg1"/>
-              </a:solidFill>
-            </a:endParaRPr>
-          </a:p>
-          <a:p>
-            <a:r>
-              <a:rPr lang="en-US" dirty="0">
+              <a:t>Known </a:t>
+            </a:r>
+            <a:r>
+              <a:rPr lang="en-US" b="1" u="sng" dirty="0">
                 <a:solidFill>
                   <a:schemeClr val="bg1"/>
                 </a:solidFill>
-                <a:hlinkClick r:id="rId4"/>
               </a:rPr>
-              <a:t>Preserve tamper-proof evidence</a:t>
+              <a:t>Exploited</a:t>
+            </a:r>
+            <a:r>
+              <a:rPr lang="en-US" b="1" dirty="0">
+                <a:solidFill>
+                  <a:schemeClr val="bg1"/>
+                </a:solidFill>
+              </a:rPr>
+              <a:t> Vulnerabilities </a:t>
             </a:r>
             <a:r>
               <a:rPr lang="en-US" dirty="0">
@@ -14233,15 +14274,7 @@
                   <a:schemeClr val="bg1"/>
                 </a:solidFill>
               </a:rPr>
-              <a:t> showing that these proactive and preventative SAG-PM risk assessment controls are functioning properly and </a:t>
-            </a:r>
-            <a:r>
-              <a:rPr lang="en-US" u="sng" dirty="0">
-                <a:solidFill>
-                  <a:schemeClr val="bg1"/>
-                </a:solidFill>
-              </a:rPr>
-              <a:t>store this tamper-proof evidence in a secure evidence locker, such as SAG-CTR ™</a:t>
+              <a:t>(CISA KEV)</a:t>
             </a:r>
           </a:p>
           <a:p>
@@ -14251,52 +14284,8 @@
                   <a:schemeClr val="bg1"/>
                 </a:solidFill>
               </a:rPr>
-              <a:t>Work with software suppliers to provide a </a:t>
-            </a:r>
-            <a:r>
-              <a:rPr lang="en-US" dirty="0">
-                <a:solidFill>
-                  <a:schemeClr val="bg1"/>
-                </a:solidFill>
-                <a:hlinkClick r:id="rId5"/>
-              </a:rPr>
-              <a:t>Vendor Response Form (VRF) </a:t>
-            </a:r>
-            <a:r>
-              <a:rPr lang="en-US" dirty="0">
-                <a:solidFill>
-                  <a:schemeClr val="bg1"/>
-                </a:solidFill>
-              </a:rPr>
-              <a:t>identifying product SBOM’s and an online living NIST SBOM Vulnerability Disclosure Report (VDR) for each software product and version they provide</a:t>
-            </a:r>
-          </a:p>
-          <a:p>
-            <a:r>
-              <a:rPr lang="en-US" dirty="0">
-                <a:solidFill>
-                  <a:schemeClr val="bg1"/>
-                </a:solidFill>
-              </a:rPr>
-              <a:t>Rely on REA to present SAG-CTR ™ tamper-proof evidence in court on behalf of the defense (Officers and Directors), in the event of any shareholder lawsuits</a:t>
-            </a:r>
-          </a:p>
-          <a:p>
-            <a:r>
-              <a:rPr lang="en-US" dirty="0">
-                <a:solidFill>
-                  <a:schemeClr val="bg1"/>
-                </a:solidFill>
-              </a:rPr>
-              <a:t>Never trust software, always verify and report! ™</a:t>
-            </a:r>
-          </a:p>
-          <a:p>
-            <a:endParaRPr lang="en-US" dirty="0">
-              <a:solidFill>
-                <a:schemeClr val="bg1"/>
-              </a:solidFill>
-            </a:endParaRPr>
+              <a:t>Failure to perform proactive software supply chain risk management controls may be considered negligent behavior with regard to duty of care fiduciary duties and fail to satisfy SEC good faith compliance expectations</a:t>
+            </a:r>
           </a:p>
         </p:txBody>
       </p:sp>
@@ -14305,7 +14294,7 @@
           <p:cNvPr id="4" name="Date Placeholder 3">
             <a:extLst>
               <a:ext uri="{FF2B5EF4-FFF2-40B4-BE49-F238E27FC236}">
-                <a16:creationId xmlns:a16="http://schemas.microsoft.com/office/drawing/2014/main" id="{37D88702-2CBC-7B76-76B5-FC683007B499}"/>
+                <a16:creationId xmlns:a16="http://schemas.microsoft.com/office/drawing/2014/main" id="{2C2EBC22-C917-E707-DF08-60A41C9F14AE}"/>
               </a:ext>
             </a:extLst>
           </p:cNvPr>
@@ -14323,7 +14312,7 @@
           <a:p>
             <a:fld id="{8F422B43-45D4-4608-9F03-122930498C43}" type="datetime1">
               <a:rPr lang="en-US" smtClean="0"/>
-              <a:t>8/6/2023</a:t>
+              <a:t>8/20/2023</a:t>
             </a:fld>
             <a:endParaRPr lang="en-US" dirty="0"/>
           </a:p>
@@ -14334,7 +14323,7 @@
           <p:cNvPr id="5" name="Footer Placeholder 4">
             <a:extLst>
               <a:ext uri="{FF2B5EF4-FFF2-40B4-BE49-F238E27FC236}">
-                <a16:creationId xmlns:a16="http://schemas.microsoft.com/office/drawing/2014/main" id="{66845776-764A-CC03-A8BB-1F63797FF5B3}"/>
+                <a16:creationId xmlns:a16="http://schemas.microsoft.com/office/drawing/2014/main" id="{032D1242-9F40-FA00-1F8F-2FDFE590D4A2}"/>
               </a:ext>
             </a:extLst>
           </p:cNvPr>
@@ -14363,7 +14352,7 @@
           <p:cNvPr id="6" name="Slide Number Placeholder 5">
             <a:extLst>
               <a:ext uri="{FF2B5EF4-FFF2-40B4-BE49-F238E27FC236}">
-                <a16:creationId xmlns:a16="http://schemas.microsoft.com/office/drawing/2014/main" id="{2C50D186-33BB-C35C-7B3A-1D8F0414D702}"/>
+                <a16:creationId xmlns:a16="http://schemas.microsoft.com/office/drawing/2014/main" id="{8E693924-AD12-9911-7452-2663348CDA88}"/>
               </a:ext>
             </a:extLst>
           </p:cNvPr>
@@ -14390,7 +14379,7 @@
     </p:spTree>
     <p:extLst>
       <p:ext uri="{BB962C8B-B14F-4D97-AF65-F5344CB8AC3E}">
-        <p14:creationId xmlns:p14="http://schemas.microsoft.com/office/powerpoint/2010/main" val="2286484022"/>
+        <p14:creationId xmlns:p14="http://schemas.microsoft.com/office/powerpoint/2010/main" val="4243905606"/>
       </p:ext>
     </p:extLst>
   </p:cSld>
@@ -14422,6 +14411,310 @@
           <p:cNvPr id="2" name="Title 1">
             <a:extLst>
               <a:ext uri="{FF2B5EF4-FFF2-40B4-BE49-F238E27FC236}">
+                <a16:creationId xmlns:a16="http://schemas.microsoft.com/office/drawing/2014/main" id="{37233AD7-6487-547C-2B29-BF6EA017FE11}"/>
+              </a:ext>
+            </a:extLst>
+          </p:cNvPr>
+          <p:cNvSpPr>
+            <a:spLocks noGrp="1"/>
+          </p:cNvSpPr>
+          <p:nvPr>
+            <p:ph type="title"/>
+          </p:nvPr>
+        </p:nvSpPr>
+        <p:spPr>
+          <a:xfrm>
+            <a:off x="1141413" y="159798"/>
+            <a:ext cx="9905998" cy="1509204"/>
+          </a:xfrm>
+        </p:spPr>
+        <p:txBody>
+          <a:bodyPr/>
+          <a:lstStyle/>
+          <a:p>
+            <a:r>
+              <a:rPr lang="en-US" dirty="0">
+                <a:solidFill>
+                  <a:schemeClr val="bg1"/>
+                </a:solidFill>
+              </a:rPr>
+              <a:t>How to protect yourself from Software Risks and liability</a:t>
+            </a:r>
+          </a:p>
+        </p:txBody>
+      </p:sp>
+      <p:sp>
+        <p:nvSpPr>
+          <p:cNvPr id="3" name="Content Placeholder 2">
+            <a:extLst>
+              <a:ext uri="{FF2B5EF4-FFF2-40B4-BE49-F238E27FC236}">
+                <a16:creationId xmlns:a16="http://schemas.microsoft.com/office/drawing/2014/main" id="{B9FC8144-C65D-DC59-F4C2-30FF9EE2917F}"/>
+              </a:ext>
+            </a:extLst>
+          </p:cNvPr>
+          <p:cNvSpPr>
+            <a:spLocks noGrp="1"/>
+          </p:cNvSpPr>
+          <p:nvPr>
+            <p:ph idx="1"/>
+          </p:nvPr>
+        </p:nvSpPr>
+        <p:spPr>
+          <a:xfrm>
+            <a:off x="1141412" y="1535837"/>
+            <a:ext cx="9905999" cy="4255364"/>
+          </a:xfrm>
+        </p:spPr>
+        <p:txBody>
+          <a:bodyPr>
+            <a:normAutofit fontScale="70000" lnSpcReduction="20000"/>
+          </a:bodyPr>
+          <a:lstStyle/>
+          <a:p>
+            <a:r>
+              <a:rPr lang="en-US" dirty="0">
+                <a:solidFill>
+                  <a:schemeClr val="bg1"/>
+                </a:solidFill>
+                <a:hlinkClick r:id="rId2"/>
+              </a:rPr>
+              <a:t>Implement PROACTIVE, Left of Bang” software supply chain risk management controls using SBOM’s</a:t>
+            </a:r>
+            <a:endParaRPr lang="en-US" dirty="0">
+              <a:solidFill>
+                <a:schemeClr val="bg1"/>
+              </a:solidFill>
+            </a:endParaRPr>
+          </a:p>
+          <a:p>
+            <a:r>
+              <a:rPr lang="en-US" dirty="0">
+                <a:solidFill>
+                  <a:schemeClr val="bg1"/>
+                </a:solidFill>
+              </a:rPr>
+              <a:t>Perform a software supply chain risk assessment following best practices provided by NIST (SP 800-161) using </a:t>
+            </a:r>
+            <a:r>
+              <a:rPr lang="en-US" dirty="0">
+                <a:solidFill>
+                  <a:schemeClr val="bg1"/>
+                </a:solidFill>
+                <a:hlinkClick r:id="rId3"/>
+              </a:rPr>
+              <a:t>SAG-PM ™</a:t>
+            </a:r>
+            <a:endParaRPr lang="en-US" dirty="0">
+              <a:solidFill>
+                <a:schemeClr val="bg1"/>
+              </a:solidFill>
+            </a:endParaRPr>
+          </a:p>
+          <a:p>
+            <a:r>
+              <a:rPr lang="en-US" dirty="0">
+                <a:solidFill>
+                  <a:schemeClr val="bg1"/>
+                </a:solidFill>
+                <a:hlinkClick r:id="rId4"/>
+              </a:rPr>
+              <a:t>Preserve tamper-proof evidence</a:t>
+            </a:r>
+            <a:r>
+              <a:rPr lang="en-US" dirty="0">
+                <a:solidFill>
+                  <a:schemeClr val="bg1"/>
+                </a:solidFill>
+              </a:rPr>
+              <a:t> showing that these proactive and preventative SAG-PM risk assessment controls are functioning properly and </a:t>
+            </a:r>
+            <a:r>
+              <a:rPr lang="en-US" u="sng" dirty="0">
+                <a:solidFill>
+                  <a:schemeClr val="bg1"/>
+                </a:solidFill>
+              </a:rPr>
+              <a:t>store this tamper-proof evidence in a secure evidence locker, such as SAG-CTR ™</a:t>
+            </a:r>
+          </a:p>
+          <a:p>
+            <a:r>
+              <a:rPr lang="en-US" dirty="0">
+                <a:solidFill>
+                  <a:schemeClr val="bg1"/>
+                </a:solidFill>
+              </a:rPr>
+              <a:t>Work with software suppliers to provide a </a:t>
+            </a:r>
+            <a:r>
+              <a:rPr lang="en-US" dirty="0">
+                <a:solidFill>
+                  <a:schemeClr val="bg1"/>
+                </a:solidFill>
+                <a:hlinkClick r:id="rId5"/>
+              </a:rPr>
+              <a:t>Vendor Response Form (VRF) </a:t>
+            </a:r>
+            <a:r>
+              <a:rPr lang="en-US" dirty="0">
+                <a:solidFill>
+                  <a:schemeClr val="bg1"/>
+                </a:solidFill>
+              </a:rPr>
+              <a:t>identifying product SBOM’s and an online living NIST SBOM Vulnerability Disclosure Report (VDR) for each software product and version they provide</a:t>
+            </a:r>
+          </a:p>
+          <a:p>
+            <a:r>
+              <a:rPr lang="en-US" dirty="0">
+                <a:solidFill>
+                  <a:schemeClr val="bg1"/>
+                </a:solidFill>
+              </a:rPr>
+              <a:t>Rely on REA to present SAG-CTR ™ tamper-proof evidence in court on behalf of the defense (Officers and Directors), in the event of any shareholder lawsuits</a:t>
+            </a:r>
+          </a:p>
+          <a:p>
+            <a:r>
+              <a:rPr lang="en-US" dirty="0">
+                <a:solidFill>
+                  <a:schemeClr val="bg1"/>
+                </a:solidFill>
+              </a:rPr>
+              <a:t>Never trust software, always verify and report! ™</a:t>
+            </a:r>
+          </a:p>
+          <a:p>
+            <a:endParaRPr lang="en-US" dirty="0">
+              <a:solidFill>
+                <a:schemeClr val="bg1"/>
+              </a:solidFill>
+            </a:endParaRPr>
+          </a:p>
+        </p:txBody>
+      </p:sp>
+      <p:sp>
+        <p:nvSpPr>
+          <p:cNvPr id="4" name="Date Placeholder 3">
+            <a:extLst>
+              <a:ext uri="{FF2B5EF4-FFF2-40B4-BE49-F238E27FC236}">
+                <a16:creationId xmlns:a16="http://schemas.microsoft.com/office/drawing/2014/main" id="{37D88702-2CBC-7B76-76B5-FC683007B499}"/>
+              </a:ext>
+            </a:extLst>
+          </p:cNvPr>
+          <p:cNvSpPr>
+            <a:spLocks noGrp="1"/>
+          </p:cNvSpPr>
+          <p:nvPr>
+            <p:ph type="dt" sz="half" idx="10"/>
+          </p:nvPr>
+        </p:nvSpPr>
+        <p:spPr/>
+        <p:txBody>
+          <a:bodyPr/>
+          <a:lstStyle/>
+          <a:p>
+            <a:fld id="{8F422B43-45D4-4608-9F03-122930498C43}" type="datetime1">
+              <a:rPr lang="en-US" smtClean="0"/>
+              <a:t>8/20/2023</a:t>
+            </a:fld>
+            <a:endParaRPr lang="en-US" dirty="0"/>
+          </a:p>
+        </p:txBody>
+      </p:sp>
+      <p:sp>
+        <p:nvSpPr>
+          <p:cNvPr id="5" name="Footer Placeholder 4">
+            <a:extLst>
+              <a:ext uri="{FF2B5EF4-FFF2-40B4-BE49-F238E27FC236}">
+                <a16:creationId xmlns:a16="http://schemas.microsoft.com/office/drawing/2014/main" id="{66845776-764A-CC03-A8BB-1F63797FF5B3}"/>
+              </a:ext>
+            </a:extLst>
+          </p:cNvPr>
+          <p:cNvSpPr>
+            <a:spLocks noGrp="1"/>
+          </p:cNvSpPr>
+          <p:nvPr>
+            <p:ph type="ftr" sz="quarter" idx="11"/>
+          </p:nvPr>
+        </p:nvSpPr>
+        <p:spPr/>
+        <p:txBody>
+          <a:bodyPr/>
+          <a:lstStyle/>
+          <a:p>
+            <a:r>
+              <a:rPr lang="en-US"/>
+              <a:t>Copyright Reliable Energy Analytics LLC (REA) 2018-2023</a:t>
+            </a:r>
+            <a:endParaRPr lang="en-US" dirty="0"/>
+          </a:p>
+        </p:txBody>
+      </p:sp>
+      <p:sp>
+        <p:nvSpPr>
+          <p:cNvPr id="6" name="Slide Number Placeholder 5">
+            <a:extLst>
+              <a:ext uri="{FF2B5EF4-FFF2-40B4-BE49-F238E27FC236}">
+                <a16:creationId xmlns:a16="http://schemas.microsoft.com/office/drawing/2014/main" id="{2C50D186-33BB-C35C-7B3A-1D8F0414D702}"/>
+              </a:ext>
+            </a:extLst>
+          </p:cNvPr>
+          <p:cNvSpPr>
+            <a:spLocks noGrp="1"/>
+          </p:cNvSpPr>
+          <p:nvPr>
+            <p:ph type="sldNum" sz="quarter" idx="12"/>
+          </p:nvPr>
+        </p:nvSpPr>
+        <p:spPr/>
+        <p:txBody>
+          <a:bodyPr/>
+          <a:lstStyle/>
+          <a:p>
+            <a:fld id="{6D22F896-40B5-4ADD-8801-0D06FADFA095}" type="slidenum">
+              <a:rPr lang="en-US" smtClean="0"/>
+              <a:t>7</a:t>
+            </a:fld>
+            <a:endParaRPr lang="en-US" dirty="0"/>
+          </a:p>
+        </p:txBody>
+      </p:sp>
+    </p:spTree>
+    <p:extLst>
+      <p:ext uri="{BB962C8B-B14F-4D97-AF65-F5344CB8AC3E}">
+        <p14:creationId xmlns:p14="http://schemas.microsoft.com/office/powerpoint/2010/main" val="2286484022"/>
+      </p:ext>
+    </p:extLst>
+  </p:cSld>
+  <p:clrMapOvr>
+    <a:masterClrMapping/>
+  </p:clrMapOvr>
+</p:sld>
+</file>
+
+<file path=ppt/slides/slide8.xml><?xml version="1.0" encoding="utf-8"?>
+<p:sld xmlns:a="http://schemas.openxmlformats.org/drawingml/2006/main" xmlns:r="http://schemas.openxmlformats.org/officeDocument/2006/relationships" xmlns:p="http://schemas.openxmlformats.org/presentationml/2006/main">
+  <p:cSld>
+    <p:spTree>
+      <p:nvGrpSpPr>
+        <p:cNvPr id="1" name=""/>
+        <p:cNvGrpSpPr/>
+        <p:nvPr/>
+      </p:nvGrpSpPr>
+      <p:grpSpPr>
+        <a:xfrm>
+          <a:off x="0" y="0"/>
+          <a:ext cx="0" cy="0"/>
+          <a:chOff x="0" y="0"/>
+          <a:chExt cx="0" cy="0"/>
+        </a:xfrm>
+      </p:grpSpPr>
+      <p:sp>
+        <p:nvSpPr>
+          <p:cNvPr id="2" name="Title 1">
+            <a:extLst>
+              <a:ext uri="{FF2B5EF4-FFF2-40B4-BE49-F238E27FC236}">
                 <a16:creationId xmlns:a16="http://schemas.microsoft.com/office/drawing/2014/main" id="{EA2779BC-6999-27A5-5595-D441C962E5C8}"/>
               </a:ext>
             </a:extLst>
@@ -14484,7 +14777,7 @@
           <a:p>
             <a:fld id="{8F422B43-45D4-4608-9F03-122930498C43}" type="datetime1">
               <a:rPr lang="en-US" smtClean="0"/>
-              <a:t>8/6/2023</a:t>
+              <a:t>8/20/2023</a:t>
             </a:fld>
             <a:endParaRPr lang="en-US" dirty="0"/>
           </a:p>
@@ -14551,7 +14844,7 @@
           <a:p>
             <a:fld id="{6D22F896-40B5-4ADD-8801-0D06FADFA095}" type="slidenum">
               <a:rPr lang="en-US" smtClean="0"/>
-              <a:t>7</a:t>
+              <a:t>8</a:t>
             </a:fld>
             <a:endParaRPr lang="en-US" dirty="0"/>
           </a:p>
@@ -15166,7 +15459,7 @@
 </p:sld>
 </file>
 
-<file path=ppt/slides/slide8.xml><?xml version="1.0" encoding="utf-8"?>
+<file path=ppt/slides/slide9.xml><?xml version="1.0" encoding="utf-8"?>
 <p:sld xmlns:a="http://schemas.openxmlformats.org/drawingml/2006/main" xmlns:r="http://schemas.openxmlformats.org/officeDocument/2006/relationships" xmlns:p="http://schemas.openxmlformats.org/presentationml/2006/main">
   <p:cSld>
     <p:spTree>
@@ -15300,7 +15593,7 @@
           <a:p>
             <a:fld id="{8F422B43-45D4-4608-9F03-122930498C43}" type="datetime1">
               <a:rPr lang="en-US" smtClean="0"/>
-              <a:t>8/6/2023</a:t>
+              <a:t>8/20/2023</a:t>
             </a:fld>
             <a:endParaRPr lang="en-US" dirty="0"/>
           </a:p>
@@ -15358,7 +15651,7 @@
           <a:p>
             <a:fld id="{6D22F896-40B5-4ADD-8801-0D06FADFA095}" type="slidenum">
               <a:rPr lang="en-US" smtClean="0"/>
-              <a:t>8</a:t>
+              <a:t>9</a:t>
             </a:fld>
             <a:endParaRPr lang="en-US" dirty="0"/>
           </a:p>

</xml_diff>

<commit_message>
Clearer Disclosure info and more links
</commit_message>
<xml_diff>
--- a/2023-0801-SAG-CTR-TP-EVIDENCE-OVERVIEW.pptx
+++ b/2023-0801-SAG-CTR-TP-EVIDENCE-OVERVIEW.pptx
@@ -5,7 +5,7 @@
     <p:sldMasterId id="2147483648" r:id="rId1"/>
   </p:sldMasterIdLst>
   <p:notesMasterIdLst>
-    <p:notesMasterId r:id="rId11"/>
+    <p:notesMasterId r:id="rId12"/>
   </p:notesMasterIdLst>
   <p:sldIdLst>
     <p:sldId id="256" r:id="rId2"/>
@@ -16,7 +16,8 @@
     <p:sldId id="258" r:id="rId7"/>
     <p:sldId id="259" r:id="rId8"/>
     <p:sldId id="263" r:id="rId9"/>
-    <p:sldId id="260" r:id="rId10"/>
+    <p:sldId id="265" r:id="rId10"/>
+    <p:sldId id="260" r:id="rId11"/>
   </p:sldIdLst>
   <p:sldSz cx="12192000" cy="6858000"/>
   <p:notesSz cx="6858000" cy="9144000"/>
@@ -172,7 +173,7 @@
             </a:lvl1pPr>
           </a:lstStyle>
           <a:p>
-            <a:endParaRPr lang="en-US"/>
+            <a:endParaRPr lang="en-US" dirty="0"/>
           </a:p>
         </p:txBody>
       </p:sp>
@@ -205,9 +206,9 @@
           <a:p>
             <a:fld id="{9C099003-50DA-4517-9507-116940F6B88D}" type="datetimeFigureOut">
               <a:rPr lang="en-US" smtClean="0"/>
-              <a:t>8/20/2023</a:t>
+              <a:t>9/11/2023</a:t>
             </a:fld>
-            <a:endParaRPr lang="en-US"/>
+            <a:endParaRPr lang="en-US" dirty="0"/>
           </a:p>
         </p:txBody>
       </p:sp>
@@ -240,7 +241,7 @@
           <a:bodyPr vert="horz" lIns="91440" tIns="45720" rIns="91440" bIns="45720" rtlCol="0" anchor="ctr"/>
           <a:lstStyle/>
           <a:p>
-            <a:endParaRPr lang="en-US"/>
+            <a:endParaRPr lang="en-US" dirty="0"/>
           </a:p>
         </p:txBody>
       </p:sp>
@@ -330,7 +331,7 @@
             </a:lvl1pPr>
           </a:lstStyle>
           <a:p>
-            <a:endParaRPr lang="en-US"/>
+            <a:endParaRPr lang="en-US" dirty="0"/>
           </a:p>
         </p:txBody>
       </p:sp>
@@ -365,7 +366,7 @@
               <a:rPr lang="en-US" smtClean="0"/>
               <a:t>‹#›</a:t>
             </a:fld>
-            <a:endParaRPr lang="en-US"/>
+            <a:endParaRPr lang="en-US" dirty="0"/>
           </a:p>
         </p:txBody>
       </p:sp>
@@ -522,7 +523,7 @@
           <a:noFill/>
           <a:extLst>
             <a:ext uri="{909E8E84-426E-40dd-AFC4-6F175D3DCCD1}">
-              <a14:hiddenFill xmlns="" xmlns:a14="http://schemas.microsoft.com/office/drawing/2010/main">
+              <a14:hiddenFill xmlns:a14="http://schemas.microsoft.com/office/drawing/2010/main" xmlns="">
                 <a:solidFill>
                   <a:srgbClr val="FFFFFF"/>
                 </a:solidFill>
@@ -582,7 +583,7 @@
             </a:ln>
             <a:extLst>
               <a:ext uri="{91240B29-F687-4f45-9708-019B960494DF}">
-                <a14:hiddenLine xmlns="" xmlns:a14="http://schemas.microsoft.com/office/drawing/2010/main" w="9525">
+                <a14:hiddenLine xmlns:a14="http://schemas.microsoft.com/office/drawing/2010/main" xmlns="" w="9525">
                   <a:solidFill>
                     <a:srgbClr val="000000"/>
                   </a:solidFill>
@@ -672,7 +673,7 @@
             </a:ln>
             <a:extLst>
               <a:ext uri="{91240B29-F687-4f45-9708-019B960494DF}">
-                <a14:hiddenLine xmlns="" xmlns:a14="http://schemas.microsoft.com/office/drawing/2010/main" w="9525">
+                <a14:hiddenLine xmlns:a14="http://schemas.microsoft.com/office/drawing/2010/main" xmlns="" w="9525">
                   <a:solidFill>
                     <a:srgbClr val="000000"/>
                   </a:solidFill>
@@ -762,7 +763,7 @@
             </a:ln>
             <a:extLst>
               <a:ext uri="{91240B29-F687-4f45-9708-019B960494DF}">
-                <a14:hiddenLine xmlns="" xmlns:a14="http://schemas.microsoft.com/office/drawing/2010/main" w="9525">
+                <a14:hiddenLine xmlns:a14="http://schemas.microsoft.com/office/drawing/2010/main" xmlns="" w="9525">
                   <a:solidFill>
                     <a:srgbClr val="000000"/>
                   </a:solidFill>
@@ -796,7 +797,7 @@
             </a:ln>
             <a:extLst>
               <a:ext uri="{91240B29-F687-4f45-9708-019B960494DF}">
-                <a14:hiddenLine xmlns="" xmlns:a14="http://schemas.microsoft.com/office/drawing/2010/main" w="9525">
+                <a14:hiddenLine xmlns:a14="http://schemas.microsoft.com/office/drawing/2010/main" xmlns="" w="9525">
                   <a:solidFill>
                     <a:srgbClr val="000000"/>
                   </a:solidFill>
@@ -886,7 +887,7 @@
             </a:ln>
             <a:extLst>
               <a:ext uri="{91240B29-F687-4f45-9708-019B960494DF}">
-                <a14:hiddenLine xmlns="" xmlns:a14="http://schemas.microsoft.com/office/drawing/2010/main" w="9525">
+                <a14:hiddenLine xmlns:a14="http://schemas.microsoft.com/office/drawing/2010/main" xmlns="" w="9525">
                   <a:solidFill>
                     <a:srgbClr val="000000"/>
                   </a:solidFill>
@@ -948,7 +949,7 @@
             </a:ln>
             <a:extLst>
               <a:ext uri="{91240B29-F687-4f45-9708-019B960494DF}">
-                <a14:hiddenLine xmlns="" xmlns:a14="http://schemas.microsoft.com/office/drawing/2010/main" w="9525">
+                <a14:hiddenLine xmlns:a14="http://schemas.microsoft.com/office/drawing/2010/main" xmlns="" w="9525">
                   <a:solidFill>
                     <a:srgbClr val="000000"/>
                   </a:solidFill>
@@ -1010,7 +1011,7 @@
             </a:ln>
             <a:extLst>
               <a:ext uri="{91240B29-F687-4f45-9708-019B960494DF}">
-                <a14:hiddenLine xmlns="" xmlns:a14="http://schemas.microsoft.com/office/drawing/2010/main" w="9525">
+                <a14:hiddenLine xmlns:a14="http://schemas.microsoft.com/office/drawing/2010/main" xmlns="" w="9525">
                   <a:solidFill>
                     <a:srgbClr val="000000"/>
                   </a:solidFill>
@@ -1100,7 +1101,7 @@
             </a:ln>
             <a:extLst>
               <a:ext uri="{91240B29-F687-4f45-9708-019B960494DF}">
-                <a14:hiddenLine xmlns="" xmlns:a14="http://schemas.microsoft.com/office/drawing/2010/main" w="9525">
+                <a14:hiddenLine xmlns:a14="http://schemas.microsoft.com/office/drawing/2010/main" xmlns="" w="9525">
                   <a:solidFill>
                     <a:srgbClr val="000000"/>
                   </a:solidFill>
@@ -1162,7 +1163,7 @@
             </a:ln>
             <a:extLst>
               <a:ext uri="{91240B29-F687-4f45-9708-019B960494DF}">
-                <a14:hiddenLine xmlns="" xmlns:a14="http://schemas.microsoft.com/office/drawing/2010/main" w="9525">
+                <a14:hiddenLine xmlns:a14="http://schemas.microsoft.com/office/drawing/2010/main" xmlns="" w="9525">
                   <a:solidFill>
                     <a:srgbClr val="000000"/>
                   </a:solidFill>
@@ -1224,7 +1225,7 @@
             </a:ln>
             <a:extLst>
               <a:ext uri="{91240B29-F687-4f45-9708-019B960494DF}">
-                <a14:hiddenLine xmlns="" xmlns:a14="http://schemas.microsoft.com/office/drawing/2010/main" w="9525">
+                <a14:hiddenLine xmlns:a14="http://schemas.microsoft.com/office/drawing/2010/main" xmlns="" w="9525">
                   <a:solidFill>
                     <a:srgbClr val="000000"/>
                   </a:solidFill>
@@ -1314,7 +1315,7 @@
             </a:ln>
             <a:extLst>
               <a:ext uri="{91240B29-F687-4f45-9708-019B960494DF}">
-                <a14:hiddenLine xmlns="" xmlns:a14="http://schemas.microsoft.com/office/drawing/2010/main" w="9525">
+                <a14:hiddenLine xmlns:a14="http://schemas.microsoft.com/office/drawing/2010/main" xmlns="" w="9525">
                   <a:solidFill>
                     <a:srgbClr val="000000"/>
                   </a:solidFill>
@@ -1404,7 +1405,7 @@
             </a:ln>
             <a:extLst>
               <a:ext uri="{91240B29-F687-4f45-9708-019B960494DF}">
-                <a14:hiddenLine xmlns="" xmlns:a14="http://schemas.microsoft.com/office/drawing/2010/main" w="9525">
+                <a14:hiddenLine xmlns:a14="http://schemas.microsoft.com/office/drawing/2010/main" xmlns="" w="9525">
                   <a:solidFill>
                     <a:srgbClr val="000000"/>
                   </a:solidFill>
@@ -1466,7 +1467,7 @@
             </a:ln>
             <a:extLst>
               <a:ext uri="{91240B29-F687-4f45-9708-019B960494DF}">
-                <a14:hiddenLine xmlns="" xmlns:a14="http://schemas.microsoft.com/office/drawing/2010/main" w="9525">
+                <a14:hiddenLine xmlns:a14="http://schemas.microsoft.com/office/drawing/2010/main" xmlns="" w="9525">
                   <a:solidFill>
                     <a:srgbClr val="000000"/>
                   </a:solidFill>
@@ -1576,7 +1577,7 @@
             </a:ln>
             <a:extLst>
               <a:ext uri="{91240B29-F687-4f45-9708-019B960494DF}">
-                <a14:hiddenLine xmlns="" xmlns:a14="http://schemas.microsoft.com/office/drawing/2010/main" w="9525">
+                <a14:hiddenLine xmlns:a14="http://schemas.microsoft.com/office/drawing/2010/main" xmlns="" w="9525">
                   <a:solidFill>
                     <a:srgbClr val="000000"/>
                   </a:solidFill>
@@ -1638,7 +1639,7 @@
             </a:ln>
             <a:extLst>
               <a:ext uri="{91240B29-F687-4f45-9708-019B960494DF}">
-                <a14:hiddenLine xmlns="" xmlns:a14="http://schemas.microsoft.com/office/drawing/2010/main" w="9525">
+                <a14:hiddenLine xmlns:a14="http://schemas.microsoft.com/office/drawing/2010/main" xmlns="" w="9525">
                   <a:solidFill>
                     <a:srgbClr val="000000"/>
                   </a:solidFill>
@@ -1728,7 +1729,7 @@
             </a:ln>
             <a:extLst>
               <a:ext uri="{91240B29-F687-4f45-9708-019B960494DF}">
-                <a14:hiddenLine xmlns="" xmlns:a14="http://schemas.microsoft.com/office/drawing/2010/main" w="9525">
+                <a14:hiddenLine xmlns:a14="http://schemas.microsoft.com/office/drawing/2010/main" xmlns="" w="9525">
                   <a:solidFill>
                     <a:srgbClr val="000000"/>
                   </a:solidFill>
@@ -1818,7 +1819,7 @@
             </a:ln>
             <a:extLst>
               <a:ext uri="{91240B29-F687-4f45-9708-019B960494DF}">
-                <a14:hiddenLine xmlns="" xmlns:a14="http://schemas.microsoft.com/office/drawing/2010/main" w="9525">
+                <a14:hiddenLine xmlns:a14="http://schemas.microsoft.com/office/drawing/2010/main" xmlns="" w="9525">
                   <a:solidFill>
                     <a:srgbClr val="000000"/>
                   </a:solidFill>
@@ -1880,7 +1881,7 @@
             </a:ln>
             <a:extLst>
               <a:ext uri="{91240B29-F687-4f45-9708-019B960494DF}">
-                <a14:hiddenLine xmlns="" xmlns:a14="http://schemas.microsoft.com/office/drawing/2010/main" w="9525">
+                <a14:hiddenLine xmlns:a14="http://schemas.microsoft.com/office/drawing/2010/main" xmlns="" w="9525">
                   <a:solidFill>
                     <a:srgbClr val="000000"/>
                   </a:solidFill>
@@ -1970,7 +1971,7 @@
             </a:ln>
             <a:extLst>
               <a:ext uri="{91240B29-F687-4f45-9708-019B960494DF}">
-                <a14:hiddenLine xmlns="" xmlns:a14="http://schemas.microsoft.com/office/drawing/2010/main" w="9525">
+                <a14:hiddenLine xmlns:a14="http://schemas.microsoft.com/office/drawing/2010/main" xmlns="" w="9525">
                   <a:solidFill>
                     <a:srgbClr val="000000"/>
                   </a:solidFill>
@@ -2060,7 +2061,7 @@
             </a:ln>
             <a:extLst>
               <a:ext uri="{91240B29-F687-4f45-9708-019B960494DF}">
-                <a14:hiddenLine xmlns="" xmlns:a14="http://schemas.microsoft.com/office/drawing/2010/main" w="9525">
+                <a14:hiddenLine xmlns:a14="http://schemas.microsoft.com/office/drawing/2010/main" xmlns="" w="9525">
                   <a:solidFill>
                     <a:srgbClr val="000000"/>
                   </a:solidFill>
@@ -2116,7 +2117,7 @@
             </a:ln>
             <a:extLst>
               <a:ext uri="{91240B29-F687-4f45-9708-019B960494DF}">
-                <a14:hiddenLine xmlns="" xmlns:a14="http://schemas.microsoft.com/office/drawing/2010/main" w="9525">
+                <a14:hiddenLine xmlns:a14="http://schemas.microsoft.com/office/drawing/2010/main" xmlns="" w="9525">
                   <a:solidFill>
                     <a:srgbClr val="000000"/>
                   </a:solidFill>
@@ -2206,7 +2207,7 @@
             </a:ln>
             <a:extLst>
               <a:ext uri="{91240B29-F687-4f45-9708-019B960494DF}">
-                <a14:hiddenLine xmlns="" xmlns:a14="http://schemas.microsoft.com/office/drawing/2010/main" w="9525">
+                <a14:hiddenLine xmlns:a14="http://schemas.microsoft.com/office/drawing/2010/main" xmlns="" w="9525">
                   <a:solidFill>
                     <a:srgbClr val="000000"/>
                   </a:solidFill>
@@ -2262,7 +2263,7 @@
             </a:ln>
             <a:extLst>
               <a:ext uri="{91240B29-F687-4f45-9708-019B960494DF}">
-                <a14:hiddenLine xmlns="" xmlns:a14="http://schemas.microsoft.com/office/drawing/2010/main" w="9525">
+                <a14:hiddenLine xmlns:a14="http://schemas.microsoft.com/office/drawing/2010/main" xmlns="" w="9525">
                   <a:solidFill>
                     <a:srgbClr val="000000"/>
                   </a:solidFill>
@@ -2352,7 +2353,7 @@
             </a:ln>
             <a:extLst>
               <a:ext uri="{91240B29-F687-4f45-9708-019B960494DF}">
-                <a14:hiddenLine xmlns="" xmlns:a14="http://schemas.microsoft.com/office/drawing/2010/main" w="9525">
+                <a14:hiddenLine xmlns:a14="http://schemas.microsoft.com/office/drawing/2010/main" xmlns="" w="9525">
                   <a:solidFill>
                     <a:srgbClr val="000000"/>
                   </a:solidFill>
@@ -2420,7 +2421,7 @@
             </a:ln>
             <a:extLst>
               <a:ext uri="{91240B29-F687-4f45-9708-019B960494DF}">
-                <a14:hiddenLine xmlns="" xmlns:a14="http://schemas.microsoft.com/office/drawing/2010/main" w="9525">
+                <a14:hiddenLine xmlns:a14="http://schemas.microsoft.com/office/drawing/2010/main" xmlns="" w="9525">
                   <a:solidFill>
                     <a:srgbClr val="000000"/>
                   </a:solidFill>
@@ -2510,7 +2511,7 @@
             </a:ln>
             <a:extLst>
               <a:ext uri="{91240B29-F687-4f45-9708-019B960494DF}">
-                <a14:hiddenLine xmlns="" xmlns:a14="http://schemas.microsoft.com/office/drawing/2010/main" w="9525">
+                <a14:hiddenLine xmlns:a14="http://schemas.microsoft.com/office/drawing/2010/main" xmlns="" w="9525">
                   <a:solidFill>
                     <a:srgbClr val="000000"/>
                   </a:solidFill>
@@ -2578,7 +2579,7 @@
             </a:ln>
             <a:extLst>
               <a:ext uri="{91240B29-F687-4f45-9708-019B960494DF}">
-                <a14:hiddenLine xmlns="" xmlns:a14="http://schemas.microsoft.com/office/drawing/2010/main" w="9525">
+                <a14:hiddenLine xmlns:a14="http://schemas.microsoft.com/office/drawing/2010/main" xmlns="" w="9525">
                   <a:solidFill>
                     <a:srgbClr val="000000"/>
                   </a:solidFill>
@@ -2668,7 +2669,7 @@
             </a:ln>
             <a:extLst>
               <a:ext uri="{91240B29-F687-4f45-9708-019B960494DF}">
-                <a14:hiddenLine xmlns="" xmlns:a14="http://schemas.microsoft.com/office/drawing/2010/main" w="9525">
+                <a14:hiddenLine xmlns:a14="http://schemas.microsoft.com/office/drawing/2010/main" xmlns="" w="9525">
                   <a:solidFill>
                     <a:srgbClr val="000000"/>
                   </a:solidFill>
@@ -2702,7 +2703,7 @@
             </a:ln>
             <a:extLst>
               <a:ext uri="{91240B29-F687-4f45-9708-019B960494DF}">
-                <a14:hiddenLine xmlns="" xmlns:a14="http://schemas.microsoft.com/office/drawing/2010/main" w="9525">
+                <a14:hiddenLine xmlns:a14="http://schemas.microsoft.com/office/drawing/2010/main" xmlns="" w="9525">
                   <a:solidFill>
                     <a:srgbClr val="000000"/>
                   </a:solidFill>
@@ -2792,7 +2793,7 @@
             </a:ln>
             <a:extLst>
               <a:ext uri="{91240B29-F687-4f45-9708-019B960494DF}">
-                <a14:hiddenLine xmlns="" xmlns:a14="http://schemas.microsoft.com/office/drawing/2010/main" w="9525">
+                <a14:hiddenLine xmlns:a14="http://schemas.microsoft.com/office/drawing/2010/main" xmlns="" w="9525">
                   <a:solidFill>
                     <a:srgbClr val="000000"/>
                   </a:solidFill>
@@ -2854,7 +2855,7 @@
             </a:ln>
             <a:extLst>
               <a:ext uri="{91240B29-F687-4f45-9708-019B960494DF}">
-                <a14:hiddenLine xmlns="" xmlns:a14="http://schemas.microsoft.com/office/drawing/2010/main" w="9525">
+                <a14:hiddenLine xmlns:a14="http://schemas.microsoft.com/office/drawing/2010/main" xmlns="" w="9525">
                   <a:solidFill>
                     <a:srgbClr val="000000"/>
                   </a:solidFill>
@@ -2916,7 +2917,7 @@
             </a:ln>
             <a:extLst>
               <a:ext uri="{91240B29-F687-4f45-9708-019B960494DF}">
-                <a14:hiddenLine xmlns="" xmlns:a14="http://schemas.microsoft.com/office/drawing/2010/main" w="9525">
+                <a14:hiddenLine xmlns:a14="http://schemas.microsoft.com/office/drawing/2010/main" xmlns="" w="9525">
                   <a:solidFill>
                     <a:srgbClr val="000000"/>
                   </a:solidFill>
@@ -3006,7 +3007,7 @@
             </a:ln>
             <a:extLst>
               <a:ext uri="{91240B29-F687-4f45-9708-019B960494DF}">
-                <a14:hiddenLine xmlns="" xmlns:a14="http://schemas.microsoft.com/office/drawing/2010/main" w="9525">
+                <a14:hiddenLine xmlns:a14="http://schemas.microsoft.com/office/drawing/2010/main" xmlns="" w="9525">
                   <a:solidFill>
                     <a:srgbClr val="000000"/>
                   </a:solidFill>
@@ -3074,7 +3075,7 @@
             </a:ln>
             <a:extLst>
               <a:ext uri="{91240B29-F687-4f45-9708-019B960494DF}">
-                <a14:hiddenLine xmlns="" xmlns:a14="http://schemas.microsoft.com/office/drawing/2010/main" w="9525">
+                <a14:hiddenLine xmlns:a14="http://schemas.microsoft.com/office/drawing/2010/main" xmlns="" w="9525">
                   <a:solidFill>
                     <a:srgbClr val="000000"/>
                   </a:solidFill>
@@ -3136,7 +3137,7 @@
             </a:ln>
             <a:extLst>
               <a:ext uri="{91240B29-F687-4f45-9708-019B960494DF}">
-                <a14:hiddenLine xmlns="" xmlns:a14="http://schemas.microsoft.com/office/drawing/2010/main" w="9525">
+                <a14:hiddenLine xmlns:a14="http://schemas.microsoft.com/office/drawing/2010/main" xmlns="" w="9525">
                   <a:solidFill>
                     <a:srgbClr val="000000"/>
                   </a:solidFill>
@@ -3226,7 +3227,7 @@
             </a:ln>
             <a:extLst>
               <a:ext uri="{91240B29-F687-4f45-9708-019B960494DF}">
-                <a14:hiddenLine xmlns="" xmlns:a14="http://schemas.microsoft.com/office/drawing/2010/main" w="9525">
+                <a14:hiddenLine xmlns:a14="http://schemas.microsoft.com/office/drawing/2010/main" xmlns="" w="9525">
                   <a:solidFill>
                     <a:srgbClr val="000000"/>
                   </a:solidFill>
@@ -3288,7 +3289,7 @@
             </a:ln>
             <a:extLst>
               <a:ext uri="{91240B29-F687-4f45-9708-019B960494DF}">
-                <a14:hiddenLine xmlns="" xmlns:a14="http://schemas.microsoft.com/office/drawing/2010/main" w="9525">
+                <a14:hiddenLine xmlns:a14="http://schemas.microsoft.com/office/drawing/2010/main" xmlns="" w="9525">
                   <a:solidFill>
                     <a:srgbClr val="000000"/>
                   </a:solidFill>
@@ -3378,7 +3379,7 @@
             </a:ln>
             <a:extLst>
               <a:ext uri="{91240B29-F687-4f45-9708-019B960494DF}">
-                <a14:hiddenLine xmlns="" xmlns:a14="http://schemas.microsoft.com/office/drawing/2010/main" w="9525">
+                <a14:hiddenLine xmlns:a14="http://schemas.microsoft.com/office/drawing/2010/main" xmlns="" w="9525">
                   <a:solidFill>
                     <a:srgbClr val="000000"/>
                   </a:solidFill>
@@ -3440,7 +3441,7 @@
             </a:ln>
             <a:extLst>
               <a:ext uri="{91240B29-F687-4f45-9708-019B960494DF}">
-                <a14:hiddenLine xmlns="" xmlns:a14="http://schemas.microsoft.com/office/drawing/2010/main" w="9525">
+                <a14:hiddenLine xmlns:a14="http://schemas.microsoft.com/office/drawing/2010/main" xmlns="" w="9525">
                   <a:solidFill>
                     <a:srgbClr val="000000"/>
                   </a:solidFill>
@@ -3530,7 +3531,7 @@
             </a:ln>
             <a:extLst>
               <a:ext uri="{91240B29-F687-4f45-9708-019B960494DF}">
-                <a14:hiddenLine xmlns="" xmlns:a14="http://schemas.microsoft.com/office/drawing/2010/main" w="9525">
+                <a14:hiddenLine xmlns:a14="http://schemas.microsoft.com/office/drawing/2010/main" xmlns="" w="9525">
                   <a:solidFill>
                     <a:srgbClr val="000000"/>
                   </a:solidFill>
@@ -3564,7 +3565,7 @@
             </a:ln>
             <a:extLst>
               <a:ext uri="{91240B29-F687-4f45-9708-019B960494DF}">
-                <a14:hiddenLine xmlns="" xmlns:a14="http://schemas.microsoft.com/office/drawing/2010/main" w="9525">
+                <a14:hiddenLine xmlns:a14="http://schemas.microsoft.com/office/drawing/2010/main" xmlns="" w="9525">
                   <a:solidFill>
                     <a:srgbClr val="000000"/>
                   </a:solidFill>
@@ -3629,7 +3630,7 @@
             </a:ln>
             <a:extLst>
               <a:ext uri="{91240B29-F687-4f45-9708-019B960494DF}">
-                <a14:hiddenLine xmlns="" xmlns:a14="http://schemas.microsoft.com/office/drawing/2010/main" w="9525">
+                <a14:hiddenLine xmlns:a14="http://schemas.microsoft.com/office/drawing/2010/main" xmlns="" w="9525">
                   <a:solidFill>
                     <a:srgbClr val="000000"/>
                   </a:solidFill>
@@ -3719,7 +3720,7 @@
             </a:ln>
             <a:extLst>
               <a:ext uri="{91240B29-F687-4f45-9708-019B960494DF}">
-                <a14:hiddenLine xmlns="" xmlns:a14="http://schemas.microsoft.com/office/drawing/2010/main" w="9525">
+                <a14:hiddenLine xmlns:a14="http://schemas.microsoft.com/office/drawing/2010/main" xmlns="" w="9525">
                   <a:solidFill>
                     <a:srgbClr val="000000"/>
                   </a:solidFill>
@@ -3781,7 +3782,7 @@
             </a:ln>
             <a:extLst>
               <a:ext uri="{91240B29-F687-4f45-9708-019B960494DF}">
-                <a14:hiddenLine xmlns="" xmlns:a14="http://schemas.microsoft.com/office/drawing/2010/main" w="9525">
+                <a14:hiddenLine xmlns:a14="http://schemas.microsoft.com/office/drawing/2010/main" xmlns="" w="9525">
                   <a:solidFill>
                     <a:srgbClr val="000000"/>
                   </a:solidFill>
@@ -3871,7 +3872,7 @@
             </a:ln>
             <a:extLst>
               <a:ext uri="{91240B29-F687-4f45-9708-019B960494DF}">
-                <a14:hiddenLine xmlns="" xmlns:a14="http://schemas.microsoft.com/office/drawing/2010/main" w="9525">
+                <a14:hiddenLine xmlns:a14="http://schemas.microsoft.com/office/drawing/2010/main" xmlns="" w="9525">
                   <a:solidFill>
                     <a:srgbClr val="000000"/>
                   </a:solidFill>
@@ -3961,7 +3962,7 @@
             </a:ln>
             <a:extLst>
               <a:ext uri="{91240B29-F687-4f45-9708-019B960494DF}">
-                <a14:hiddenLine xmlns="" xmlns:a14="http://schemas.microsoft.com/office/drawing/2010/main" w="9525">
+                <a14:hiddenLine xmlns:a14="http://schemas.microsoft.com/office/drawing/2010/main" xmlns="" w="9525">
                   <a:solidFill>
                     <a:srgbClr val="000000"/>
                   </a:solidFill>
@@ -4026,7 +4027,7 @@
             </a:ln>
             <a:extLst>
               <a:ext uri="{91240B29-F687-4f45-9708-019B960494DF}">
-                <a14:hiddenLine xmlns="" xmlns:a14="http://schemas.microsoft.com/office/drawing/2010/main" w="9525">
+                <a14:hiddenLine xmlns:a14="http://schemas.microsoft.com/office/drawing/2010/main" xmlns="" w="9525">
                   <a:solidFill>
                     <a:srgbClr val="000000"/>
                   </a:solidFill>
@@ -4088,7 +4089,7 @@
             </a:ln>
             <a:extLst>
               <a:ext uri="{91240B29-F687-4f45-9708-019B960494DF}">
-                <a14:hiddenLine xmlns="" xmlns:a14="http://schemas.microsoft.com/office/drawing/2010/main" w="9525">
+                <a14:hiddenLine xmlns:a14="http://schemas.microsoft.com/office/drawing/2010/main" xmlns="" w="9525">
                   <a:solidFill>
                     <a:srgbClr val="000000"/>
                   </a:solidFill>
@@ -4178,7 +4179,7 @@
             </a:ln>
             <a:extLst>
               <a:ext uri="{91240B29-F687-4f45-9708-019B960494DF}">
-                <a14:hiddenLine xmlns="" xmlns:a14="http://schemas.microsoft.com/office/drawing/2010/main" w="9525">
+                <a14:hiddenLine xmlns:a14="http://schemas.microsoft.com/office/drawing/2010/main" xmlns="" w="9525">
                   <a:solidFill>
                     <a:srgbClr val="000000"/>
                   </a:solidFill>
@@ -4268,7 +4269,7 @@
             </a:ln>
             <a:extLst>
               <a:ext uri="{91240B29-F687-4f45-9708-019B960494DF}">
-                <a14:hiddenLine xmlns="" xmlns:a14="http://schemas.microsoft.com/office/drawing/2010/main" w="9525">
+                <a14:hiddenLine xmlns:a14="http://schemas.microsoft.com/office/drawing/2010/main" xmlns="" w="9525">
                   <a:solidFill>
                     <a:srgbClr val="000000"/>
                   </a:solidFill>
@@ -4330,7 +4331,7 @@
             </a:ln>
             <a:extLst>
               <a:ext uri="{91240B29-F687-4f45-9708-019B960494DF}">
-                <a14:hiddenLine xmlns="" xmlns:a14="http://schemas.microsoft.com/office/drawing/2010/main" w="9525">
+                <a14:hiddenLine xmlns:a14="http://schemas.microsoft.com/office/drawing/2010/main" xmlns="" w="9525">
                   <a:solidFill>
                     <a:srgbClr val="000000"/>
                   </a:solidFill>
@@ -4450,7 +4451,7 @@
             </a:ln>
             <a:extLst>
               <a:ext uri="{91240B29-F687-4f45-9708-019B960494DF}">
-                <a14:hiddenLine xmlns="" xmlns:a14="http://schemas.microsoft.com/office/drawing/2010/main" w="9525">
+                <a14:hiddenLine xmlns:a14="http://schemas.microsoft.com/office/drawing/2010/main" xmlns="" w="9525">
                   <a:solidFill>
                     <a:srgbClr val="000000"/>
                   </a:solidFill>
@@ -4518,7 +4519,7 @@
             </a:ln>
             <a:extLst>
               <a:ext uri="{91240B29-F687-4f45-9708-019B960494DF}">
-                <a14:hiddenLine xmlns="" xmlns:a14="http://schemas.microsoft.com/office/drawing/2010/main" w="9525">
+                <a14:hiddenLine xmlns:a14="http://schemas.microsoft.com/office/drawing/2010/main" xmlns="" w="9525">
                   <a:solidFill>
                     <a:srgbClr val="000000"/>
                   </a:solidFill>
@@ -4608,7 +4609,7 @@
             </a:ln>
             <a:extLst>
               <a:ext uri="{91240B29-F687-4f45-9708-019B960494DF}">
-                <a14:hiddenLine xmlns="" xmlns:a14="http://schemas.microsoft.com/office/drawing/2010/main" w="9525">
+                <a14:hiddenLine xmlns:a14="http://schemas.microsoft.com/office/drawing/2010/main" xmlns="" w="9525">
                   <a:solidFill>
                     <a:srgbClr val="000000"/>
                   </a:solidFill>
@@ -4748,7 +4749,7 @@
           <a:p>
             <a:fld id="{56B791C0-0E59-4EFD-BC9B-AB19E867DAD6}" type="datetime1">
               <a:rPr lang="en-US" smtClean="0"/>
-              <a:t>8/20/2023</a:t>
+              <a:t>9/11/2023</a:t>
             </a:fld>
             <a:endParaRPr lang="en-US" dirty="0"/>
           </a:p>
@@ -4952,10 +4953,9 @@
               <a:buNone/>
             </a:pPr>
             <a:r>
-              <a:rPr lang="en-US"/>
+              <a:rPr lang="en-US" dirty="0"/>
               <a:t>Click icon to add picture</a:t>
             </a:r>
-            <a:endParaRPr lang="en-US" dirty="0"/>
           </a:p>
         </p:txBody>
       </p:sp>
@@ -5043,7 +5043,7 @@
           <a:p>
             <a:fld id="{621EE40A-5488-4906-AD66-F338A7711E46}" type="datetime1">
               <a:rPr lang="en-US" smtClean="0"/>
-              <a:t>8/20/2023</a:t>
+              <a:t>9/11/2023</a:t>
             </a:fld>
             <a:endParaRPr lang="en-US" dirty="0"/>
           </a:p>
@@ -5237,7 +5237,7 @@
           <a:p>
             <a:fld id="{297BCE8B-424A-44F2-9441-027CD557E042}" type="datetime1">
               <a:rPr lang="en-US" smtClean="0"/>
-              <a:t>8/20/2023</a:t>
+              <a:t>9/11/2023</a:t>
             </a:fld>
             <a:endParaRPr lang="en-US" dirty="0"/>
           </a:p>
@@ -5498,7 +5498,7 @@
           <a:p>
             <a:fld id="{F0A0DDE4-9E8C-49C7-8357-863BA22A9FB5}" type="datetime1">
               <a:rPr lang="en-US" smtClean="0"/>
-              <a:t>8/20/2023</a:t>
+              <a:t>9/11/2023</a:t>
             </a:fld>
             <a:endParaRPr lang="en-US" dirty="0"/>
           </a:p>
@@ -5930,7 +5930,7 @@
           <a:p>
             <a:fld id="{37FA7EA8-C9DF-4FE2-927A-E2090471346D}" type="datetime1">
               <a:rPr lang="en-US" smtClean="0"/>
-              <a:t>8/20/2023</a:t>
+              <a:t>9/11/2023</a:t>
             </a:fld>
             <a:endParaRPr lang="en-US" dirty="0"/>
           </a:p>
@@ -6474,7 +6474,7 @@
           <a:p>
             <a:fld id="{779E3BEB-49D8-488C-88A8-F1D0DBBAC068}" type="datetime1">
               <a:rPr lang="en-US" smtClean="0"/>
-              <a:t>8/20/2023</a:t>
+              <a:t>9/11/2023</a:t>
             </a:fld>
             <a:endParaRPr lang="en-US" dirty="0"/>
           </a:p>
@@ -6703,10 +6703,9 @@
               <a:buNone/>
             </a:pPr>
             <a:r>
-              <a:rPr lang="en-US"/>
+              <a:rPr lang="en-US" dirty="0"/>
               <a:t>Click icon to add picture</a:t>
             </a:r>
-            <a:endParaRPr lang="en-US" dirty="0"/>
           </a:p>
         </p:txBody>
       </p:sp>
@@ -6902,10 +6901,9 @@
               <a:buNone/>
             </a:pPr>
             <a:r>
-              <a:rPr lang="en-US"/>
+              <a:rPr lang="en-US" dirty="0"/>
               <a:t>Click icon to add picture</a:t>
             </a:r>
-            <a:endParaRPr lang="en-US" dirty="0"/>
           </a:p>
         </p:txBody>
       </p:sp>
@@ -7101,10 +7099,9 @@
               <a:buNone/>
             </a:pPr>
             <a:r>
-              <a:rPr lang="en-US"/>
+              <a:rPr lang="en-US" dirty="0"/>
               <a:t>Click icon to add picture</a:t>
             </a:r>
-            <a:endParaRPr lang="en-US" dirty="0"/>
           </a:p>
         </p:txBody>
       </p:sp>
@@ -7192,7 +7189,7 @@
           <a:p>
             <a:fld id="{CF2ECE7E-2E22-42A0-BC2D-246ECC07237B}" type="datetime1">
               <a:rPr lang="en-US" smtClean="0"/>
-              <a:t>8/20/2023</a:t>
+              <a:t>9/11/2023</a:t>
             </a:fld>
             <a:endParaRPr lang="en-US" dirty="0"/>
           </a:p>
@@ -7360,7 +7357,7 @@
           <a:p>
             <a:fld id="{C69C4AE5-5060-4374-B6E1-6B73D531E3EE}" type="datetime1">
               <a:rPr lang="en-US" smtClean="0"/>
-              <a:t>8/20/2023</a:t>
+              <a:t>9/11/2023</a:t>
             </a:fld>
             <a:endParaRPr lang="en-US" dirty="0"/>
           </a:p>
@@ -7538,7 +7535,7 @@
           <a:p>
             <a:fld id="{11998D02-0DEF-4198-A751-D267DB41BF0B}" type="datetime1">
               <a:rPr lang="en-US" smtClean="0"/>
-              <a:t>8/20/2023</a:t>
+              <a:t>9/11/2023</a:t>
             </a:fld>
             <a:endParaRPr lang="en-US" dirty="0"/>
           </a:p>
@@ -7706,7 +7703,7 @@
           <a:p>
             <a:fld id="{8F422B43-45D4-4608-9F03-122930498C43}" type="datetime1">
               <a:rPr lang="en-US" smtClean="0"/>
-              <a:t>8/20/2023</a:t>
+              <a:t>9/11/2023</a:t>
             </a:fld>
             <a:endParaRPr lang="en-US" dirty="0"/>
           </a:p>
@@ -7728,10 +7725,9 @@
           <a:lstStyle/>
           <a:p>
             <a:r>
-              <a:rPr lang="en-US"/>
+              <a:rPr lang="en-US" dirty="0"/>
               <a:t>Copyright Reliable Energy Analytics LLC (REA) 2018-2023</a:t>
             </a:r>
-            <a:endParaRPr lang="en-US" dirty="0"/>
           </a:p>
         </p:txBody>
       </p:sp>
@@ -7955,7 +7951,7 @@
           <a:p>
             <a:fld id="{8AF39007-0C4C-4662-9209-D5880C6C6463}" type="datetime1">
               <a:rPr lang="en-US" smtClean="0"/>
-              <a:t>8/20/2023</a:t>
+              <a:t>9/11/2023</a:t>
             </a:fld>
             <a:endParaRPr lang="en-US" dirty="0"/>
           </a:p>
@@ -7977,10 +7973,9 @@
           <a:lstStyle/>
           <a:p>
             <a:r>
-              <a:rPr lang="en-US"/>
+              <a:rPr lang="en-US" dirty="0"/>
               <a:t>Copyright Reliable Energy Analytics LLC (REA) 2018-2023</a:t>
             </a:r>
-            <a:endParaRPr lang="en-US" dirty="0"/>
           </a:p>
         </p:txBody>
       </p:sp>
@@ -8186,7 +8181,7 @@
           <a:p>
             <a:fld id="{8D6A9271-10E2-4B68-AE13-FF3919F43119}" type="datetime1">
               <a:rPr lang="en-US" smtClean="0"/>
-              <a:t>8/20/2023</a:t>
+              <a:t>9/11/2023</a:t>
             </a:fld>
             <a:endParaRPr lang="en-US" dirty="0"/>
           </a:p>
@@ -8565,7 +8560,7 @@
           <a:p>
             <a:fld id="{28F7A4B4-2D35-416A-973E-59EAAAA65DE7}" type="datetime1">
               <a:rPr lang="en-US" smtClean="0"/>
-              <a:t>8/20/2023</a:t>
+              <a:t>9/11/2023</a:t>
             </a:fld>
             <a:endParaRPr lang="en-US" dirty="0"/>
           </a:p>
@@ -8681,7 +8676,7 @@
           <a:p>
             <a:fld id="{820E87AD-A1CE-4B6A-A1E1-243C473B1B4F}" type="datetime1">
               <a:rPr lang="en-US" smtClean="0"/>
-              <a:t>8/20/2023</a:t>
+              <a:t>9/11/2023</a:t>
             </a:fld>
             <a:endParaRPr lang="en-US" dirty="0"/>
           </a:p>
@@ -8774,7 +8769,7 @@
           <a:p>
             <a:fld id="{054BD633-0EB0-465D-B200-78F1E8C4393C}" type="datetime1">
               <a:rPr lang="en-US" smtClean="0"/>
-              <a:t>8/20/2023</a:t>
+              <a:t>9/11/2023</a:t>
             </a:fld>
             <a:endParaRPr lang="en-US" dirty="0"/>
           </a:p>
@@ -9021,7 +9016,7 @@
           <a:p>
             <a:fld id="{2DF2695D-A47E-4BE9-B68F-60A28D6B816A}" type="datetime1">
               <a:rPr lang="en-US" smtClean="0"/>
-              <a:t>8/20/2023</a:t>
+              <a:t>9/11/2023</a:t>
             </a:fld>
             <a:endParaRPr lang="en-US" dirty="0"/>
           </a:p>
@@ -9210,10 +9205,9 @@
           </a:lstStyle>
           <a:p>
             <a:r>
-              <a:rPr lang="en-US"/>
+              <a:rPr lang="en-US" dirty="0"/>
               <a:t>Click icon to add picture</a:t>
             </a:r>
-            <a:endParaRPr lang="en-US" dirty="0"/>
           </a:p>
         </p:txBody>
       </p:sp>
@@ -9299,7 +9293,7 @@
           <a:p>
             <a:fld id="{36484291-085B-4DF5-86BA-38F041301A2A}" type="datetime1">
               <a:rPr lang="en-US" smtClean="0"/>
-              <a:t>8/20/2023</a:t>
+              <a:t>9/11/2023</a:t>
             </a:fld>
             <a:endParaRPr lang="en-US" dirty="0"/>
           </a:p>
@@ -9413,7 +9407,7 @@
           <a:noFill/>
           <a:extLst>
             <a:ext uri="{909E8E84-426E-40dd-AFC4-6F175D3DCCD1}">
-              <a14:hiddenFill xmlns="" xmlns:a14="http://schemas.microsoft.com/office/drawing/2010/main">
+              <a14:hiddenFill xmlns:a14="http://schemas.microsoft.com/office/drawing/2010/main" xmlns="">
                 <a:solidFill>
                   <a:srgbClr val="FFFFFF"/>
                 </a:solidFill>
@@ -9487,7 +9481,7 @@
               </a:ln>
               <a:extLst>
                 <a:ext uri="{91240B29-F687-4f45-9708-019B960494DF}">
-                  <a14:hiddenLine xmlns="" xmlns:a14="http://schemas.microsoft.com/office/drawing/2010/main" w="9525">
+                  <a14:hiddenLine xmlns:a14="http://schemas.microsoft.com/office/drawing/2010/main" xmlns="" w="9525">
                     <a:solidFill>
                       <a:srgbClr val="000000"/>
                     </a:solidFill>
@@ -9577,7 +9571,7 @@
               </a:ln>
               <a:extLst>
                 <a:ext uri="{91240B29-F687-4f45-9708-019B960494DF}">
-                  <a14:hiddenLine xmlns="" xmlns:a14="http://schemas.microsoft.com/office/drawing/2010/main" w="9525">
+                  <a14:hiddenLine xmlns:a14="http://schemas.microsoft.com/office/drawing/2010/main" xmlns="" w="9525">
                     <a:solidFill>
                       <a:srgbClr val="000000"/>
                     </a:solidFill>
@@ -9667,7 +9661,7 @@
               </a:ln>
               <a:extLst>
                 <a:ext uri="{91240B29-F687-4f45-9708-019B960494DF}">
-                  <a14:hiddenLine xmlns="" xmlns:a14="http://schemas.microsoft.com/office/drawing/2010/main" w="9525">
+                  <a14:hiddenLine xmlns:a14="http://schemas.microsoft.com/office/drawing/2010/main" xmlns="" w="9525">
                     <a:solidFill>
                       <a:srgbClr val="000000"/>
                     </a:solidFill>
@@ -9729,7 +9723,7 @@
               </a:ln>
               <a:extLst>
                 <a:ext uri="{91240B29-F687-4f45-9708-019B960494DF}">
-                  <a14:hiddenLine xmlns="" xmlns:a14="http://schemas.microsoft.com/office/drawing/2010/main" w="9525">
+                  <a14:hiddenLine xmlns:a14="http://schemas.microsoft.com/office/drawing/2010/main" xmlns="" w="9525">
                     <a:solidFill>
                       <a:srgbClr val="000000"/>
                     </a:solidFill>
@@ -9819,7 +9813,7 @@
               </a:ln>
               <a:extLst>
                 <a:ext uri="{91240B29-F687-4f45-9708-019B960494DF}">
-                  <a14:hiddenLine xmlns="" xmlns:a14="http://schemas.microsoft.com/office/drawing/2010/main" w="9525">
+                  <a14:hiddenLine xmlns:a14="http://schemas.microsoft.com/office/drawing/2010/main" xmlns="" w="9525">
                     <a:solidFill>
                       <a:srgbClr val="000000"/>
                     </a:solidFill>
@@ -9881,7 +9875,7 @@
               </a:ln>
               <a:extLst>
                 <a:ext uri="{91240B29-F687-4f45-9708-019B960494DF}">
-                  <a14:hiddenLine xmlns="" xmlns:a14="http://schemas.microsoft.com/office/drawing/2010/main" w="9525">
+                  <a14:hiddenLine xmlns:a14="http://schemas.microsoft.com/office/drawing/2010/main" xmlns="" w="9525">
                     <a:solidFill>
                       <a:srgbClr val="000000"/>
                     </a:solidFill>
@@ -9943,7 +9937,7 @@
               </a:ln>
               <a:extLst>
                 <a:ext uri="{91240B29-F687-4f45-9708-019B960494DF}">
-                  <a14:hiddenLine xmlns="" xmlns:a14="http://schemas.microsoft.com/office/drawing/2010/main" w="9525">
+                  <a14:hiddenLine xmlns:a14="http://schemas.microsoft.com/office/drawing/2010/main" xmlns="" w="9525">
                     <a:solidFill>
                       <a:srgbClr val="000000"/>
                     </a:solidFill>
@@ -10033,7 +10027,7 @@
               </a:ln>
               <a:extLst>
                 <a:ext uri="{91240B29-F687-4f45-9708-019B960494DF}">
-                  <a14:hiddenLine xmlns="" xmlns:a14="http://schemas.microsoft.com/office/drawing/2010/main" w="9525">
+                  <a14:hiddenLine xmlns:a14="http://schemas.microsoft.com/office/drawing/2010/main" xmlns="" w="9525">
                     <a:solidFill>
                       <a:srgbClr val="000000"/>
                     </a:solidFill>
@@ -10123,7 +10117,7 @@
               </a:ln>
               <a:extLst>
                 <a:ext uri="{91240B29-F687-4f45-9708-019B960494DF}">
-                  <a14:hiddenLine xmlns="" xmlns:a14="http://schemas.microsoft.com/office/drawing/2010/main" w="9525">
+                  <a14:hiddenLine xmlns:a14="http://schemas.microsoft.com/office/drawing/2010/main" xmlns="" w="9525">
                     <a:solidFill>
                       <a:srgbClr val="000000"/>
                     </a:solidFill>
@@ -10185,7 +10179,7 @@
               </a:ln>
               <a:extLst>
                 <a:ext uri="{91240B29-F687-4f45-9708-019B960494DF}">
-                  <a14:hiddenLine xmlns="" xmlns:a14="http://schemas.microsoft.com/office/drawing/2010/main" w="9525">
+                  <a14:hiddenLine xmlns:a14="http://schemas.microsoft.com/office/drawing/2010/main" xmlns="" w="9525">
                     <a:solidFill>
                       <a:srgbClr val="000000"/>
                     </a:solidFill>
@@ -10295,7 +10289,7 @@
               </a:ln>
               <a:extLst>
                 <a:ext uri="{91240B29-F687-4f45-9708-019B960494DF}">
-                  <a14:hiddenLine xmlns="" xmlns:a14="http://schemas.microsoft.com/office/drawing/2010/main" w="9525">
+                  <a14:hiddenLine xmlns:a14="http://schemas.microsoft.com/office/drawing/2010/main" xmlns="" w="9525">
                     <a:solidFill>
                       <a:srgbClr val="000000"/>
                     </a:solidFill>
@@ -10379,7 +10373,7 @@
               </a:ln>
               <a:extLst>
                 <a:ext uri="{91240B29-F687-4f45-9708-019B960494DF}">
-                  <a14:hiddenLine xmlns="" xmlns:a14="http://schemas.microsoft.com/office/drawing/2010/main" w="9525">
+                  <a14:hiddenLine xmlns:a14="http://schemas.microsoft.com/office/drawing/2010/main" xmlns="" w="9525">
                     <a:solidFill>
                       <a:srgbClr val="000000"/>
                     </a:solidFill>
@@ -10441,7 +10435,7 @@
               </a:ln>
               <a:extLst>
                 <a:ext uri="{91240B29-F687-4f45-9708-019B960494DF}">
-                  <a14:hiddenLine xmlns="" xmlns:a14="http://schemas.microsoft.com/office/drawing/2010/main" w="9525">
+                  <a14:hiddenLine xmlns:a14="http://schemas.microsoft.com/office/drawing/2010/main" xmlns="" w="9525">
                     <a:solidFill>
                       <a:srgbClr val="000000"/>
                     </a:solidFill>
@@ -10503,7 +10497,7 @@
               </a:ln>
               <a:extLst>
                 <a:ext uri="{91240B29-F687-4f45-9708-019B960494DF}">
-                  <a14:hiddenLine xmlns="" xmlns:a14="http://schemas.microsoft.com/office/drawing/2010/main" w="9525">
+                  <a14:hiddenLine xmlns:a14="http://schemas.microsoft.com/office/drawing/2010/main" xmlns="" w="9525">
                     <a:solidFill>
                       <a:srgbClr val="000000"/>
                     </a:solidFill>
@@ -10593,7 +10587,7 @@
               </a:ln>
               <a:extLst>
                 <a:ext uri="{91240B29-F687-4f45-9708-019B960494DF}">
-                  <a14:hiddenLine xmlns="" xmlns:a14="http://schemas.microsoft.com/office/drawing/2010/main" w="9525">
+                  <a14:hiddenLine xmlns:a14="http://schemas.microsoft.com/office/drawing/2010/main" xmlns="" w="9525">
                     <a:solidFill>
                       <a:srgbClr val="000000"/>
                     </a:solidFill>
@@ -10627,7 +10621,7 @@
               </a:ln>
               <a:extLst>
                 <a:ext uri="{91240B29-F687-4f45-9708-019B960494DF}">
-                  <a14:hiddenLine xmlns="" xmlns:a14="http://schemas.microsoft.com/office/drawing/2010/main" w="9525">
+                  <a14:hiddenLine xmlns:a14="http://schemas.microsoft.com/office/drawing/2010/main" xmlns="" w="9525">
                     <a:solidFill>
                       <a:srgbClr val="000000"/>
                     </a:solidFill>
@@ -10692,7 +10686,7 @@
               </a:ln>
               <a:extLst>
                 <a:ext uri="{91240B29-F687-4f45-9708-019B960494DF}">
-                  <a14:hiddenLine xmlns="" xmlns:a14="http://schemas.microsoft.com/office/drawing/2010/main" w="9525">
+                  <a14:hiddenLine xmlns:a14="http://schemas.microsoft.com/office/drawing/2010/main" xmlns="" w="9525">
                     <a:solidFill>
                       <a:srgbClr val="000000"/>
                     </a:solidFill>
@@ -10782,7 +10776,7 @@
               </a:ln>
               <a:extLst>
                 <a:ext uri="{91240B29-F687-4f45-9708-019B960494DF}">
-                  <a14:hiddenLine xmlns="" xmlns:a14="http://schemas.microsoft.com/office/drawing/2010/main" w="9525">
+                  <a14:hiddenLine xmlns:a14="http://schemas.microsoft.com/office/drawing/2010/main" xmlns="" w="9525">
                     <a:solidFill>
                       <a:srgbClr val="000000"/>
                     </a:solidFill>
@@ -10844,7 +10838,7 @@
               </a:ln>
               <a:extLst>
                 <a:ext uri="{91240B29-F687-4f45-9708-019B960494DF}">
-                  <a14:hiddenLine xmlns="" xmlns:a14="http://schemas.microsoft.com/office/drawing/2010/main" w="9525">
+                  <a14:hiddenLine xmlns:a14="http://schemas.microsoft.com/office/drawing/2010/main" xmlns="" w="9525">
                     <a:solidFill>
                       <a:srgbClr val="000000"/>
                     </a:solidFill>
@@ -10934,7 +10928,7 @@
               </a:ln>
               <a:extLst>
                 <a:ext uri="{91240B29-F687-4f45-9708-019B960494DF}">
-                  <a14:hiddenLine xmlns="" xmlns:a14="http://schemas.microsoft.com/office/drawing/2010/main" w="9525">
+                  <a14:hiddenLine xmlns:a14="http://schemas.microsoft.com/office/drawing/2010/main" xmlns="" w="9525">
                     <a:solidFill>
                       <a:srgbClr val="000000"/>
                     </a:solidFill>
@@ -10999,7 +10993,7 @@
               </a:ln>
               <a:extLst>
                 <a:ext uri="{91240B29-F687-4f45-9708-019B960494DF}">
-                  <a14:hiddenLine xmlns="" xmlns:a14="http://schemas.microsoft.com/office/drawing/2010/main" w="9525">
+                  <a14:hiddenLine xmlns:a14="http://schemas.microsoft.com/office/drawing/2010/main" xmlns="" w="9525">
                     <a:solidFill>
                       <a:srgbClr val="000000"/>
                     </a:solidFill>
@@ -11061,7 +11055,7 @@
               </a:ln>
               <a:extLst>
                 <a:ext uri="{91240B29-F687-4f45-9708-019B960494DF}">
-                  <a14:hiddenLine xmlns="" xmlns:a14="http://schemas.microsoft.com/office/drawing/2010/main" w="9525">
+                  <a14:hiddenLine xmlns:a14="http://schemas.microsoft.com/office/drawing/2010/main" xmlns="" w="9525">
                     <a:solidFill>
                       <a:srgbClr val="000000"/>
                     </a:solidFill>
@@ -11151,7 +11145,7 @@
               </a:ln>
               <a:extLst>
                 <a:ext uri="{91240B29-F687-4f45-9708-019B960494DF}">
-                  <a14:hiddenLine xmlns="" xmlns:a14="http://schemas.microsoft.com/office/drawing/2010/main" w="9525">
+                  <a14:hiddenLine xmlns:a14="http://schemas.microsoft.com/office/drawing/2010/main" xmlns="" w="9525">
                     <a:solidFill>
                       <a:srgbClr val="000000"/>
                     </a:solidFill>
@@ -11241,7 +11235,7 @@
               </a:ln>
               <a:extLst>
                 <a:ext uri="{91240B29-F687-4f45-9708-019B960494DF}">
-                  <a14:hiddenLine xmlns="" xmlns:a14="http://schemas.microsoft.com/office/drawing/2010/main" w="9525">
+                  <a14:hiddenLine xmlns:a14="http://schemas.microsoft.com/office/drawing/2010/main" xmlns="" w="9525">
                     <a:solidFill>
                       <a:srgbClr val="000000"/>
                     </a:solidFill>
@@ -11306,7 +11300,7 @@
               </a:ln>
               <a:extLst>
                 <a:ext uri="{91240B29-F687-4f45-9708-019B960494DF}">
-                  <a14:hiddenLine xmlns="" xmlns:a14="http://schemas.microsoft.com/office/drawing/2010/main" w="9525">
+                  <a14:hiddenLine xmlns:a14="http://schemas.microsoft.com/office/drawing/2010/main" xmlns="" w="9525">
                     <a:solidFill>
                       <a:srgbClr val="000000"/>
                     </a:solidFill>
@@ -11426,7 +11420,7 @@
               </a:ln>
               <a:extLst>
                 <a:ext uri="{91240B29-F687-4f45-9708-019B960494DF}">
-                  <a14:hiddenLine xmlns="" xmlns:a14="http://schemas.microsoft.com/office/drawing/2010/main" w="9525">
+                  <a14:hiddenLine xmlns:a14="http://schemas.microsoft.com/office/drawing/2010/main" xmlns="" w="9525">
                     <a:solidFill>
                       <a:srgbClr val="000000"/>
                     </a:solidFill>
@@ -11524,7 +11518,7 @@
               </a:ln>
               <a:extLst>
                 <a:ext uri="{91240B29-F687-4f45-9708-019B960494DF}">
-                  <a14:hiddenLine xmlns="" xmlns:a14="http://schemas.microsoft.com/office/drawing/2010/main" w="9525">
+                  <a14:hiddenLine xmlns:a14="http://schemas.microsoft.com/office/drawing/2010/main" xmlns="" w="9525">
                     <a:solidFill>
                       <a:srgbClr val="000000"/>
                     </a:solidFill>
@@ -11639,7 +11633,7 @@
               </a:ln>
               <a:extLst>
                 <a:ext uri="{91240B29-F687-4f45-9708-019B960494DF}">
-                  <a14:hiddenLine xmlns="" xmlns:a14="http://schemas.microsoft.com/office/drawing/2010/main" w="9525">
+                  <a14:hiddenLine xmlns:a14="http://schemas.microsoft.com/office/drawing/2010/main" xmlns="" w="9525">
                     <a:solidFill>
                       <a:srgbClr val="000000"/>
                     </a:solidFill>
@@ -11729,7 +11723,7 @@
               </a:ln>
               <a:extLst>
                 <a:ext uri="{91240B29-F687-4f45-9708-019B960494DF}">
-                  <a14:hiddenLine xmlns="" xmlns:a14="http://schemas.microsoft.com/office/drawing/2010/main" w="9525">
+                  <a14:hiddenLine xmlns:a14="http://schemas.microsoft.com/office/drawing/2010/main" xmlns="" w="9525">
                     <a:solidFill>
                       <a:srgbClr val="000000"/>
                     </a:solidFill>
@@ -11794,7 +11788,7 @@
               </a:ln>
               <a:extLst>
                 <a:ext uri="{91240B29-F687-4f45-9708-019B960494DF}">
-                  <a14:hiddenLine xmlns="" xmlns:a14="http://schemas.microsoft.com/office/drawing/2010/main" w="9525">
+                  <a14:hiddenLine xmlns:a14="http://schemas.microsoft.com/office/drawing/2010/main" xmlns="" w="9525">
                     <a:solidFill>
                       <a:srgbClr val="000000"/>
                     </a:solidFill>
@@ -11884,7 +11878,7 @@
               </a:ln>
               <a:extLst>
                 <a:ext uri="{91240B29-F687-4f45-9708-019B960494DF}">
-                  <a14:hiddenLine xmlns="" xmlns:a14="http://schemas.microsoft.com/office/drawing/2010/main" w="9525">
+                  <a14:hiddenLine xmlns:a14="http://schemas.microsoft.com/office/drawing/2010/main" xmlns="" w="9525">
                     <a:solidFill>
                       <a:srgbClr val="000000"/>
                     </a:solidFill>
@@ -11952,7 +11946,7 @@
               </a:ln>
               <a:extLst>
                 <a:ext uri="{91240B29-F687-4f45-9708-019B960494DF}">
-                  <a14:hiddenLine xmlns="" xmlns:a14="http://schemas.microsoft.com/office/drawing/2010/main" w="9525">
+                  <a14:hiddenLine xmlns:a14="http://schemas.microsoft.com/office/drawing/2010/main" xmlns="" w="9525">
                     <a:solidFill>
                       <a:srgbClr val="000000"/>
                     </a:solidFill>
@@ -12042,7 +12036,7 @@
               </a:ln>
               <a:extLst>
                 <a:ext uri="{91240B29-F687-4f45-9708-019B960494DF}">
-                  <a14:hiddenLine xmlns="" xmlns:a14="http://schemas.microsoft.com/office/drawing/2010/main" w="9525">
+                  <a14:hiddenLine xmlns:a14="http://schemas.microsoft.com/office/drawing/2010/main" xmlns="" w="9525">
                     <a:solidFill>
                       <a:srgbClr val="000000"/>
                     </a:solidFill>
@@ -12110,7 +12104,7 @@
               </a:ln>
               <a:extLst>
                 <a:ext uri="{91240B29-F687-4f45-9708-019B960494DF}">
-                  <a14:hiddenLine xmlns="" xmlns:a14="http://schemas.microsoft.com/office/drawing/2010/main" w="9525">
+                  <a14:hiddenLine xmlns:a14="http://schemas.microsoft.com/office/drawing/2010/main" xmlns="" w="9525">
                     <a:solidFill>
                       <a:srgbClr val="000000"/>
                     </a:solidFill>
@@ -12200,7 +12194,7 @@
               </a:ln>
               <a:extLst>
                 <a:ext uri="{91240B29-F687-4f45-9708-019B960494DF}">
-                  <a14:hiddenLine xmlns="" xmlns:a14="http://schemas.microsoft.com/office/drawing/2010/main" w="9525">
+                  <a14:hiddenLine xmlns:a14="http://schemas.microsoft.com/office/drawing/2010/main" xmlns="" w="9525">
                     <a:solidFill>
                       <a:srgbClr val="000000"/>
                     </a:solidFill>
@@ -12234,7 +12228,7 @@
               </a:ln>
               <a:extLst>
                 <a:ext uri="{91240B29-F687-4f45-9708-019B960494DF}">
-                  <a14:hiddenLine xmlns="" xmlns:a14="http://schemas.microsoft.com/office/drawing/2010/main" w="9525">
+                  <a14:hiddenLine xmlns:a14="http://schemas.microsoft.com/office/drawing/2010/main" xmlns="" w="9525">
                     <a:solidFill>
                       <a:srgbClr val="000000"/>
                     </a:solidFill>
@@ -12374,7 +12368,7 @@
           <a:p>
             <a:fld id="{9C9DCB86-526B-42BA-A6FC-BC125ADF4A2D}" type="datetime1">
               <a:rPr lang="en-US" smtClean="0"/>
-              <a:t>8/20/2023</a:t>
+              <a:t>9/11/2023</a:t>
             </a:fld>
             <a:endParaRPr lang="en-US" dirty="0"/>
           </a:p>
@@ -12414,10 +12408,9 @@
           </a:lstStyle>
           <a:p>
             <a:r>
-              <a:rPr lang="en-US"/>
+              <a:rPr lang="en-US" dirty="0"/>
               <a:t>Copyright Reliable Energy Analytics LLC (REA) 2018-2023</a:t>
             </a:r>
-            <a:endParaRPr lang="en-US" dirty="0"/>
           </a:p>
         </p:txBody>
       </p:sp>
@@ -12829,7 +12822,7 @@
                   <a:schemeClr val="bg1"/>
                 </a:solidFill>
               </a:rPr>
-              <a:t>Tamper-proof Evidence preservation for Officers and Directors</a:t>
+              <a:t>Guidance for Officers and Directors</a:t>
             </a:r>
           </a:p>
         </p:txBody>
@@ -12866,21 +12859,8 @@
                   <a:schemeClr val="bg1"/>
                 </a:solidFill>
               </a:rPr>
-              <a:t>SEC Cybersecurity Requirements for cyber-incident reporting Within 96 hours Demand the preservation of Evidence for PROACTIVE </a:t>
-            </a:r>
-            <a:r>
-              <a:rPr lang="en-US">
-                <a:solidFill>
-                  <a:schemeClr val="bg1"/>
-                </a:solidFill>
-              </a:rPr>
-              <a:t>Cybersecurity DISCLOSURE Controls</a:t>
-            </a:r>
-            <a:endParaRPr lang="en-US" dirty="0">
-              <a:solidFill>
-                <a:schemeClr val="bg1"/>
-              </a:solidFill>
-            </a:endParaRPr>
+              <a:t>SEC Cybersecurity Requirements Include disclosure reporting of Company Cybersecurity Processes and Material Cyber-incidents</a:t>
+            </a:r>
           </a:p>
         </p:txBody>
       </p:sp>
@@ -12907,7 +12887,7 @@
           <a:p>
             <a:fld id="{1342AFA8-D0B4-4B6F-ACD9-56B1414E4501}" type="datetime1">
               <a:rPr lang="en-US" smtClean="0"/>
-              <a:t>8/20/2023</a:t>
+              <a:t>9/11/2023</a:t>
             </a:fld>
             <a:endParaRPr lang="en-US" dirty="0"/>
           </a:p>
@@ -12935,10 +12915,9 @@
           <a:lstStyle/>
           <a:p>
             <a:r>
-              <a:rPr lang="en-US"/>
+              <a:rPr lang="en-US" dirty="0"/>
               <a:t>Copyright Reliable Energy Analytics LLC (REA) 2018-2023</a:t>
             </a:r>
-            <a:endParaRPr lang="en-US" dirty="0"/>
           </a:p>
         </p:txBody>
       </p:sp>
@@ -12975,6 +12954,233 @@
     <p:extLst>
       <p:ext uri="{BB962C8B-B14F-4D97-AF65-F5344CB8AC3E}">
         <p14:creationId xmlns:p14="http://schemas.microsoft.com/office/powerpoint/2010/main" val="1413299128"/>
+      </p:ext>
+    </p:extLst>
+  </p:cSld>
+  <p:clrMapOvr>
+    <a:masterClrMapping/>
+  </p:clrMapOvr>
+</p:sld>
+</file>
+
+<file path=ppt/slides/slide10.xml><?xml version="1.0" encoding="utf-8"?>
+<p:sld xmlns:a="http://schemas.openxmlformats.org/drawingml/2006/main" xmlns:r="http://schemas.openxmlformats.org/officeDocument/2006/relationships" xmlns:p="http://schemas.openxmlformats.org/presentationml/2006/main">
+  <p:cSld>
+    <p:spTree>
+      <p:nvGrpSpPr>
+        <p:cNvPr id="1" name=""/>
+        <p:cNvGrpSpPr/>
+        <p:nvPr/>
+      </p:nvGrpSpPr>
+      <p:grpSpPr>
+        <a:xfrm>
+          <a:off x="0" y="0"/>
+          <a:ext cx="0" cy="0"/>
+          <a:chOff x="0" y="0"/>
+          <a:chExt cx="0" cy="0"/>
+        </a:xfrm>
+      </p:grpSpPr>
+      <p:sp>
+        <p:nvSpPr>
+          <p:cNvPr id="2" name="Title 1">
+            <a:extLst>
+              <a:ext uri="{FF2B5EF4-FFF2-40B4-BE49-F238E27FC236}">
+                <a16:creationId xmlns:a16="http://schemas.microsoft.com/office/drawing/2014/main" id="{19E23E66-56D8-720E-D522-8954956F97C1}"/>
+              </a:ext>
+            </a:extLst>
+          </p:cNvPr>
+          <p:cNvSpPr>
+            <a:spLocks noGrp="1"/>
+          </p:cNvSpPr>
+          <p:nvPr>
+            <p:ph type="title"/>
+          </p:nvPr>
+        </p:nvSpPr>
+        <p:spPr/>
+        <p:txBody>
+          <a:bodyPr/>
+          <a:lstStyle/>
+          <a:p>
+            <a:r>
+              <a:rPr lang="en-US" dirty="0">
+                <a:solidFill>
+                  <a:schemeClr val="bg1"/>
+                </a:solidFill>
+              </a:rPr>
+              <a:t>Next Steps</a:t>
+            </a:r>
+          </a:p>
+        </p:txBody>
+      </p:sp>
+      <p:sp>
+        <p:nvSpPr>
+          <p:cNvPr id="3" name="Content Placeholder 2">
+            <a:extLst>
+              <a:ext uri="{FF2B5EF4-FFF2-40B4-BE49-F238E27FC236}">
+                <a16:creationId xmlns:a16="http://schemas.microsoft.com/office/drawing/2014/main" id="{4A9317B0-AD0D-AC3F-C2D6-D8432D6AE1A6}"/>
+              </a:ext>
+            </a:extLst>
+          </p:cNvPr>
+          <p:cNvSpPr>
+            <a:spLocks noGrp="1"/>
+          </p:cNvSpPr>
+          <p:nvPr>
+            <p:ph idx="1"/>
+          </p:nvPr>
+        </p:nvSpPr>
+        <p:spPr>
+          <a:xfrm>
+            <a:off x="1088145" y="1565906"/>
+            <a:ext cx="9905999" cy="3541714"/>
+          </a:xfrm>
+        </p:spPr>
+        <p:txBody>
+          <a:bodyPr>
+            <a:normAutofit fontScale="92500" lnSpcReduction="10000"/>
+          </a:bodyPr>
+          <a:lstStyle/>
+          <a:p>
+            <a:r>
+              <a:rPr lang="en-US" dirty="0">
+                <a:solidFill>
+                  <a:schemeClr val="bg1"/>
+                </a:solidFill>
+                <a:hlinkClick r:id="rId2"/>
+              </a:rPr>
+              <a:t>Contact REA </a:t>
+            </a:r>
+            <a:r>
+              <a:rPr lang="en-US" dirty="0">
+                <a:solidFill>
+                  <a:schemeClr val="bg1"/>
+                </a:solidFill>
+              </a:rPr>
+              <a:t>to get started by implementing REA’s patented PROACTIVE ”Left of Bang” Software Supply Chain Risk Management (C-SCRM) Cybersecurity Controls (SAG-PM ™) to detect cyber-risks (CISA KEV, etc.) in the software supply chain and preserve the tamper-proof evidence in a secure evidence locker (SAG-CTR ™) that may be presented as evidence to help Officers and Directors defend against personal financial losses in the event of a cyber-incident that results in shareholder lawsuits claiming negligence in “duty of care” responsibilities or SEC fines</a:t>
+            </a:r>
+          </a:p>
+          <a:p>
+            <a:r>
+              <a:rPr lang="en-US" dirty="0">
+                <a:solidFill>
+                  <a:schemeClr val="bg1"/>
+                </a:solidFill>
+              </a:rPr>
+              <a:t>Don’t be caught unprepared when December 2023 rolls around; REA can get you ready within one week in many cases</a:t>
+            </a:r>
+          </a:p>
+          <a:p>
+            <a:endParaRPr lang="en-US" dirty="0">
+              <a:solidFill>
+                <a:schemeClr val="bg1"/>
+              </a:solidFill>
+            </a:endParaRPr>
+          </a:p>
+          <a:p>
+            <a:endParaRPr lang="en-US" dirty="0">
+              <a:solidFill>
+                <a:schemeClr val="bg1"/>
+              </a:solidFill>
+            </a:endParaRPr>
+          </a:p>
+          <a:p>
+            <a:endParaRPr lang="en-US" dirty="0">
+              <a:solidFill>
+                <a:schemeClr val="bg1"/>
+              </a:solidFill>
+            </a:endParaRPr>
+          </a:p>
+        </p:txBody>
+      </p:sp>
+      <p:sp>
+        <p:nvSpPr>
+          <p:cNvPr id="4" name="Date Placeholder 3">
+            <a:extLst>
+              <a:ext uri="{FF2B5EF4-FFF2-40B4-BE49-F238E27FC236}">
+                <a16:creationId xmlns:a16="http://schemas.microsoft.com/office/drawing/2014/main" id="{60941E78-4174-7EC9-9CC4-19CE48439EB5}"/>
+              </a:ext>
+            </a:extLst>
+          </p:cNvPr>
+          <p:cNvSpPr>
+            <a:spLocks noGrp="1"/>
+          </p:cNvSpPr>
+          <p:nvPr>
+            <p:ph type="dt" sz="half" idx="10"/>
+          </p:nvPr>
+        </p:nvSpPr>
+        <p:spPr/>
+        <p:txBody>
+          <a:bodyPr/>
+          <a:lstStyle/>
+          <a:p>
+            <a:fld id="{8F422B43-45D4-4608-9F03-122930498C43}" type="datetime1">
+              <a:rPr lang="en-US" smtClean="0"/>
+              <a:t>9/11/2023</a:t>
+            </a:fld>
+            <a:endParaRPr lang="en-US" dirty="0"/>
+          </a:p>
+        </p:txBody>
+      </p:sp>
+      <p:sp>
+        <p:nvSpPr>
+          <p:cNvPr id="5" name="Footer Placeholder 4">
+            <a:extLst>
+              <a:ext uri="{FF2B5EF4-FFF2-40B4-BE49-F238E27FC236}">
+                <a16:creationId xmlns:a16="http://schemas.microsoft.com/office/drawing/2014/main" id="{E8F6064A-3A3F-1B5E-6E9A-EFB2156B8CDC}"/>
+              </a:ext>
+            </a:extLst>
+          </p:cNvPr>
+          <p:cNvSpPr>
+            <a:spLocks noGrp="1"/>
+          </p:cNvSpPr>
+          <p:nvPr>
+            <p:ph type="ftr" sz="quarter" idx="11"/>
+          </p:nvPr>
+        </p:nvSpPr>
+        <p:spPr/>
+        <p:txBody>
+          <a:bodyPr/>
+          <a:lstStyle/>
+          <a:p>
+            <a:r>
+              <a:rPr lang="en-US" dirty="0"/>
+              <a:t>Copyright Reliable Energy Analytics LLC (REA) 2018-2023</a:t>
+            </a:r>
+          </a:p>
+        </p:txBody>
+      </p:sp>
+      <p:sp>
+        <p:nvSpPr>
+          <p:cNvPr id="6" name="Slide Number Placeholder 5">
+            <a:extLst>
+              <a:ext uri="{FF2B5EF4-FFF2-40B4-BE49-F238E27FC236}">
+                <a16:creationId xmlns:a16="http://schemas.microsoft.com/office/drawing/2014/main" id="{A5947F98-11D3-BBBC-A1BC-4D00E28CF286}"/>
+              </a:ext>
+            </a:extLst>
+          </p:cNvPr>
+          <p:cNvSpPr>
+            <a:spLocks noGrp="1"/>
+          </p:cNvSpPr>
+          <p:nvPr>
+            <p:ph type="sldNum" sz="quarter" idx="12"/>
+          </p:nvPr>
+        </p:nvSpPr>
+        <p:spPr/>
+        <p:txBody>
+          <a:bodyPr/>
+          <a:lstStyle/>
+          <a:p>
+            <a:fld id="{6D22F896-40B5-4ADD-8801-0D06FADFA095}" type="slidenum">
+              <a:rPr lang="en-US" smtClean="0"/>
+              <a:t>10</a:t>
+            </a:fld>
+            <a:endParaRPr lang="en-US" dirty="0"/>
+          </a:p>
+        </p:txBody>
+      </p:sp>
+    </p:spTree>
+    <p:extLst>
+      <p:ext uri="{BB962C8B-B14F-4D97-AF65-F5344CB8AC3E}">
+        <p14:creationId xmlns:p14="http://schemas.microsoft.com/office/powerpoint/2010/main" val="3909172607"/>
       </p:ext>
     </p:extLst>
   </p:cSld>
@@ -13062,7 +13268,7 @@
         </p:spPr>
         <p:txBody>
           <a:bodyPr>
-            <a:normAutofit fontScale="62500" lnSpcReduction="20000"/>
+            <a:normAutofit fontScale="70000" lnSpcReduction="20000"/>
           </a:bodyPr>
           <a:lstStyle/>
           <a:p>
@@ -13072,31 +13278,22 @@
                   <a:schemeClr val="bg1"/>
                 </a:solidFill>
               </a:rPr>
-              <a:t>The newly proposed </a:t>
+              <a:t>The newly adopted </a:t>
             </a:r>
             <a:r>
               <a:rPr lang="en-US" sz="2900" dirty="0">
                 <a:solidFill>
                   <a:schemeClr val="bg1"/>
                 </a:solidFill>
-                <a:hlinkClick r:id="rId2">
-                  <a:extLst>
-                    <a:ext uri="{A12FA001-AC4F-418D-AE19-62706E023703}">
-                      <ahyp:hlinkClr xmlns:ahyp="http://schemas.microsoft.com/office/drawing/2018/hyperlinkcolor" val="tx"/>
-                    </a:ext>
-                  </a:extLst>
-                </a:hlinkClick>
+                <a:hlinkClick r:id="rId2"/>
               </a:rPr>
-              <a:t>SEC cybersecurity incident reporting rules</a:t>
-            </a:r>
-            <a:r>
-              <a:rPr lang="en-US" sz="2900" dirty="0">
-                <a:solidFill>
-                  <a:schemeClr val="bg1"/>
-                </a:solidFill>
-              </a:rPr>
-              <a:t> are now available for review requiring the reporting of material cyber-incidents with 96 hours of confirmation</a:t>
-            </a:r>
+              <a:t>SEC cybersecurity rules are now codified into Federal Regulations</a:t>
+            </a:r>
+            <a:endParaRPr lang="en-US" sz="2900" dirty="0">
+              <a:solidFill>
+                <a:schemeClr val="bg1"/>
+              </a:solidFill>
+            </a:endParaRPr>
           </a:p>
           <a:p>
             <a:r>
@@ -13108,12 +13305,13 @@
               <a:t>Require current </a:t>
             </a:r>
             <a:r>
-              <a:rPr lang="en-US" sz="2900" b="1" u="sng" dirty="0">
+              <a:rPr lang="en-US" sz="2900" b="1" dirty="0">
                 <a:solidFill>
                   <a:schemeClr val="bg1"/>
                 </a:solidFill>
+                <a:hlinkClick r:id="rId3"/>
               </a:rPr>
-              <a:t>reporting about material cybersecurity incidents within 4 days </a:t>
+              <a:t>reporting about material cybersecurity incidents within 4 business days </a:t>
             </a:r>
             <a:r>
               <a:rPr lang="en-US" sz="2900" dirty="0">
@@ -13130,16 +13328,26 @@
                 <a:solidFill>
                   <a:schemeClr val="bg1"/>
                 </a:solidFill>
+                <a:hlinkClick r:id="rId4"/>
               </a:rPr>
               <a:t>Require </a:t>
             </a:r>
             <a:r>
-              <a:rPr lang="en-US" sz="2900" b="1" u="sng" dirty="0">
+              <a:rPr lang="en-US" sz="2900" b="1" dirty="0">
+                <a:solidFill>
+                  <a:schemeClr val="bg1"/>
+                </a:solidFill>
+                <a:hlinkClick r:id="rId4"/>
+              </a:rPr>
+              <a:t>periodic disclosures</a:t>
+            </a:r>
+            <a:r>
+              <a:rPr lang="en-US" sz="2900" b="1" dirty="0">
                 <a:solidFill>
                   <a:schemeClr val="bg1"/>
                 </a:solidFill>
               </a:rPr>
-              <a:t>periodic disclosures regarding</a:t>
+              <a:t> regarding</a:t>
             </a:r>
             <a:r>
               <a:rPr lang="en-US" sz="2900" dirty="0">
@@ -13153,7 +13361,7 @@
           <a:p>
             <a:pPr lvl="1"/>
             <a:r>
-              <a:rPr lang="en-US" sz="2500" b="1" u="sng" dirty="0">
+              <a:rPr lang="en-US" sz="2500" b="1" dirty="0">
                 <a:solidFill>
                   <a:schemeClr val="bg1"/>
                 </a:solidFill>
@@ -13164,7 +13372,7 @@
           <a:p>
             <a:pPr lvl="1"/>
             <a:r>
-              <a:rPr lang="en-US" sz="2500" b="1" u="sng" dirty="0">
+              <a:rPr lang="en-US" sz="2500" b="1" dirty="0">
                 <a:solidFill>
                   <a:schemeClr val="bg1"/>
                 </a:solidFill>
@@ -13175,7 +13383,7 @@
           <a:p>
             <a:pPr lvl="1"/>
             <a:r>
-              <a:rPr lang="en-US" sz="2500" b="1" u="sng" dirty="0">
+              <a:rPr lang="en-US" sz="2500" b="1" dirty="0">
                 <a:solidFill>
                   <a:schemeClr val="bg1"/>
                 </a:solidFill>
@@ -13209,47 +13417,14 @@
                   <a:schemeClr val="bg1"/>
                 </a:solidFill>
               </a:rPr>
-              <a:t>Require the cybersecurity disclosures to be presented in Inline </a:t>
-            </a:r>
-            <a:r>
-              <a:rPr lang="en-US" sz="2900" dirty="0" err="1">
+              <a:t>The proposed amendments are designed to </a:t>
+            </a:r>
+            <a:r>
+              <a:rPr lang="en-US" sz="2900" b="1" dirty="0">
                 <a:solidFill>
                   <a:schemeClr val="bg1"/>
                 </a:solidFill>
-              </a:rPr>
-              <a:t>eXtensible</a:t>
-            </a:r>
-            <a:r>
-              <a:rPr lang="en-US" sz="2900" dirty="0">
-                <a:solidFill>
-                  <a:schemeClr val="bg1"/>
-                </a:solidFill>
-              </a:rPr>
-              <a:t> Business Reporting Language (Inline XBRL). </a:t>
-            </a:r>
-            <a:r>
-              <a:rPr lang="en-US" dirty="0">
-                <a:solidFill>
-                  <a:schemeClr val="bg1"/>
-                </a:solidFill>
-              </a:rPr>
-              <a:t>	</a:t>
-            </a:r>
-          </a:p>
-          <a:p>
-            <a:r>
-              <a:rPr lang="en-US" sz="2900" dirty="0">
-                <a:solidFill>
-                  <a:schemeClr val="bg1"/>
-                </a:solidFill>
-              </a:rPr>
-              <a:t> The proposed amendments are designed to </a:t>
-            </a:r>
-            <a:r>
-              <a:rPr lang="en-US" sz="2900" b="1" u="sng" dirty="0">
-                <a:solidFill>
-                  <a:schemeClr val="bg1"/>
-                </a:solidFill>
+                <a:hlinkClick r:id="rId5"/>
               </a:rPr>
               <a:t>better inform investors about a registrant’s risk management, strategy, and governance </a:t>
             </a:r>
@@ -13294,7 +13469,7 @@
           <a:p>
             <a:fld id="{24ED1F1F-89F4-49B5-8EEC-B205C98801EE}" type="datetime1">
               <a:rPr lang="en-US" smtClean="0"/>
-              <a:t>8/20/2023</a:t>
+              <a:t>9/11/2023</a:t>
             </a:fld>
             <a:endParaRPr lang="en-US" dirty="0"/>
           </a:p>
@@ -13322,10 +13497,9 @@
           <a:lstStyle/>
           <a:p>
             <a:r>
-              <a:rPr lang="en-US"/>
+              <a:rPr lang="en-US" dirty="0"/>
               <a:t>Copyright Reliable Energy Analytics LLC (REA) 2018-2023</a:t>
             </a:r>
-            <a:endParaRPr lang="en-US" dirty="0"/>
           </a:p>
         </p:txBody>
       </p:sp>
@@ -13416,7 +13590,7 @@
           <a:p>
             <a:fld id="{8F422B43-45D4-4608-9F03-122930498C43}" type="datetime1">
               <a:rPr lang="en-US" smtClean="0"/>
-              <a:t>8/20/2023</a:t>
+              <a:t>9/11/2023</a:t>
             </a:fld>
             <a:endParaRPr lang="en-US" dirty="0"/>
           </a:p>
@@ -13654,16 +13828,28 @@
           </a:p>
           <a:p>
             <a:r>
-              <a:rPr lang="en-US" sz="1800" b="0" i="0" u="none" strike="noStrike" baseline="0" dirty="0">
+              <a:rPr lang="en-US" sz="2800" b="0" i="0" strike="noStrike" baseline="0" dirty="0">
                 <a:solidFill>
                   <a:srgbClr val="000000"/>
                 </a:solidFill>
                 <a:latin typeface="Arial" panose="020B0604020202020204" pitchFamily="34" charset="0"/>
               </a:rPr>
-              <a:t>Describe its policies and procedures, if any, for </a:t>
-            </a:r>
-            <a:r>
-              <a:rPr lang="en-US" sz="1800" b="1" i="0" u="sng" strike="noStrike" baseline="0" dirty="0">
+              <a:t>Describe its policies and procedures, if any</a:t>
+            </a:r>
+            <a:r>
+              <a:rPr lang="en-US" sz="2800" dirty="0">
+                <a:solidFill>
+                  <a:srgbClr val="000000"/>
+                </a:solidFill>
+                <a:latin typeface="Arial" panose="020B0604020202020204" pitchFamily="34" charset="0"/>
+              </a:rPr>
+              <a:t>: </a:t>
+            </a:r>
+          </a:p>
+          <a:p>
+            <a:pPr lvl="1"/>
+            <a:r>
+              <a:rPr lang="en-US" sz="1800" b="1" i="0" strike="noStrike" baseline="0" dirty="0">
                 <a:solidFill>
                   <a:srgbClr val="000000"/>
                 </a:solidFill>
@@ -13672,7 +13858,7 @@
               <a:t>the identification and management of risks from cybersecurity threats, including whether the registrant considers cybersecurity as part of its business strategy, financial planning, and capital allocation</a:t>
             </a:r>
             <a:r>
-              <a:rPr lang="en-US" sz="1800" b="0" i="0" u="none" strike="noStrike" baseline="0" dirty="0">
+              <a:rPr lang="en-US" sz="1800" b="0" i="0" strike="noStrike" baseline="0" dirty="0">
                 <a:solidFill>
                   <a:srgbClr val="000000"/>
                 </a:solidFill>
@@ -13682,43 +13868,15 @@
             </a:r>
           </a:p>
           <a:p>
-            <a:r>
-              <a:rPr lang="en-US" sz="1800" b="0" i="0" u="none" strike="noStrike" baseline="0" dirty="0">
-                <a:solidFill>
-                  <a:srgbClr val="000000"/>
-                </a:solidFill>
-                <a:latin typeface="Arial" panose="020B0604020202020204" pitchFamily="34" charset="0"/>
-              </a:rPr>
-              <a:t>Require </a:t>
-            </a:r>
-            <a:r>
-              <a:rPr lang="en-US" sz="1800" b="1" i="0" u="sng" strike="noStrike" baseline="0" dirty="0">
+            <a:pPr lvl="1"/>
+            <a:r>
+              <a:rPr lang="en-US" sz="1800" b="1" i="0" strike="noStrike" baseline="0" dirty="0">
                 <a:solidFill>
                   <a:srgbClr val="000000"/>
                 </a:solidFill>
                 <a:latin typeface="Arial" panose="020B0604020202020204" pitchFamily="34" charset="0"/>
               </a:rPr>
               <a:t>disclosure about the board’s oversight of cybersecurity risk and management’s role and expertise in assessing and managing cybersecurity risk and implementing the registrant’s cybersecurity policies, procedures, and strategies. </a:t>
-            </a:r>
-          </a:p>
-          <a:p>
-            <a:r>
-              <a:rPr lang="en-US" sz="1800" b="0" i="0" u="none" strike="noStrike" baseline="0" dirty="0">
-                <a:solidFill>
-                  <a:srgbClr val="000000"/>
-                </a:solidFill>
-                <a:latin typeface="Arial" panose="020B0604020202020204" pitchFamily="34" charset="0"/>
-              </a:rPr>
-              <a:t>Amend Item 407 of Regulation S-K and Form 20-F to </a:t>
-            </a:r>
-            <a:r>
-              <a:rPr lang="en-US" sz="1800" b="1" i="0" u="sng" strike="noStrike" baseline="0" dirty="0">
-                <a:solidFill>
-                  <a:srgbClr val="000000"/>
-                </a:solidFill>
-                <a:latin typeface="Arial" panose="020B0604020202020204" pitchFamily="34" charset="0"/>
-              </a:rPr>
-              <a:t>require disclosure regarding board member cybersecurity expertise. Proposed Item 407(j) would require disclosure in annual reports and certain proxy filings if any member of the registrant’s board of directors has expertise in cybersecurity, including the name(s) of any such director(s) and any detail necessary to fully describe the nature of the expertise. </a:t>
             </a:r>
           </a:p>
           <a:p>
@@ -13749,7 +13907,7 @@
           <a:p>
             <a:fld id="{8F422B43-45D4-4608-9F03-122930498C43}" type="datetime1">
               <a:rPr lang="en-US" smtClean="0"/>
-              <a:t>8/20/2023</a:t>
+              <a:t>9/11/2023</a:t>
             </a:fld>
             <a:endParaRPr lang="en-US" dirty="0"/>
           </a:p>
@@ -13777,10 +13935,9 @@
           <a:lstStyle/>
           <a:p>
             <a:r>
-              <a:rPr lang="en-US"/>
+              <a:rPr lang="en-US" dirty="0"/>
               <a:t>Copyright Reliable Energy Analytics LLC (REA) 2018-2023</a:t>
             </a:r>
-            <a:endParaRPr lang="en-US" dirty="0"/>
           </a:p>
         </p:txBody>
       </p:sp>
@@ -13972,19 +14129,34 @@
                 <a:solidFill>
                   <a:schemeClr val="bg1"/>
                 </a:solidFill>
+                <a:hlinkClick r:id="rId3"/>
               </a:rPr>
-              <a:t>Directors and Officers could be held personally liable in a shareholder lawsuit resulting from a cyber-incident that results in shareholder losses</a:t>
-            </a:r>
-          </a:p>
-          <a:p>
+              <a:t>Directors and Officers could be held personally liable in a shareholder lawsuit </a:t>
+            </a:r>
             <a:r>
               <a:rPr lang="en-US" dirty="0">
                 <a:solidFill>
                   <a:schemeClr val="bg1"/>
                 </a:solidFill>
               </a:rPr>
-              <a:t>Directors and Officers need to ensure that cybersecurity controls are in place and functioning properly for both PROACTIVE prevention of harm, and REACTIVE detection and remediation/recover from a cyber-incident</a:t>
-            </a:r>
+              <a:t>resulting from a cyber-incident that results in shareholder losses</a:t>
+            </a:r>
+          </a:p>
+          <a:p>
+            <a:r>
+              <a:rPr lang="en-US" dirty="0">
+                <a:solidFill>
+                  <a:schemeClr val="bg1"/>
+                </a:solidFill>
+                <a:hlinkClick r:id="rId4"/>
+              </a:rPr>
+              <a:t>Directors and Officers need to provide proof that cybersecurity controls are documented and functioning properly, including supply chain cyber-risk detection</a:t>
+            </a:r>
+            <a:endParaRPr lang="en-US" dirty="0">
+              <a:solidFill>
+                <a:schemeClr val="bg1"/>
+              </a:solidFill>
+            </a:endParaRPr>
           </a:p>
           <a:p>
             <a:r>
@@ -13993,7 +14165,7 @@
                   <a:schemeClr val="bg1"/>
                 </a:solidFill>
               </a:rPr>
-              <a:t>Tamper-proof evidence of these controls will be vital in any shareholder lawsuits aiming to hold officers with fiduciary duties personally liable</a:t>
+              <a:t>Documented processes (disclosures) and tamper-proof evidence of these controls will be vital in any shareholder lawsuits aiming to hold officers with fiduciary duties personally liable</a:t>
             </a:r>
           </a:p>
           <a:p>
@@ -14028,7 +14200,7 @@
           <a:p>
             <a:fld id="{8F422B43-45D4-4608-9F03-122930498C43}" type="datetime1">
               <a:rPr lang="en-US" smtClean="0"/>
-              <a:t>8/20/2023</a:t>
+              <a:t>9/11/2023</a:t>
             </a:fld>
             <a:endParaRPr lang="en-US" dirty="0"/>
           </a:p>
@@ -14056,10 +14228,9 @@
           <a:lstStyle/>
           <a:p>
             <a:r>
-              <a:rPr lang="en-US"/>
+              <a:rPr lang="en-US" dirty="0"/>
               <a:t>Copyright Reliable Energy Analytics LLC (REA) 2018-2023</a:t>
             </a:r>
-            <a:endParaRPr lang="en-US" dirty="0"/>
           </a:p>
         </p:txBody>
       </p:sp>
@@ -14183,49 +14354,9 @@
         </p:spPr>
         <p:txBody>
           <a:bodyPr>
-            <a:normAutofit fontScale="85000" lnSpcReduction="10000"/>
+            <a:normAutofit fontScale="85000" lnSpcReduction="20000"/>
           </a:bodyPr>
           <a:lstStyle/>
-          <a:p>
-            <a:r>
-              <a:rPr lang="en-US" dirty="0">
-                <a:solidFill>
-                  <a:schemeClr val="bg1"/>
-                </a:solidFill>
-              </a:rPr>
-              <a:t>SEC Cybersecurity rules go into effect December 2023</a:t>
-            </a:r>
-          </a:p>
-          <a:p>
-            <a:r>
-              <a:rPr lang="en-US" dirty="0">
-                <a:solidFill>
-                  <a:schemeClr val="bg1"/>
-                </a:solidFill>
-              </a:rPr>
-              <a:t>SEC rules require visibility into material cyber-incidents with 96 hours exposing Officers and Directors to potential lawsuits from shareholders</a:t>
-            </a:r>
-          </a:p>
-          <a:p>
-            <a:r>
-              <a:rPr lang="en-US" dirty="0">
-                <a:solidFill>
-                  <a:schemeClr val="bg1"/>
-                </a:solidFill>
-              </a:rPr>
-              <a:t>SEC rules require Companies to disclose their processes for cybersecurity risk management, especially for known exploited vulnerabilities that represent cyber-risk</a:t>
-            </a:r>
-          </a:p>
-          <a:p>
-            <a:r>
-              <a:rPr lang="en-US" dirty="0">
-                <a:solidFill>
-                  <a:schemeClr val="bg1"/>
-                </a:solidFill>
-              </a:rPr>
-              <a:t>SEC rules make Officers and Directors responsible for cybersecurity processes oversight</a:t>
-            </a:r>
-          </a:p>
           <a:p>
             <a:r>
               <a:rPr lang="en-US" dirty="0">
@@ -14234,6 +14365,76 @@
                 </a:solidFill>
                 <a:hlinkClick r:id="rId2"/>
               </a:rPr>
+              <a:t>SEC Cybersecurity rules go into effect December 2023</a:t>
+            </a:r>
+            <a:endParaRPr lang="en-US" dirty="0">
+              <a:solidFill>
+                <a:schemeClr val="bg1"/>
+              </a:solidFill>
+            </a:endParaRPr>
+          </a:p>
+          <a:p>
+            <a:r>
+              <a:rPr lang="en-US" dirty="0">
+                <a:solidFill>
+                  <a:schemeClr val="bg1"/>
+                </a:solidFill>
+                <a:hlinkClick r:id="rId3"/>
+              </a:rPr>
+              <a:t>SEC rules require visibility into material cyber-incidents with 96 hours</a:t>
+            </a:r>
+            <a:r>
+              <a:rPr lang="en-US" dirty="0">
+                <a:solidFill>
+                  <a:schemeClr val="bg1"/>
+                </a:solidFill>
+              </a:rPr>
+              <a:t> exposing Officers and Directors to potential lawsuits from shareholders</a:t>
+            </a:r>
+          </a:p>
+          <a:p>
+            <a:r>
+              <a:rPr lang="en-US" dirty="0">
+                <a:solidFill>
+                  <a:schemeClr val="bg1"/>
+                </a:solidFill>
+                <a:hlinkClick r:id="rId4"/>
+              </a:rPr>
+              <a:t>SEC rules require Companies to disclose their processes for cybersecurity risk management</a:t>
+            </a:r>
+            <a:r>
+              <a:rPr lang="en-US" dirty="0">
+                <a:solidFill>
+                  <a:schemeClr val="bg1"/>
+                </a:solidFill>
+              </a:rPr>
+              <a:t>, especially for known exploited software vulnerabilities that represent cyber-risk</a:t>
+            </a:r>
+          </a:p>
+          <a:p>
+            <a:r>
+              <a:rPr lang="en-US" dirty="0">
+                <a:solidFill>
+                  <a:schemeClr val="bg1"/>
+                </a:solidFill>
+                <a:hlinkClick r:id="rId4"/>
+              </a:rPr>
+              <a:t>SEC regulations make Officers and Directors responsible for cybersecurity processes oversight</a:t>
+            </a:r>
+            <a:endParaRPr lang="en-US" dirty="0">
+              <a:solidFill>
+                <a:schemeClr val="bg1"/>
+              </a:solidFill>
+            </a:endParaRPr>
+          </a:p>
+          <a:p>
+            <a:r>
+              <a:rPr lang="en-US" dirty="0">
+                <a:solidFill>
+                  <a:schemeClr val="bg1"/>
+                </a:solidFill>
+                <a:hlinkClick r:id="rId5"/>
+              </a:rPr>
               <a:t>Commercial product offerings are broadly available</a:t>
             </a:r>
             <a:r>
@@ -14284,8 +14485,38 @@
                   <a:schemeClr val="bg1"/>
                 </a:solidFill>
               </a:rPr>
-              <a:t>Failure to perform proactive software supply chain risk management controls may be considered negligent behavior with regard to duty of care fiduciary duties and fail to satisfy SEC good faith compliance expectations</a:t>
-            </a:r>
+              <a:t>Failure to perform proactive software supply chain risk management </a:t>
+            </a:r>
+            <a:r>
+              <a:rPr lang="en-US">
+                <a:solidFill>
+                  <a:schemeClr val="bg1"/>
+                </a:solidFill>
+              </a:rPr>
+              <a:t>and cyber-risk detection </a:t>
+            </a:r>
+            <a:r>
+              <a:rPr lang="en-US" dirty="0">
+                <a:solidFill>
+                  <a:schemeClr val="bg1"/>
+                </a:solidFill>
+              </a:rPr>
+              <a:t>controls </a:t>
+            </a:r>
+            <a:r>
+              <a:rPr lang="en-US" dirty="0">
+                <a:solidFill>
+                  <a:schemeClr val="bg1"/>
+                </a:solidFill>
+                <a:hlinkClick r:id="rId6"/>
+              </a:rPr>
+              <a:t>may be considered negligent behavior with regard to duty of care fiduciary duties and fail to satisfy SEC good faith compliance expectations, opening the door to shareholder lawsuits</a:t>
+            </a:r>
+            <a:endParaRPr lang="en-US" dirty="0">
+              <a:solidFill>
+                <a:schemeClr val="bg1"/>
+              </a:solidFill>
+            </a:endParaRPr>
           </a:p>
         </p:txBody>
       </p:sp>
@@ -14312,7 +14543,7 @@
           <a:p>
             <a:fld id="{8F422B43-45D4-4608-9F03-122930498C43}" type="datetime1">
               <a:rPr lang="en-US" smtClean="0"/>
-              <a:t>8/20/2023</a:t>
+              <a:t>9/11/2023</a:t>
             </a:fld>
             <a:endParaRPr lang="en-US" dirty="0"/>
           </a:p>
@@ -14340,10 +14571,9 @@
           <a:lstStyle/>
           <a:p>
             <a:r>
-              <a:rPr lang="en-US"/>
+              <a:rPr lang="en-US" dirty="0"/>
               <a:t>Copyright Reliable Energy Analytics LLC (REA) 2018-2023</a:t>
             </a:r>
-            <a:endParaRPr lang="en-US" dirty="0"/>
           </a:p>
         </p:txBody>
       </p:sp>
@@ -14570,8 +14800,17 @@
                 <a:solidFill>
                   <a:schemeClr val="bg1"/>
                 </a:solidFill>
+                <a:hlinkClick r:id="rId6"/>
               </a:rPr>
-              <a:t>Rely on REA to present SAG-CTR ™ tamper-proof evidence in court on behalf of the defense (Officers and Directors), in the event of any shareholder lawsuits</a:t>
+              <a:t>Rely on REA to provide process disclosure documentation for software supply chain detection controls (KEV) and present SAG-CTR ™ tamper-proof evidence in court </a:t>
+            </a:r>
+            <a:r>
+              <a:rPr lang="en-US" dirty="0">
+                <a:solidFill>
+                  <a:schemeClr val="bg1"/>
+                </a:solidFill>
+              </a:rPr>
+              <a:t>on behalf of the defense (Officers and Directors), in the event of any shareholder lawsuits</a:t>
             </a:r>
           </a:p>
           <a:p>
@@ -14616,7 +14855,7 @@
           <a:p>
             <a:fld id="{8F422B43-45D4-4608-9F03-122930498C43}" type="datetime1">
               <a:rPr lang="en-US" smtClean="0"/>
-              <a:t>8/20/2023</a:t>
+              <a:t>9/11/2023</a:t>
             </a:fld>
             <a:endParaRPr lang="en-US" dirty="0"/>
           </a:p>
@@ -14644,10 +14883,9 @@
           <a:lstStyle/>
           <a:p>
             <a:r>
-              <a:rPr lang="en-US"/>
+              <a:rPr lang="en-US" dirty="0"/>
               <a:t>Copyright Reliable Energy Analytics LLC (REA) 2018-2023</a:t>
             </a:r>
-            <a:endParaRPr lang="en-US" dirty="0"/>
           </a:p>
         </p:txBody>
       </p:sp>
@@ -14777,7 +15015,7 @@
           <a:p>
             <a:fld id="{8F422B43-45D4-4608-9F03-122930498C43}" type="datetime1">
               <a:rPr lang="en-US" smtClean="0"/>
-              <a:t>8/20/2023</a:t>
+              <a:t>9/11/2023</a:t>
             </a:fld>
             <a:endParaRPr lang="en-US" dirty="0"/>
           </a:p>
@@ -14864,8 +15102,8 @@
         </p:nvSpPr>
         <p:spPr>
           <a:xfrm>
-            <a:off x="1216241" y="1412382"/>
-            <a:ext cx="2166151" cy="1162974"/>
+            <a:off x="1141411" y="1344431"/>
+            <a:ext cx="2240981" cy="1284193"/>
           </a:xfrm>
           <a:prstGeom prst="roundRect">
             <a:avLst/>
@@ -14894,7 +15132,7 @@
             <a:pPr algn="ctr"/>
             <a:r>
               <a:rPr lang="en-US" dirty="0"/>
-              <a:t>Software Supplier provides SBOM and other Supply Chain Artifacts (VRF)</a:t>
+              <a:t>Software Vendor provides SBOM and other Supply Chain Artifacts (VRF) to consumer</a:t>
             </a:r>
           </a:p>
         </p:txBody>
@@ -15210,7 +15448,7 @@
         </p:nvSpPr>
         <p:spPr>
           <a:xfrm>
-            <a:off x="2093648" y="5197505"/>
+            <a:off x="2058136" y="5295163"/>
             <a:ext cx="8347029" cy="369332"/>
           </a:xfrm>
           <a:prstGeom prst="rect">
@@ -15225,11 +15463,7 @@
           <a:lstStyle/>
           <a:p>
             <a:r>
-              <a:rPr lang="en-US" b="1" u="sng" dirty="0">
-                <a:solidFill>
-                  <a:schemeClr val="bg1"/>
-                </a:solidFill>
-              </a:rPr>
+              <a:rPr lang="en-US" b="1" u="sng" dirty="0"/>
               <a:t>Tamperproof evidence stored in an evidence locker is presented in court when needed</a:t>
             </a:r>
           </a:p>
@@ -15245,6 +15479,7 @@
             </a:extLst>
           </p:cNvPr>
           <p:cNvCxnSpPr>
+            <a:cxnSpLocks/>
             <a:stCxn id="7" idx="3"/>
             <a:endCxn id="8" idx="1"/>
           </p:cNvCxnSpPr>
@@ -15253,7 +15488,7 @@
         <p:spPr>
           <a:xfrm flipV="1">
             <a:off x="3382392" y="1984160"/>
-            <a:ext cx="966742" cy="9709"/>
+            <a:ext cx="966742" cy="2368"/>
           </a:xfrm>
           <a:prstGeom prst="straightConnector1">
             <a:avLst/>
@@ -15481,7 +15716,7 @@
           <p:cNvPr id="2" name="Title 1">
             <a:extLst>
               <a:ext uri="{FF2B5EF4-FFF2-40B4-BE49-F238E27FC236}">
-                <a16:creationId xmlns:a16="http://schemas.microsoft.com/office/drawing/2014/main" id="{19E23E66-56D8-720E-D522-8954956F97C1}"/>
+                <a16:creationId xmlns:a16="http://schemas.microsoft.com/office/drawing/2014/main" id="{9703BD51-197F-72ED-DE23-BC9F9D85A182}"/>
               </a:ext>
             </a:extLst>
           </p:cNvPr>
@@ -15492,9 +15727,16 @@
             <p:ph type="title"/>
           </p:nvPr>
         </p:nvSpPr>
-        <p:spPr/>
-        <p:txBody>
-          <a:bodyPr/>
+        <p:spPr>
+          <a:xfrm>
+            <a:off x="1141413" y="71022"/>
+            <a:ext cx="9905998" cy="1258810"/>
+          </a:xfrm>
+        </p:spPr>
+        <p:txBody>
+          <a:bodyPr>
+            <a:normAutofit/>
+          </a:bodyPr>
           <a:lstStyle/>
           <a:p>
             <a:r>
@@ -15503,70 +15745,8 @@
                   <a:schemeClr val="bg1"/>
                 </a:solidFill>
               </a:rPr>
-              <a:t>Next Steps</a:t>
-            </a:r>
-          </a:p>
-        </p:txBody>
-      </p:sp>
-      <p:sp>
-        <p:nvSpPr>
-          <p:cNvPr id="3" name="Content Placeholder 2">
-            <a:extLst>
-              <a:ext uri="{FF2B5EF4-FFF2-40B4-BE49-F238E27FC236}">
-                <a16:creationId xmlns:a16="http://schemas.microsoft.com/office/drawing/2014/main" id="{4A9317B0-AD0D-AC3F-C2D6-D8432D6AE1A6}"/>
-              </a:ext>
-            </a:extLst>
-          </p:cNvPr>
-          <p:cNvSpPr>
-            <a:spLocks noGrp="1"/>
-          </p:cNvSpPr>
-          <p:nvPr>
-            <p:ph idx="1"/>
-          </p:nvPr>
-        </p:nvSpPr>
-        <p:spPr/>
-        <p:txBody>
-          <a:bodyPr/>
-          <a:lstStyle/>
-          <a:p>
-            <a:r>
-              <a:rPr lang="en-US" dirty="0">
-                <a:solidFill>
-                  <a:schemeClr val="bg1"/>
-                </a:solidFill>
-                <a:hlinkClick r:id="rId2"/>
-              </a:rPr>
-              <a:t>Contact REA </a:t>
-            </a:r>
-            <a:r>
-              <a:rPr lang="en-US" dirty="0">
-                <a:solidFill>
-                  <a:schemeClr val="bg1"/>
-                </a:solidFill>
-              </a:rPr>
-              <a:t>to get started by implementing REA’s patented PROACTIVE ”Left of Bang” Software Supply Chain Risk Management (C-SCRM) Cybersecurity Controls (SAG-PM ™) for the software supply chain and preserve the tamper-proof evidence in a secure evidence locker (SAG-CTR ™) that may be presented as evidence to prevent personal financial losses in the event of a cyber-incident that results in shareholder lawsuits claiming negligence in “duty of care” responsibilities or SEC fines</a:t>
-            </a:r>
-          </a:p>
-          <a:p>
-            <a:endParaRPr lang="en-US" dirty="0">
-              <a:solidFill>
-                <a:schemeClr val="bg1"/>
-              </a:solidFill>
-            </a:endParaRPr>
-          </a:p>
-          <a:p>
-            <a:endParaRPr lang="en-US" dirty="0">
-              <a:solidFill>
-                <a:schemeClr val="bg1"/>
-              </a:solidFill>
-            </a:endParaRPr>
-          </a:p>
-          <a:p>
-            <a:endParaRPr lang="en-US" dirty="0">
-              <a:solidFill>
-                <a:schemeClr val="bg1"/>
-              </a:solidFill>
-            </a:endParaRPr>
+              <a:t>Don’t count on the mercy of hackers in December 2023</a:t>
+            </a:r>
           </a:p>
         </p:txBody>
       </p:sp>
@@ -15575,7 +15755,7 @@
           <p:cNvPr id="4" name="Date Placeholder 3">
             <a:extLst>
               <a:ext uri="{FF2B5EF4-FFF2-40B4-BE49-F238E27FC236}">
-                <a16:creationId xmlns:a16="http://schemas.microsoft.com/office/drawing/2014/main" id="{60941E78-4174-7EC9-9CC4-19CE48439EB5}"/>
+                <a16:creationId xmlns:a16="http://schemas.microsoft.com/office/drawing/2014/main" id="{F024A3E3-F394-5426-EB88-654C7FBD02BB}"/>
               </a:ext>
             </a:extLst>
           </p:cNvPr>
@@ -15593,7 +15773,7 @@
           <a:p>
             <a:fld id="{8F422B43-45D4-4608-9F03-122930498C43}" type="datetime1">
               <a:rPr lang="en-US" smtClean="0"/>
-              <a:t>8/20/2023</a:t>
+              <a:t>9/11/2023</a:t>
             </a:fld>
             <a:endParaRPr lang="en-US" dirty="0"/>
           </a:p>
@@ -15604,7 +15784,7 @@
           <p:cNvPr id="5" name="Footer Placeholder 4">
             <a:extLst>
               <a:ext uri="{FF2B5EF4-FFF2-40B4-BE49-F238E27FC236}">
-                <a16:creationId xmlns:a16="http://schemas.microsoft.com/office/drawing/2014/main" id="{E8F6064A-3A3F-1B5E-6E9A-EFB2156B8CDC}"/>
+                <a16:creationId xmlns:a16="http://schemas.microsoft.com/office/drawing/2014/main" id="{ACD02D54-CFE0-E84C-61B3-4FDC44D8C3FE}"/>
               </a:ext>
             </a:extLst>
           </p:cNvPr>
@@ -15621,10 +15801,9 @@
           <a:lstStyle/>
           <a:p>
             <a:r>
-              <a:rPr lang="en-US"/>
+              <a:rPr lang="en-US" dirty="0"/>
               <a:t>Copyright Reliable Energy Analytics LLC (REA) 2018-2023</a:t>
             </a:r>
-            <a:endParaRPr lang="en-US" dirty="0"/>
           </a:p>
         </p:txBody>
       </p:sp>
@@ -15633,7 +15812,7 @@
           <p:cNvPr id="6" name="Slide Number Placeholder 5">
             <a:extLst>
               <a:ext uri="{FF2B5EF4-FFF2-40B4-BE49-F238E27FC236}">
-                <a16:creationId xmlns:a16="http://schemas.microsoft.com/office/drawing/2014/main" id="{A5947F98-11D3-BBBC-A1BC-4D00E28CF286}"/>
+                <a16:creationId xmlns:a16="http://schemas.microsoft.com/office/drawing/2014/main" id="{945F8678-A1E0-5594-3436-CCE1B7281AD9}"/>
               </a:ext>
             </a:extLst>
           </p:cNvPr>
@@ -15657,10 +15836,40 @@
           </a:p>
         </p:txBody>
       </p:sp>
+      <p:pic>
+        <p:nvPicPr>
+          <p:cNvPr id="8" name="Picture 7">
+            <a:extLst>
+              <a:ext uri="{FF2B5EF4-FFF2-40B4-BE49-F238E27FC236}">
+                <a16:creationId xmlns:a16="http://schemas.microsoft.com/office/drawing/2014/main" id="{72B02D0C-A3B8-FB12-5176-2729BFCE58CE}"/>
+              </a:ext>
+            </a:extLst>
+          </p:cNvPr>
+          <p:cNvPicPr>
+            <a:picLocks noChangeAspect="1"/>
+          </p:cNvPicPr>
+          <p:nvPr/>
+        </p:nvPicPr>
+        <p:blipFill>
+          <a:blip r:embed="rId2"/>
+          <a:stretch>
+            <a:fillRect/>
+          </a:stretch>
+        </p:blipFill>
+        <p:spPr>
+          <a:xfrm>
+            <a:off x="2622560" y="1482479"/>
+            <a:ext cx="6467475" cy="4248150"/>
+          </a:xfrm>
+          <a:prstGeom prst="rect">
+            <a:avLst/>
+          </a:prstGeom>
+        </p:spPr>
+      </p:pic>
     </p:spTree>
     <p:extLst>
       <p:ext uri="{BB962C8B-B14F-4D97-AF65-F5344CB8AC3E}">
-        <p14:creationId xmlns:p14="http://schemas.microsoft.com/office/powerpoint/2010/main" val="3909172607"/>
+        <p14:creationId xmlns:p14="http://schemas.microsoft.com/office/powerpoint/2010/main" val="1336125837"/>
       </p:ext>
     </p:extLst>
   </p:cSld>

</xml_diff>

<commit_message>
More Concise with Atlantic Council Link
</commit_message>
<xml_diff>
--- a/2023-0801-SAG-CTR-TP-EVIDENCE-OVERVIEW.pptx
+++ b/2023-0801-SAG-CTR-TP-EVIDENCE-OVERVIEW.pptx
@@ -523,7 +523,7 @@
           <a:noFill/>
           <a:extLst>
             <a:ext uri="{909E8E84-426E-40dd-AFC4-6F175D3DCCD1}">
-              <a14:hiddenFill xmlns:a14="http://schemas.microsoft.com/office/drawing/2010/main" xmlns="">
+              <a14:hiddenFill xmlns="" xmlns:a14="http://schemas.microsoft.com/office/drawing/2010/main">
                 <a:solidFill>
                   <a:srgbClr val="FFFFFF"/>
                 </a:solidFill>
@@ -583,7 +583,7 @@
             </a:ln>
             <a:extLst>
               <a:ext uri="{91240B29-F687-4f45-9708-019B960494DF}">
-                <a14:hiddenLine xmlns:a14="http://schemas.microsoft.com/office/drawing/2010/main" xmlns="" w="9525">
+                <a14:hiddenLine xmlns="" xmlns:a14="http://schemas.microsoft.com/office/drawing/2010/main" w="9525">
                   <a:solidFill>
                     <a:srgbClr val="000000"/>
                   </a:solidFill>
@@ -673,7 +673,7 @@
             </a:ln>
             <a:extLst>
               <a:ext uri="{91240B29-F687-4f45-9708-019B960494DF}">
-                <a14:hiddenLine xmlns:a14="http://schemas.microsoft.com/office/drawing/2010/main" xmlns="" w="9525">
+                <a14:hiddenLine xmlns="" xmlns:a14="http://schemas.microsoft.com/office/drawing/2010/main" w="9525">
                   <a:solidFill>
                     <a:srgbClr val="000000"/>
                   </a:solidFill>
@@ -763,7 +763,7 @@
             </a:ln>
             <a:extLst>
               <a:ext uri="{91240B29-F687-4f45-9708-019B960494DF}">
-                <a14:hiddenLine xmlns:a14="http://schemas.microsoft.com/office/drawing/2010/main" xmlns="" w="9525">
+                <a14:hiddenLine xmlns="" xmlns:a14="http://schemas.microsoft.com/office/drawing/2010/main" w="9525">
                   <a:solidFill>
                     <a:srgbClr val="000000"/>
                   </a:solidFill>
@@ -797,7 +797,7 @@
             </a:ln>
             <a:extLst>
               <a:ext uri="{91240B29-F687-4f45-9708-019B960494DF}">
-                <a14:hiddenLine xmlns:a14="http://schemas.microsoft.com/office/drawing/2010/main" xmlns="" w="9525">
+                <a14:hiddenLine xmlns="" xmlns:a14="http://schemas.microsoft.com/office/drawing/2010/main" w="9525">
                   <a:solidFill>
                     <a:srgbClr val="000000"/>
                   </a:solidFill>
@@ -887,7 +887,7 @@
             </a:ln>
             <a:extLst>
               <a:ext uri="{91240B29-F687-4f45-9708-019B960494DF}">
-                <a14:hiddenLine xmlns:a14="http://schemas.microsoft.com/office/drawing/2010/main" xmlns="" w="9525">
+                <a14:hiddenLine xmlns="" xmlns:a14="http://schemas.microsoft.com/office/drawing/2010/main" w="9525">
                   <a:solidFill>
                     <a:srgbClr val="000000"/>
                   </a:solidFill>
@@ -949,7 +949,7 @@
             </a:ln>
             <a:extLst>
               <a:ext uri="{91240B29-F687-4f45-9708-019B960494DF}">
-                <a14:hiddenLine xmlns:a14="http://schemas.microsoft.com/office/drawing/2010/main" xmlns="" w="9525">
+                <a14:hiddenLine xmlns="" xmlns:a14="http://schemas.microsoft.com/office/drawing/2010/main" w="9525">
                   <a:solidFill>
                     <a:srgbClr val="000000"/>
                   </a:solidFill>
@@ -1011,7 +1011,7 @@
             </a:ln>
             <a:extLst>
               <a:ext uri="{91240B29-F687-4f45-9708-019B960494DF}">
-                <a14:hiddenLine xmlns:a14="http://schemas.microsoft.com/office/drawing/2010/main" xmlns="" w="9525">
+                <a14:hiddenLine xmlns="" xmlns:a14="http://schemas.microsoft.com/office/drawing/2010/main" w="9525">
                   <a:solidFill>
                     <a:srgbClr val="000000"/>
                   </a:solidFill>
@@ -1101,7 +1101,7 @@
             </a:ln>
             <a:extLst>
               <a:ext uri="{91240B29-F687-4f45-9708-019B960494DF}">
-                <a14:hiddenLine xmlns:a14="http://schemas.microsoft.com/office/drawing/2010/main" xmlns="" w="9525">
+                <a14:hiddenLine xmlns="" xmlns:a14="http://schemas.microsoft.com/office/drawing/2010/main" w="9525">
                   <a:solidFill>
                     <a:srgbClr val="000000"/>
                   </a:solidFill>
@@ -1163,7 +1163,7 @@
             </a:ln>
             <a:extLst>
               <a:ext uri="{91240B29-F687-4f45-9708-019B960494DF}">
-                <a14:hiddenLine xmlns:a14="http://schemas.microsoft.com/office/drawing/2010/main" xmlns="" w="9525">
+                <a14:hiddenLine xmlns="" xmlns:a14="http://schemas.microsoft.com/office/drawing/2010/main" w="9525">
                   <a:solidFill>
                     <a:srgbClr val="000000"/>
                   </a:solidFill>
@@ -1225,7 +1225,7 @@
             </a:ln>
             <a:extLst>
               <a:ext uri="{91240B29-F687-4f45-9708-019B960494DF}">
-                <a14:hiddenLine xmlns:a14="http://schemas.microsoft.com/office/drawing/2010/main" xmlns="" w="9525">
+                <a14:hiddenLine xmlns="" xmlns:a14="http://schemas.microsoft.com/office/drawing/2010/main" w="9525">
                   <a:solidFill>
                     <a:srgbClr val="000000"/>
                   </a:solidFill>
@@ -1315,7 +1315,7 @@
             </a:ln>
             <a:extLst>
               <a:ext uri="{91240B29-F687-4f45-9708-019B960494DF}">
-                <a14:hiddenLine xmlns:a14="http://schemas.microsoft.com/office/drawing/2010/main" xmlns="" w="9525">
+                <a14:hiddenLine xmlns="" xmlns:a14="http://schemas.microsoft.com/office/drawing/2010/main" w="9525">
                   <a:solidFill>
                     <a:srgbClr val="000000"/>
                   </a:solidFill>
@@ -1405,7 +1405,7 @@
             </a:ln>
             <a:extLst>
               <a:ext uri="{91240B29-F687-4f45-9708-019B960494DF}">
-                <a14:hiddenLine xmlns:a14="http://schemas.microsoft.com/office/drawing/2010/main" xmlns="" w="9525">
+                <a14:hiddenLine xmlns="" xmlns:a14="http://schemas.microsoft.com/office/drawing/2010/main" w="9525">
                   <a:solidFill>
                     <a:srgbClr val="000000"/>
                   </a:solidFill>
@@ -1467,7 +1467,7 @@
             </a:ln>
             <a:extLst>
               <a:ext uri="{91240B29-F687-4f45-9708-019B960494DF}">
-                <a14:hiddenLine xmlns:a14="http://schemas.microsoft.com/office/drawing/2010/main" xmlns="" w="9525">
+                <a14:hiddenLine xmlns="" xmlns:a14="http://schemas.microsoft.com/office/drawing/2010/main" w="9525">
                   <a:solidFill>
                     <a:srgbClr val="000000"/>
                   </a:solidFill>
@@ -1577,7 +1577,7 @@
             </a:ln>
             <a:extLst>
               <a:ext uri="{91240B29-F687-4f45-9708-019B960494DF}">
-                <a14:hiddenLine xmlns:a14="http://schemas.microsoft.com/office/drawing/2010/main" xmlns="" w="9525">
+                <a14:hiddenLine xmlns="" xmlns:a14="http://schemas.microsoft.com/office/drawing/2010/main" w="9525">
                   <a:solidFill>
                     <a:srgbClr val="000000"/>
                   </a:solidFill>
@@ -1639,7 +1639,7 @@
             </a:ln>
             <a:extLst>
               <a:ext uri="{91240B29-F687-4f45-9708-019B960494DF}">
-                <a14:hiddenLine xmlns:a14="http://schemas.microsoft.com/office/drawing/2010/main" xmlns="" w="9525">
+                <a14:hiddenLine xmlns="" xmlns:a14="http://schemas.microsoft.com/office/drawing/2010/main" w="9525">
                   <a:solidFill>
                     <a:srgbClr val="000000"/>
                   </a:solidFill>
@@ -1729,7 +1729,7 @@
             </a:ln>
             <a:extLst>
               <a:ext uri="{91240B29-F687-4f45-9708-019B960494DF}">
-                <a14:hiddenLine xmlns:a14="http://schemas.microsoft.com/office/drawing/2010/main" xmlns="" w="9525">
+                <a14:hiddenLine xmlns="" xmlns:a14="http://schemas.microsoft.com/office/drawing/2010/main" w="9525">
                   <a:solidFill>
                     <a:srgbClr val="000000"/>
                   </a:solidFill>
@@ -1819,7 +1819,7 @@
             </a:ln>
             <a:extLst>
               <a:ext uri="{91240B29-F687-4f45-9708-019B960494DF}">
-                <a14:hiddenLine xmlns:a14="http://schemas.microsoft.com/office/drawing/2010/main" xmlns="" w="9525">
+                <a14:hiddenLine xmlns="" xmlns:a14="http://schemas.microsoft.com/office/drawing/2010/main" w="9525">
                   <a:solidFill>
                     <a:srgbClr val="000000"/>
                   </a:solidFill>
@@ -1881,7 +1881,7 @@
             </a:ln>
             <a:extLst>
               <a:ext uri="{91240B29-F687-4f45-9708-019B960494DF}">
-                <a14:hiddenLine xmlns:a14="http://schemas.microsoft.com/office/drawing/2010/main" xmlns="" w="9525">
+                <a14:hiddenLine xmlns="" xmlns:a14="http://schemas.microsoft.com/office/drawing/2010/main" w="9525">
                   <a:solidFill>
                     <a:srgbClr val="000000"/>
                   </a:solidFill>
@@ -1971,7 +1971,7 @@
             </a:ln>
             <a:extLst>
               <a:ext uri="{91240B29-F687-4f45-9708-019B960494DF}">
-                <a14:hiddenLine xmlns:a14="http://schemas.microsoft.com/office/drawing/2010/main" xmlns="" w="9525">
+                <a14:hiddenLine xmlns="" xmlns:a14="http://schemas.microsoft.com/office/drawing/2010/main" w="9525">
                   <a:solidFill>
                     <a:srgbClr val="000000"/>
                   </a:solidFill>
@@ -2061,7 +2061,7 @@
             </a:ln>
             <a:extLst>
               <a:ext uri="{91240B29-F687-4f45-9708-019B960494DF}">
-                <a14:hiddenLine xmlns:a14="http://schemas.microsoft.com/office/drawing/2010/main" xmlns="" w="9525">
+                <a14:hiddenLine xmlns="" xmlns:a14="http://schemas.microsoft.com/office/drawing/2010/main" w="9525">
                   <a:solidFill>
                     <a:srgbClr val="000000"/>
                   </a:solidFill>
@@ -2117,7 +2117,7 @@
             </a:ln>
             <a:extLst>
               <a:ext uri="{91240B29-F687-4f45-9708-019B960494DF}">
-                <a14:hiddenLine xmlns:a14="http://schemas.microsoft.com/office/drawing/2010/main" xmlns="" w="9525">
+                <a14:hiddenLine xmlns="" xmlns:a14="http://schemas.microsoft.com/office/drawing/2010/main" w="9525">
                   <a:solidFill>
                     <a:srgbClr val="000000"/>
                   </a:solidFill>
@@ -2207,7 +2207,7 @@
             </a:ln>
             <a:extLst>
               <a:ext uri="{91240B29-F687-4f45-9708-019B960494DF}">
-                <a14:hiddenLine xmlns:a14="http://schemas.microsoft.com/office/drawing/2010/main" xmlns="" w="9525">
+                <a14:hiddenLine xmlns="" xmlns:a14="http://schemas.microsoft.com/office/drawing/2010/main" w="9525">
                   <a:solidFill>
                     <a:srgbClr val="000000"/>
                   </a:solidFill>
@@ -2263,7 +2263,7 @@
             </a:ln>
             <a:extLst>
               <a:ext uri="{91240B29-F687-4f45-9708-019B960494DF}">
-                <a14:hiddenLine xmlns:a14="http://schemas.microsoft.com/office/drawing/2010/main" xmlns="" w="9525">
+                <a14:hiddenLine xmlns="" xmlns:a14="http://schemas.microsoft.com/office/drawing/2010/main" w="9525">
                   <a:solidFill>
                     <a:srgbClr val="000000"/>
                   </a:solidFill>
@@ -2353,7 +2353,7 @@
             </a:ln>
             <a:extLst>
               <a:ext uri="{91240B29-F687-4f45-9708-019B960494DF}">
-                <a14:hiddenLine xmlns:a14="http://schemas.microsoft.com/office/drawing/2010/main" xmlns="" w="9525">
+                <a14:hiddenLine xmlns="" xmlns:a14="http://schemas.microsoft.com/office/drawing/2010/main" w="9525">
                   <a:solidFill>
                     <a:srgbClr val="000000"/>
                   </a:solidFill>
@@ -2421,7 +2421,7 @@
             </a:ln>
             <a:extLst>
               <a:ext uri="{91240B29-F687-4f45-9708-019B960494DF}">
-                <a14:hiddenLine xmlns:a14="http://schemas.microsoft.com/office/drawing/2010/main" xmlns="" w="9525">
+                <a14:hiddenLine xmlns="" xmlns:a14="http://schemas.microsoft.com/office/drawing/2010/main" w="9525">
                   <a:solidFill>
                     <a:srgbClr val="000000"/>
                   </a:solidFill>
@@ -2511,7 +2511,7 @@
             </a:ln>
             <a:extLst>
               <a:ext uri="{91240B29-F687-4f45-9708-019B960494DF}">
-                <a14:hiddenLine xmlns:a14="http://schemas.microsoft.com/office/drawing/2010/main" xmlns="" w="9525">
+                <a14:hiddenLine xmlns="" xmlns:a14="http://schemas.microsoft.com/office/drawing/2010/main" w="9525">
                   <a:solidFill>
                     <a:srgbClr val="000000"/>
                   </a:solidFill>
@@ -2579,7 +2579,7 @@
             </a:ln>
             <a:extLst>
               <a:ext uri="{91240B29-F687-4f45-9708-019B960494DF}">
-                <a14:hiddenLine xmlns:a14="http://schemas.microsoft.com/office/drawing/2010/main" xmlns="" w="9525">
+                <a14:hiddenLine xmlns="" xmlns:a14="http://schemas.microsoft.com/office/drawing/2010/main" w="9525">
                   <a:solidFill>
                     <a:srgbClr val="000000"/>
                   </a:solidFill>
@@ -2669,7 +2669,7 @@
             </a:ln>
             <a:extLst>
               <a:ext uri="{91240B29-F687-4f45-9708-019B960494DF}">
-                <a14:hiddenLine xmlns:a14="http://schemas.microsoft.com/office/drawing/2010/main" xmlns="" w="9525">
+                <a14:hiddenLine xmlns="" xmlns:a14="http://schemas.microsoft.com/office/drawing/2010/main" w="9525">
                   <a:solidFill>
                     <a:srgbClr val="000000"/>
                   </a:solidFill>
@@ -2703,7 +2703,7 @@
             </a:ln>
             <a:extLst>
               <a:ext uri="{91240B29-F687-4f45-9708-019B960494DF}">
-                <a14:hiddenLine xmlns:a14="http://schemas.microsoft.com/office/drawing/2010/main" xmlns="" w="9525">
+                <a14:hiddenLine xmlns="" xmlns:a14="http://schemas.microsoft.com/office/drawing/2010/main" w="9525">
                   <a:solidFill>
                     <a:srgbClr val="000000"/>
                   </a:solidFill>
@@ -2793,7 +2793,7 @@
             </a:ln>
             <a:extLst>
               <a:ext uri="{91240B29-F687-4f45-9708-019B960494DF}">
-                <a14:hiddenLine xmlns:a14="http://schemas.microsoft.com/office/drawing/2010/main" xmlns="" w="9525">
+                <a14:hiddenLine xmlns="" xmlns:a14="http://schemas.microsoft.com/office/drawing/2010/main" w="9525">
                   <a:solidFill>
                     <a:srgbClr val="000000"/>
                   </a:solidFill>
@@ -2855,7 +2855,7 @@
             </a:ln>
             <a:extLst>
               <a:ext uri="{91240B29-F687-4f45-9708-019B960494DF}">
-                <a14:hiddenLine xmlns:a14="http://schemas.microsoft.com/office/drawing/2010/main" xmlns="" w="9525">
+                <a14:hiddenLine xmlns="" xmlns:a14="http://schemas.microsoft.com/office/drawing/2010/main" w="9525">
                   <a:solidFill>
                     <a:srgbClr val="000000"/>
                   </a:solidFill>
@@ -2917,7 +2917,7 @@
             </a:ln>
             <a:extLst>
               <a:ext uri="{91240B29-F687-4f45-9708-019B960494DF}">
-                <a14:hiddenLine xmlns:a14="http://schemas.microsoft.com/office/drawing/2010/main" xmlns="" w="9525">
+                <a14:hiddenLine xmlns="" xmlns:a14="http://schemas.microsoft.com/office/drawing/2010/main" w="9525">
                   <a:solidFill>
                     <a:srgbClr val="000000"/>
                   </a:solidFill>
@@ -3007,7 +3007,7 @@
             </a:ln>
             <a:extLst>
               <a:ext uri="{91240B29-F687-4f45-9708-019B960494DF}">
-                <a14:hiddenLine xmlns:a14="http://schemas.microsoft.com/office/drawing/2010/main" xmlns="" w="9525">
+                <a14:hiddenLine xmlns="" xmlns:a14="http://schemas.microsoft.com/office/drawing/2010/main" w="9525">
                   <a:solidFill>
                     <a:srgbClr val="000000"/>
                   </a:solidFill>
@@ -3075,7 +3075,7 @@
             </a:ln>
             <a:extLst>
               <a:ext uri="{91240B29-F687-4f45-9708-019B960494DF}">
-                <a14:hiddenLine xmlns:a14="http://schemas.microsoft.com/office/drawing/2010/main" xmlns="" w="9525">
+                <a14:hiddenLine xmlns="" xmlns:a14="http://schemas.microsoft.com/office/drawing/2010/main" w="9525">
                   <a:solidFill>
                     <a:srgbClr val="000000"/>
                   </a:solidFill>
@@ -3137,7 +3137,7 @@
             </a:ln>
             <a:extLst>
               <a:ext uri="{91240B29-F687-4f45-9708-019B960494DF}">
-                <a14:hiddenLine xmlns:a14="http://schemas.microsoft.com/office/drawing/2010/main" xmlns="" w="9525">
+                <a14:hiddenLine xmlns="" xmlns:a14="http://schemas.microsoft.com/office/drawing/2010/main" w="9525">
                   <a:solidFill>
                     <a:srgbClr val="000000"/>
                   </a:solidFill>
@@ -3227,7 +3227,7 @@
             </a:ln>
             <a:extLst>
               <a:ext uri="{91240B29-F687-4f45-9708-019B960494DF}">
-                <a14:hiddenLine xmlns:a14="http://schemas.microsoft.com/office/drawing/2010/main" xmlns="" w="9525">
+                <a14:hiddenLine xmlns="" xmlns:a14="http://schemas.microsoft.com/office/drawing/2010/main" w="9525">
                   <a:solidFill>
                     <a:srgbClr val="000000"/>
                   </a:solidFill>
@@ -3289,7 +3289,7 @@
             </a:ln>
             <a:extLst>
               <a:ext uri="{91240B29-F687-4f45-9708-019B960494DF}">
-                <a14:hiddenLine xmlns:a14="http://schemas.microsoft.com/office/drawing/2010/main" xmlns="" w="9525">
+                <a14:hiddenLine xmlns="" xmlns:a14="http://schemas.microsoft.com/office/drawing/2010/main" w="9525">
                   <a:solidFill>
                     <a:srgbClr val="000000"/>
                   </a:solidFill>
@@ -3379,7 +3379,7 @@
             </a:ln>
             <a:extLst>
               <a:ext uri="{91240B29-F687-4f45-9708-019B960494DF}">
-                <a14:hiddenLine xmlns:a14="http://schemas.microsoft.com/office/drawing/2010/main" xmlns="" w="9525">
+                <a14:hiddenLine xmlns="" xmlns:a14="http://schemas.microsoft.com/office/drawing/2010/main" w="9525">
                   <a:solidFill>
                     <a:srgbClr val="000000"/>
                   </a:solidFill>
@@ -3441,7 +3441,7 @@
             </a:ln>
             <a:extLst>
               <a:ext uri="{91240B29-F687-4f45-9708-019B960494DF}">
-                <a14:hiddenLine xmlns:a14="http://schemas.microsoft.com/office/drawing/2010/main" xmlns="" w="9525">
+                <a14:hiddenLine xmlns="" xmlns:a14="http://schemas.microsoft.com/office/drawing/2010/main" w="9525">
                   <a:solidFill>
                     <a:srgbClr val="000000"/>
                   </a:solidFill>
@@ -3531,7 +3531,7 @@
             </a:ln>
             <a:extLst>
               <a:ext uri="{91240B29-F687-4f45-9708-019B960494DF}">
-                <a14:hiddenLine xmlns:a14="http://schemas.microsoft.com/office/drawing/2010/main" xmlns="" w="9525">
+                <a14:hiddenLine xmlns="" xmlns:a14="http://schemas.microsoft.com/office/drawing/2010/main" w="9525">
                   <a:solidFill>
                     <a:srgbClr val="000000"/>
                   </a:solidFill>
@@ -3565,7 +3565,7 @@
             </a:ln>
             <a:extLst>
               <a:ext uri="{91240B29-F687-4f45-9708-019B960494DF}">
-                <a14:hiddenLine xmlns:a14="http://schemas.microsoft.com/office/drawing/2010/main" xmlns="" w="9525">
+                <a14:hiddenLine xmlns="" xmlns:a14="http://schemas.microsoft.com/office/drawing/2010/main" w="9525">
                   <a:solidFill>
                     <a:srgbClr val="000000"/>
                   </a:solidFill>
@@ -3630,7 +3630,7 @@
             </a:ln>
             <a:extLst>
               <a:ext uri="{91240B29-F687-4f45-9708-019B960494DF}">
-                <a14:hiddenLine xmlns:a14="http://schemas.microsoft.com/office/drawing/2010/main" xmlns="" w="9525">
+                <a14:hiddenLine xmlns="" xmlns:a14="http://schemas.microsoft.com/office/drawing/2010/main" w="9525">
                   <a:solidFill>
                     <a:srgbClr val="000000"/>
                   </a:solidFill>
@@ -3720,7 +3720,7 @@
             </a:ln>
             <a:extLst>
               <a:ext uri="{91240B29-F687-4f45-9708-019B960494DF}">
-                <a14:hiddenLine xmlns:a14="http://schemas.microsoft.com/office/drawing/2010/main" xmlns="" w="9525">
+                <a14:hiddenLine xmlns="" xmlns:a14="http://schemas.microsoft.com/office/drawing/2010/main" w="9525">
                   <a:solidFill>
                     <a:srgbClr val="000000"/>
                   </a:solidFill>
@@ -3782,7 +3782,7 @@
             </a:ln>
             <a:extLst>
               <a:ext uri="{91240B29-F687-4f45-9708-019B960494DF}">
-                <a14:hiddenLine xmlns:a14="http://schemas.microsoft.com/office/drawing/2010/main" xmlns="" w="9525">
+                <a14:hiddenLine xmlns="" xmlns:a14="http://schemas.microsoft.com/office/drawing/2010/main" w="9525">
                   <a:solidFill>
                     <a:srgbClr val="000000"/>
                   </a:solidFill>
@@ -3872,7 +3872,7 @@
             </a:ln>
             <a:extLst>
               <a:ext uri="{91240B29-F687-4f45-9708-019B960494DF}">
-                <a14:hiddenLine xmlns:a14="http://schemas.microsoft.com/office/drawing/2010/main" xmlns="" w="9525">
+                <a14:hiddenLine xmlns="" xmlns:a14="http://schemas.microsoft.com/office/drawing/2010/main" w="9525">
                   <a:solidFill>
                     <a:srgbClr val="000000"/>
                   </a:solidFill>
@@ -3962,7 +3962,7 @@
             </a:ln>
             <a:extLst>
               <a:ext uri="{91240B29-F687-4f45-9708-019B960494DF}">
-                <a14:hiddenLine xmlns:a14="http://schemas.microsoft.com/office/drawing/2010/main" xmlns="" w="9525">
+                <a14:hiddenLine xmlns="" xmlns:a14="http://schemas.microsoft.com/office/drawing/2010/main" w="9525">
                   <a:solidFill>
                     <a:srgbClr val="000000"/>
                   </a:solidFill>
@@ -4027,7 +4027,7 @@
             </a:ln>
             <a:extLst>
               <a:ext uri="{91240B29-F687-4f45-9708-019B960494DF}">
-                <a14:hiddenLine xmlns:a14="http://schemas.microsoft.com/office/drawing/2010/main" xmlns="" w="9525">
+                <a14:hiddenLine xmlns="" xmlns:a14="http://schemas.microsoft.com/office/drawing/2010/main" w="9525">
                   <a:solidFill>
                     <a:srgbClr val="000000"/>
                   </a:solidFill>
@@ -4089,7 +4089,7 @@
             </a:ln>
             <a:extLst>
               <a:ext uri="{91240B29-F687-4f45-9708-019B960494DF}">
-                <a14:hiddenLine xmlns:a14="http://schemas.microsoft.com/office/drawing/2010/main" xmlns="" w="9525">
+                <a14:hiddenLine xmlns="" xmlns:a14="http://schemas.microsoft.com/office/drawing/2010/main" w="9525">
                   <a:solidFill>
                     <a:srgbClr val="000000"/>
                   </a:solidFill>
@@ -4179,7 +4179,7 @@
             </a:ln>
             <a:extLst>
               <a:ext uri="{91240B29-F687-4f45-9708-019B960494DF}">
-                <a14:hiddenLine xmlns:a14="http://schemas.microsoft.com/office/drawing/2010/main" xmlns="" w="9525">
+                <a14:hiddenLine xmlns="" xmlns:a14="http://schemas.microsoft.com/office/drawing/2010/main" w="9525">
                   <a:solidFill>
                     <a:srgbClr val="000000"/>
                   </a:solidFill>
@@ -4269,7 +4269,7 @@
             </a:ln>
             <a:extLst>
               <a:ext uri="{91240B29-F687-4f45-9708-019B960494DF}">
-                <a14:hiddenLine xmlns:a14="http://schemas.microsoft.com/office/drawing/2010/main" xmlns="" w="9525">
+                <a14:hiddenLine xmlns="" xmlns:a14="http://schemas.microsoft.com/office/drawing/2010/main" w="9525">
                   <a:solidFill>
                     <a:srgbClr val="000000"/>
                   </a:solidFill>
@@ -4331,7 +4331,7 @@
             </a:ln>
             <a:extLst>
               <a:ext uri="{91240B29-F687-4f45-9708-019B960494DF}">
-                <a14:hiddenLine xmlns:a14="http://schemas.microsoft.com/office/drawing/2010/main" xmlns="" w="9525">
+                <a14:hiddenLine xmlns="" xmlns:a14="http://schemas.microsoft.com/office/drawing/2010/main" w="9525">
                   <a:solidFill>
                     <a:srgbClr val="000000"/>
                   </a:solidFill>
@@ -4451,7 +4451,7 @@
             </a:ln>
             <a:extLst>
               <a:ext uri="{91240B29-F687-4f45-9708-019B960494DF}">
-                <a14:hiddenLine xmlns:a14="http://schemas.microsoft.com/office/drawing/2010/main" xmlns="" w="9525">
+                <a14:hiddenLine xmlns="" xmlns:a14="http://schemas.microsoft.com/office/drawing/2010/main" w="9525">
                   <a:solidFill>
                     <a:srgbClr val="000000"/>
                   </a:solidFill>
@@ -4519,7 +4519,7 @@
             </a:ln>
             <a:extLst>
               <a:ext uri="{91240B29-F687-4f45-9708-019B960494DF}">
-                <a14:hiddenLine xmlns:a14="http://schemas.microsoft.com/office/drawing/2010/main" xmlns="" w="9525">
+                <a14:hiddenLine xmlns="" xmlns:a14="http://schemas.microsoft.com/office/drawing/2010/main" w="9525">
                   <a:solidFill>
                     <a:srgbClr val="000000"/>
                   </a:solidFill>
@@ -4609,7 +4609,7 @@
             </a:ln>
             <a:extLst>
               <a:ext uri="{91240B29-F687-4f45-9708-019B960494DF}">
-                <a14:hiddenLine xmlns:a14="http://schemas.microsoft.com/office/drawing/2010/main" xmlns="" w="9525">
+                <a14:hiddenLine xmlns="" xmlns:a14="http://schemas.microsoft.com/office/drawing/2010/main" w="9525">
                   <a:solidFill>
                     <a:srgbClr val="000000"/>
                   </a:solidFill>
@@ -9407,7 +9407,7 @@
           <a:noFill/>
           <a:extLst>
             <a:ext uri="{909E8E84-426E-40dd-AFC4-6F175D3DCCD1}">
-              <a14:hiddenFill xmlns:a14="http://schemas.microsoft.com/office/drawing/2010/main" xmlns="">
+              <a14:hiddenFill xmlns="" xmlns:a14="http://schemas.microsoft.com/office/drawing/2010/main">
                 <a:solidFill>
                   <a:srgbClr val="FFFFFF"/>
                 </a:solidFill>
@@ -9481,7 +9481,7 @@
               </a:ln>
               <a:extLst>
                 <a:ext uri="{91240B29-F687-4f45-9708-019B960494DF}">
-                  <a14:hiddenLine xmlns:a14="http://schemas.microsoft.com/office/drawing/2010/main" xmlns="" w="9525">
+                  <a14:hiddenLine xmlns="" xmlns:a14="http://schemas.microsoft.com/office/drawing/2010/main" w="9525">
                     <a:solidFill>
                       <a:srgbClr val="000000"/>
                     </a:solidFill>
@@ -9571,7 +9571,7 @@
               </a:ln>
               <a:extLst>
                 <a:ext uri="{91240B29-F687-4f45-9708-019B960494DF}">
-                  <a14:hiddenLine xmlns:a14="http://schemas.microsoft.com/office/drawing/2010/main" xmlns="" w="9525">
+                  <a14:hiddenLine xmlns="" xmlns:a14="http://schemas.microsoft.com/office/drawing/2010/main" w="9525">
                     <a:solidFill>
                       <a:srgbClr val="000000"/>
                     </a:solidFill>
@@ -9661,7 +9661,7 @@
               </a:ln>
               <a:extLst>
                 <a:ext uri="{91240B29-F687-4f45-9708-019B960494DF}">
-                  <a14:hiddenLine xmlns:a14="http://schemas.microsoft.com/office/drawing/2010/main" xmlns="" w="9525">
+                  <a14:hiddenLine xmlns="" xmlns:a14="http://schemas.microsoft.com/office/drawing/2010/main" w="9525">
                     <a:solidFill>
                       <a:srgbClr val="000000"/>
                     </a:solidFill>
@@ -9723,7 +9723,7 @@
               </a:ln>
               <a:extLst>
                 <a:ext uri="{91240B29-F687-4f45-9708-019B960494DF}">
-                  <a14:hiddenLine xmlns:a14="http://schemas.microsoft.com/office/drawing/2010/main" xmlns="" w="9525">
+                  <a14:hiddenLine xmlns="" xmlns:a14="http://schemas.microsoft.com/office/drawing/2010/main" w="9525">
                     <a:solidFill>
                       <a:srgbClr val="000000"/>
                     </a:solidFill>
@@ -9813,7 +9813,7 @@
               </a:ln>
               <a:extLst>
                 <a:ext uri="{91240B29-F687-4f45-9708-019B960494DF}">
-                  <a14:hiddenLine xmlns:a14="http://schemas.microsoft.com/office/drawing/2010/main" xmlns="" w="9525">
+                  <a14:hiddenLine xmlns="" xmlns:a14="http://schemas.microsoft.com/office/drawing/2010/main" w="9525">
                     <a:solidFill>
                       <a:srgbClr val="000000"/>
                     </a:solidFill>
@@ -9875,7 +9875,7 @@
               </a:ln>
               <a:extLst>
                 <a:ext uri="{91240B29-F687-4f45-9708-019B960494DF}">
-                  <a14:hiddenLine xmlns:a14="http://schemas.microsoft.com/office/drawing/2010/main" xmlns="" w="9525">
+                  <a14:hiddenLine xmlns="" xmlns:a14="http://schemas.microsoft.com/office/drawing/2010/main" w="9525">
                     <a:solidFill>
                       <a:srgbClr val="000000"/>
                     </a:solidFill>
@@ -9937,7 +9937,7 @@
               </a:ln>
               <a:extLst>
                 <a:ext uri="{91240B29-F687-4f45-9708-019B960494DF}">
-                  <a14:hiddenLine xmlns:a14="http://schemas.microsoft.com/office/drawing/2010/main" xmlns="" w="9525">
+                  <a14:hiddenLine xmlns="" xmlns:a14="http://schemas.microsoft.com/office/drawing/2010/main" w="9525">
                     <a:solidFill>
                       <a:srgbClr val="000000"/>
                     </a:solidFill>
@@ -10027,7 +10027,7 @@
               </a:ln>
               <a:extLst>
                 <a:ext uri="{91240B29-F687-4f45-9708-019B960494DF}">
-                  <a14:hiddenLine xmlns:a14="http://schemas.microsoft.com/office/drawing/2010/main" xmlns="" w="9525">
+                  <a14:hiddenLine xmlns="" xmlns:a14="http://schemas.microsoft.com/office/drawing/2010/main" w="9525">
                     <a:solidFill>
                       <a:srgbClr val="000000"/>
                     </a:solidFill>
@@ -10117,7 +10117,7 @@
               </a:ln>
               <a:extLst>
                 <a:ext uri="{91240B29-F687-4f45-9708-019B960494DF}">
-                  <a14:hiddenLine xmlns:a14="http://schemas.microsoft.com/office/drawing/2010/main" xmlns="" w="9525">
+                  <a14:hiddenLine xmlns="" xmlns:a14="http://schemas.microsoft.com/office/drawing/2010/main" w="9525">
                     <a:solidFill>
                       <a:srgbClr val="000000"/>
                     </a:solidFill>
@@ -10179,7 +10179,7 @@
               </a:ln>
               <a:extLst>
                 <a:ext uri="{91240B29-F687-4f45-9708-019B960494DF}">
-                  <a14:hiddenLine xmlns:a14="http://schemas.microsoft.com/office/drawing/2010/main" xmlns="" w="9525">
+                  <a14:hiddenLine xmlns="" xmlns:a14="http://schemas.microsoft.com/office/drawing/2010/main" w="9525">
                     <a:solidFill>
                       <a:srgbClr val="000000"/>
                     </a:solidFill>
@@ -10289,7 +10289,7 @@
               </a:ln>
               <a:extLst>
                 <a:ext uri="{91240B29-F687-4f45-9708-019B960494DF}">
-                  <a14:hiddenLine xmlns:a14="http://schemas.microsoft.com/office/drawing/2010/main" xmlns="" w="9525">
+                  <a14:hiddenLine xmlns="" xmlns:a14="http://schemas.microsoft.com/office/drawing/2010/main" w="9525">
                     <a:solidFill>
                       <a:srgbClr val="000000"/>
                     </a:solidFill>
@@ -10373,7 +10373,7 @@
               </a:ln>
               <a:extLst>
                 <a:ext uri="{91240B29-F687-4f45-9708-019B960494DF}">
-                  <a14:hiddenLine xmlns:a14="http://schemas.microsoft.com/office/drawing/2010/main" xmlns="" w="9525">
+                  <a14:hiddenLine xmlns="" xmlns:a14="http://schemas.microsoft.com/office/drawing/2010/main" w="9525">
                     <a:solidFill>
                       <a:srgbClr val="000000"/>
                     </a:solidFill>
@@ -10435,7 +10435,7 @@
               </a:ln>
               <a:extLst>
                 <a:ext uri="{91240B29-F687-4f45-9708-019B960494DF}">
-                  <a14:hiddenLine xmlns:a14="http://schemas.microsoft.com/office/drawing/2010/main" xmlns="" w="9525">
+                  <a14:hiddenLine xmlns="" xmlns:a14="http://schemas.microsoft.com/office/drawing/2010/main" w="9525">
                     <a:solidFill>
                       <a:srgbClr val="000000"/>
                     </a:solidFill>
@@ -10497,7 +10497,7 @@
               </a:ln>
               <a:extLst>
                 <a:ext uri="{91240B29-F687-4f45-9708-019B960494DF}">
-                  <a14:hiddenLine xmlns:a14="http://schemas.microsoft.com/office/drawing/2010/main" xmlns="" w="9525">
+                  <a14:hiddenLine xmlns="" xmlns:a14="http://schemas.microsoft.com/office/drawing/2010/main" w="9525">
                     <a:solidFill>
                       <a:srgbClr val="000000"/>
                     </a:solidFill>
@@ -10587,7 +10587,7 @@
               </a:ln>
               <a:extLst>
                 <a:ext uri="{91240B29-F687-4f45-9708-019B960494DF}">
-                  <a14:hiddenLine xmlns:a14="http://schemas.microsoft.com/office/drawing/2010/main" xmlns="" w="9525">
+                  <a14:hiddenLine xmlns="" xmlns:a14="http://schemas.microsoft.com/office/drawing/2010/main" w="9525">
                     <a:solidFill>
                       <a:srgbClr val="000000"/>
                     </a:solidFill>
@@ -10621,7 +10621,7 @@
               </a:ln>
               <a:extLst>
                 <a:ext uri="{91240B29-F687-4f45-9708-019B960494DF}">
-                  <a14:hiddenLine xmlns:a14="http://schemas.microsoft.com/office/drawing/2010/main" xmlns="" w="9525">
+                  <a14:hiddenLine xmlns="" xmlns:a14="http://schemas.microsoft.com/office/drawing/2010/main" w="9525">
                     <a:solidFill>
                       <a:srgbClr val="000000"/>
                     </a:solidFill>
@@ -10686,7 +10686,7 @@
               </a:ln>
               <a:extLst>
                 <a:ext uri="{91240B29-F687-4f45-9708-019B960494DF}">
-                  <a14:hiddenLine xmlns:a14="http://schemas.microsoft.com/office/drawing/2010/main" xmlns="" w="9525">
+                  <a14:hiddenLine xmlns="" xmlns:a14="http://schemas.microsoft.com/office/drawing/2010/main" w="9525">
                     <a:solidFill>
                       <a:srgbClr val="000000"/>
                     </a:solidFill>
@@ -10776,7 +10776,7 @@
               </a:ln>
               <a:extLst>
                 <a:ext uri="{91240B29-F687-4f45-9708-019B960494DF}">
-                  <a14:hiddenLine xmlns:a14="http://schemas.microsoft.com/office/drawing/2010/main" xmlns="" w="9525">
+                  <a14:hiddenLine xmlns="" xmlns:a14="http://schemas.microsoft.com/office/drawing/2010/main" w="9525">
                     <a:solidFill>
                       <a:srgbClr val="000000"/>
                     </a:solidFill>
@@ -10838,7 +10838,7 @@
               </a:ln>
               <a:extLst>
                 <a:ext uri="{91240B29-F687-4f45-9708-019B960494DF}">
-                  <a14:hiddenLine xmlns:a14="http://schemas.microsoft.com/office/drawing/2010/main" xmlns="" w="9525">
+                  <a14:hiddenLine xmlns="" xmlns:a14="http://schemas.microsoft.com/office/drawing/2010/main" w="9525">
                     <a:solidFill>
                       <a:srgbClr val="000000"/>
                     </a:solidFill>
@@ -10928,7 +10928,7 @@
               </a:ln>
               <a:extLst>
                 <a:ext uri="{91240B29-F687-4f45-9708-019B960494DF}">
-                  <a14:hiddenLine xmlns:a14="http://schemas.microsoft.com/office/drawing/2010/main" xmlns="" w="9525">
+                  <a14:hiddenLine xmlns="" xmlns:a14="http://schemas.microsoft.com/office/drawing/2010/main" w="9525">
                     <a:solidFill>
                       <a:srgbClr val="000000"/>
                     </a:solidFill>
@@ -10993,7 +10993,7 @@
               </a:ln>
               <a:extLst>
                 <a:ext uri="{91240B29-F687-4f45-9708-019B960494DF}">
-                  <a14:hiddenLine xmlns:a14="http://schemas.microsoft.com/office/drawing/2010/main" xmlns="" w="9525">
+                  <a14:hiddenLine xmlns="" xmlns:a14="http://schemas.microsoft.com/office/drawing/2010/main" w="9525">
                     <a:solidFill>
                       <a:srgbClr val="000000"/>
                     </a:solidFill>
@@ -11055,7 +11055,7 @@
               </a:ln>
               <a:extLst>
                 <a:ext uri="{91240B29-F687-4f45-9708-019B960494DF}">
-                  <a14:hiddenLine xmlns:a14="http://schemas.microsoft.com/office/drawing/2010/main" xmlns="" w="9525">
+                  <a14:hiddenLine xmlns="" xmlns:a14="http://schemas.microsoft.com/office/drawing/2010/main" w="9525">
                     <a:solidFill>
                       <a:srgbClr val="000000"/>
                     </a:solidFill>
@@ -11145,7 +11145,7 @@
               </a:ln>
               <a:extLst>
                 <a:ext uri="{91240B29-F687-4f45-9708-019B960494DF}">
-                  <a14:hiddenLine xmlns:a14="http://schemas.microsoft.com/office/drawing/2010/main" xmlns="" w="9525">
+                  <a14:hiddenLine xmlns="" xmlns:a14="http://schemas.microsoft.com/office/drawing/2010/main" w="9525">
                     <a:solidFill>
                       <a:srgbClr val="000000"/>
                     </a:solidFill>
@@ -11235,7 +11235,7 @@
               </a:ln>
               <a:extLst>
                 <a:ext uri="{91240B29-F687-4f45-9708-019B960494DF}">
-                  <a14:hiddenLine xmlns:a14="http://schemas.microsoft.com/office/drawing/2010/main" xmlns="" w="9525">
+                  <a14:hiddenLine xmlns="" xmlns:a14="http://schemas.microsoft.com/office/drawing/2010/main" w="9525">
                     <a:solidFill>
                       <a:srgbClr val="000000"/>
                     </a:solidFill>
@@ -11300,7 +11300,7 @@
               </a:ln>
               <a:extLst>
                 <a:ext uri="{91240B29-F687-4f45-9708-019B960494DF}">
-                  <a14:hiddenLine xmlns:a14="http://schemas.microsoft.com/office/drawing/2010/main" xmlns="" w="9525">
+                  <a14:hiddenLine xmlns="" xmlns:a14="http://schemas.microsoft.com/office/drawing/2010/main" w="9525">
                     <a:solidFill>
                       <a:srgbClr val="000000"/>
                     </a:solidFill>
@@ -11420,7 +11420,7 @@
               </a:ln>
               <a:extLst>
                 <a:ext uri="{91240B29-F687-4f45-9708-019B960494DF}">
-                  <a14:hiddenLine xmlns:a14="http://schemas.microsoft.com/office/drawing/2010/main" xmlns="" w="9525">
+                  <a14:hiddenLine xmlns="" xmlns:a14="http://schemas.microsoft.com/office/drawing/2010/main" w="9525">
                     <a:solidFill>
                       <a:srgbClr val="000000"/>
                     </a:solidFill>
@@ -11518,7 +11518,7 @@
               </a:ln>
               <a:extLst>
                 <a:ext uri="{91240B29-F687-4f45-9708-019B960494DF}">
-                  <a14:hiddenLine xmlns:a14="http://schemas.microsoft.com/office/drawing/2010/main" xmlns="" w="9525">
+                  <a14:hiddenLine xmlns="" xmlns:a14="http://schemas.microsoft.com/office/drawing/2010/main" w="9525">
                     <a:solidFill>
                       <a:srgbClr val="000000"/>
                     </a:solidFill>
@@ -11633,7 +11633,7 @@
               </a:ln>
               <a:extLst>
                 <a:ext uri="{91240B29-F687-4f45-9708-019B960494DF}">
-                  <a14:hiddenLine xmlns:a14="http://schemas.microsoft.com/office/drawing/2010/main" xmlns="" w="9525">
+                  <a14:hiddenLine xmlns="" xmlns:a14="http://schemas.microsoft.com/office/drawing/2010/main" w="9525">
                     <a:solidFill>
                       <a:srgbClr val="000000"/>
                     </a:solidFill>
@@ -11723,7 +11723,7 @@
               </a:ln>
               <a:extLst>
                 <a:ext uri="{91240B29-F687-4f45-9708-019B960494DF}">
-                  <a14:hiddenLine xmlns:a14="http://schemas.microsoft.com/office/drawing/2010/main" xmlns="" w="9525">
+                  <a14:hiddenLine xmlns="" xmlns:a14="http://schemas.microsoft.com/office/drawing/2010/main" w="9525">
                     <a:solidFill>
                       <a:srgbClr val="000000"/>
                     </a:solidFill>
@@ -11788,7 +11788,7 @@
               </a:ln>
               <a:extLst>
                 <a:ext uri="{91240B29-F687-4f45-9708-019B960494DF}">
-                  <a14:hiddenLine xmlns:a14="http://schemas.microsoft.com/office/drawing/2010/main" xmlns="" w="9525">
+                  <a14:hiddenLine xmlns="" xmlns:a14="http://schemas.microsoft.com/office/drawing/2010/main" w="9525">
                     <a:solidFill>
                       <a:srgbClr val="000000"/>
                     </a:solidFill>
@@ -11878,7 +11878,7 @@
               </a:ln>
               <a:extLst>
                 <a:ext uri="{91240B29-F687-4f45-9708-019B960494DF}">
-                  <a14:hiddenLine xmlns:a14="http://schemas.microsoft.com/office/drawing/2010/main" xmlns="" w="9525">
+                  <a14:hiddenLine xmlns="" xmlns:a14="http://schemas.microsoft.com/office/drawing/2010/main" w="9525">
                     <a:solidFill>
                       <a:srgbClr val="000000"/>
                     </a:solidFill>
@@ -11946,7 +11946,7 @@
               </a:ln>
               <a:extLst>
                 <a:ext uri="{91240B29-F687-4f45-9708-019B960494DF}">
-                  <a14:hiddenLine xmlns:a14="http://schemas.microsoft.com/office/drawing/2010/main" xmlns="" w="9525">
+                  <a14:hiddenLine xmlns="" xmlns:a14="http://schemas.microsoft.com/office/drawing/2010/main" w="9525">
                     <a:solidFill>
                       <a:srgbClr val="000000"/>
                     </a:solidFill>
@@ -12036,7 +12036,7 @@
               </a:ln>
               <a:extLst>
                 <a:ext uri="{91240B29-F687-4f45-9708-019B960494DF}">
-                  <a14:hiddenLine xmlns:a14="http://schemas.microsoft.com/office/drawing/2010/main" xmlns="" w="9525">
+                  <a14:hiddenLine xmlns="" xmlns:a14="http://schemas.microsoft.com/office/drawing/2010/main" w="9525">
                     <a:solidFill>
                       <a:srgbClr val="000000"/>
                     </a:solidFill>
@@ -12104,7 +12104,7 @@
               </a:ln>
               <a:extLst>
                 <a:ext uri="{91240B29-F687-4f45-9708-019B960494DF}">
-                  <a14:hiddenLine xmlns:a14="http://schemas.microsoft.com/office/drawing/2010/main" xmlns="" w="9525">
+                  <a14:hiddenLine xmlns="" xmlns:a14="http://schemas.microsoft.com/office/drawing/2010/main" w="9525">
                     <a:solidFill>
                       <a:srgbClr val="000000"/>
                     </a:solidFill>
@@ -12194,7 +12194,7 @@
               </a:ln>
               <a:extLst>
                 <a:ext uri="{91240B29-F687-4f45-9708-019B960494DF}">
-                  <a14:hiddenLine xmlns:a14="http://schemas.microsoft.com/office/drawing/2010/main" xmlns="" w="9525">
+                  <a14:hiddenLine xmlns="" xmlns:a14="http://schemas.microsoft.com/office/drawing/2010/main" w="9525">
                     <a:solidFill>
                       <a:srgbClr val="000000"/>
                     </a:solidFill>
@@ -12228,7 +12228,7 @@
               </a:ln>
               <a:extLst>
                 <a:ext uri="{91240B29-F687-4f45-9708-019B960494DF}">
-                  <a14:hiddenLine xmlns:a14="http://schemas.microsoft.com/office/drawing/2010/main" xmlns="" w="9525">
+                  <a14:hiddenLine xmlns="" xmlns:a14="http://schemas.microsoft.com/office/drawing/2010/main" w="9525">
                     <a:solidFill>
                       <a:srgbClr val="000000"/>
                     </a:solidFill>
@@ -14354,7 +14354,7 @@
         </p:spPr>
         <p:txBody>
           <a:bodyPr>
-            <a:normAutofit fontScale="85000" lnSpcReduction="20000"/>
+            <a:normAutofit fontScale="70000" lnSpcReduction="20000"/>
           </a:bodyPr>
           <a:lstStyle/>
           <a:p>
@@ -14485,23 +14485,7 @@
                   <a:schemeClr val="bg1"/>
                 </a:solidFill>
               </a:rPr>
-              <a:t>Failure to perform proactive software supply chain risk management </a:t>
-            </a:r>
-            <a:r>
-              <a:rPr lang="en-US">
-                <a:solidFill>
-                  <a:schemeClr val="bg1"/>
-                </a:solidFill>
-              </a:rPr>
-              <a:t>and cyber-risk detection </a:t>
-            </a:r>
-            <a:r>
-              <a:rPr lang="en-US" dirty="0">
-                <a:solidFill>
-                  <a:schemeClr val="bg1"/>
-                </a:solidFill>
-              </a:rPr>
-              <a:t>controls </a:t>
+              <a:t>Failure to perform proactive software supply chain risk management and cyber-risk detection controls </a:t>
             </a:r>
             <a:r>
               <a:rPr lang="en-US" dirty="0">
@@ -14511,6 +14495,22 @@
                 <a:hlinkClick r:id="rId6"/>
               </a:rPr>
               <a:t>may be considered negligent behavior with regard to duty of care fiduciary duties and fail to satisfy SEC good faith compliance expectations, opening the door to shareholder lawsuits</a:t>
+            </a:r>
+            <a:endParaRPr lang="en-US" dirty="0">
+              <a:solidFill>
+                <a:schemeClr val="bg1"/>
+              </a:solidFill>
+            </a:endParaRPr>
+          </a:p>
+          <a:p>
+            <a:r>
+              <a:rPr lang="en-US" dirty="0">
+                <a:solidFill>
+                  <a:schemeClr val="bg1"/>
+                </a:solidFill>
+                <a:hlinkClick r:id="rId7"/>
+              </a:rPr>
+              <a:t>Software vulnerabilities are not some mundane part of the tech ecosystem. Hackers often rely on these flaws to compromise their targets. </a:t>
             </a:r>
             <a:endParaRPr lang="en-US" dirty="0">
               <a:solidFill>

</xml_diff>